<commit_message>
Finalización | Proyecto | El proyecto ha sido finalizado.
</commit_message>
<xml_diff>
--- a/Presentación del proyecto.pptx
+++ b/Presentación del proyecto.pptx
@@ -3410,7 +3410,7 @@
           <a:p>
             <a:fld id="{C3E5AAC7-6B59-49B4-9290-4C0B6A91FBE1}" type="datetimeFigureOut">
               <a:rPr lang="es-AR" smtClean="0"/>
-              <a:t>14/3/2022</a:t>
+              <a:t>16/3/2022</a:t>
             </a:fld>
             <a:endParaRPr lang="es-AR"/>
           </a:p>
@@ -3480,6 +3480,18 @@
   <p:clrMapOvr>
     <a:masterClrMapping/>
   </p:clrMapOvr>
+  <mc:AlternateContent xmlns:mc="http://schemas.openxmlformats.org/markup-compatibility/2006">
+    <mc:Choice xmlns:p159="http://schemas.microsoft.com/office/powerpoint/2015/09/main" Requires="p159">
+      <p:transition xmlns:p14="http://schemas.microsoft.com/office/powerpoint/2010/main" spd="slow" p14:dur="2000">
+        <p159:morph option="byObject"/>
+      </p:transition>
+    </mc:Choice>
+    <mc:Fallback>
+      <p:transition spd="slow">
+        <p:fade/>
+      </p:transition>
+    </mc:Fallback>
+  </mc:AlternateContent>
 </p:sldLayout>
 </file>
 
@@ -3610,7 +3622,7 @@
           <a:p>
             <a:fld id="{C3E5AAC7-6B59-49B4-9290-4C0B6A91FBE1}" type="datetimeFigureOut">
               <a:rPr lang="es-AR" smtClean="0"/>
-              <a:t>14/3/2022</a:t>
+              <a:t>16/3/2022</a:t>
             </a:fld>
             <a:endParaRPr lang="es-AR"/>
           </a:p>
@@ -3680,6 +3692,18 @@
   <p:clrMapOvr>
     <a:masterClrMapping/>
   </p:clrMapOvr>
+  <mc:AlternateContent xmlns:mc="http://schemas.openxmlformats.org/markup-compatibility/2006">
+    <mc:Choice xmlns:p159="http://schemas.microsoft.com/office/powerpoint/2015/09/main" Requires="p159">
+      <p:transition xmlns:p14="http://schemas.microsoft.com/office/powerpoint/2010/main" spd="slow" p14:dur="2000">
+        <p159:morph option="byObject"/>
+      </p:transition>
+    </mc:Choice>
+    <mc:Fallback>
+      <p:transition spd="slow">
+        <p:fade/>
+      </p:transition>
+    </mc:Fallback>
+  </mc:AlternateContent>
 </p:sldLayout>
 </file>
 
@@ -3820,7 +3844,7 @@
           <a:p>
             <a:fld id="{C3E5AAC7-6B59-49B4-9290-4C0B6A91FBE1}" type="datetimeFigureOut">
               <a:rPr lang="es-AR" smtClean="0"/>
-              <a:t>14/3/2022</a:t>
+              <a:t>16/3/2022</a:t>
             </a:fld>
             <a:endParaRPr lang="es-AR"/>
           </a:p>
@@ -3890,6 +3914,18 @@
   <p:clrMapOvr>
     <a:masterClrMapping/>
   </p:clrMapOvr>
+  <mc:AlternateContent xmlns:mc="http://schemas.openxmlformats.org/markup-compatibility/2006">
+    <mc:Choice xmlns:p159="http://schemas.microsoft.com/office/powerpoint/2015/09/main" Requires="p159">
+      <p:transition xmlns:p14="http://schemas.microsoft.com/office/powerpoint/2010/main" spd="slow" p14:dur="2000">
+        <p159:morph option="byObject"/>
+      </p:transition>
+    </mc:Choice>
+    <mc:Fallback>
+      <p:transition spd="slow">
+        <p:fade/>
+      </p:transition>
+    </mc:Fallback>
+  </mc:AlternateContent>
 </p:sldLayout>
 </file>
 
@@ -4020,7 +4056,7 @@
           <a:p>
             <a:fld id="{C3E5AAC7-6B59-49B4-9290-4C0B6A91FBE1}" type="datetimeFigureOut">
               <a:rPr lang="es-AR" smtClean="0"/>
-              <a:t>14/3/2022</a:t>
+              <a:t>16/3/2022</a:t>
             </a:fld>
             <a:endParaRPr lang="es-AR"/>
           </a:p>
@@ -4090,6 +4126,18 @@
   <p:clrMapOvr>
     <a:masterClrMapping/>
   </p:clrMapOvr>
+  <mc:AlternateContent xmlns:mc="http://schemas.openxmlformats.org/markup-compatibility/2006">
+    <mc:Choice xmlns:p159="http://schemas.microsoft.com/office/powerpoint/2015/09/main" Requires="p159">
+      <p:transition xmlns:p14="http://schemas.microsoft.com/office/powerpoint/2010/main" spd="slow" p14:dur="2000">
+        <p159:morph option="byObject"/>
+      </p:transition>
+    </mc:Choice>
+    <mc:Fallback>
+      <p:transition spd="slow">
+        <p:fade/>
+      </p:transition>
+    </mc:Fallback>
+  </mc:AlternateContent>
 </p:sldLayout>
 </file>
 
@@ -4296,7 +4344,7 @@
           <a:p>
             <a:fld id="{C3E5AAC7-6B59-49B4-9290-4C0B6A91FBE1}" type="datetimeFigureOut">
               <a:rPr lang="es-AR" smtClean="0"/>
-              <a:t>14/3/2022</a:t>
+              <a:t>16/3/2022</a:t>
             </a:fld>
             <a:endParaRPr lang="es-AR"/>
           </a:p>
@@ -4366,6 +4414,18 @@
   <p:clrMapOvr>
     <a:masterClrMapping/>
   </p:clrMapOvr>
+  <mc:AlternateContent xmlns:mc="http://schemas.openxmlformats.org/markup-compatibility/2006">
+    <mc:Choice xmlns:p159="http://schemas.microsoft.com/office/powerpoint/2015/09/main" Requires="p159">
+      <p:transition xmlns:p14="http://schemas.microsoft.com/office/powerpoint/2010/main" spd="slow" p14:dur="2000">
+        <p159:morph option="byObject"/>
+      </p:transition>
+    </mc:Choice>
+    <mc:Fallback>
+      <p:transition spd="slow">
+        <p:fade/>
+      </p:transition>
+    </mc:Fallback>
+  </mc:AlternateContent>
 </p:sldLayout>
 </file>
 
@@ -4564,7 +4624,7 @@
           <a:p>
             <a:fld id="{C3E5AAC7-6B59-49B4-9290-4C0B6A91FBE1}" type="datetimeFigureOut">
               <a:rPr lang="es-AR" smtClean="0"/>
-              <a:t>14/3/2022</a:t>
+              <a:t>16/3/2022</a:t>
             </a:fld>
             <a:endParaRPr lang="es-AR"/>
           </a:p>
@@ -4634,6 +4694,18 @@
   <p:clrMapOvr>
     <a:masterClrMapping/>
   </p:clrMapOvr>
+  <mc:AlternateContent xmlns:mc="http://schemas.openxmlformats.org/markup-compatibility/2006">
+    <mc:Choice xmlns:p159="http://schemas.microsoft.com/office/powerpoint/2015/09/main" Requires="p159">
+      <p:transition xmlns:p14="http://schemas.microsoft.com/office/powerpoint/2010/main" spd="slow" p14:dur="2000">
+        <p159:morph option="byObject"/>
+      </p:transition>
+    </mc:Choice>
+    <mc:Fallback>
+      <p:transition spd="slow">
+        <p:fade/>
+      </p:transition>
+    </mc:Fallback>
+  </mc:AlternateContent>
 </p:sldLayout>
 </file>
 
@@ -4979,7 +5051,7 @@
           <a:p>
             <a:fld id="{C3E5AAC7-6B59-49B4-9290-4C0B6A91FBE1}" type="datetimeFigureOut">
               <a:rPr lang="es-AR" smtClean="0"/>
-              <a:t>14/3/2022</a:t>
+              <a:t>16/3/2022</a:t>
             </a:fld>
             <a:endParaRPr lang="es-AR"/>
           </a:p>
@@ -5049,6 +5121,18 @@
   <p:clrMapOvr>
     <a:masterClrMapping/>
   </p:clrMapOvr>
+  <mc:AlternateContent xmlns:mc="http://schemas.openxmlformats.org/markup-compatibility/2006">
+    <mc:Choice xmlns:p159="http://schemas.microsoft.com/office/powerpoint/2015/09/main" Requires="p159">
+      <p:transition xmlns:p14="http://schemas.microsoft.com/office/powerpoint/2010/main" spd="slow" p14:dur="2000">
+        <p159:morph option="byObject"/>
+      </p:transition>
+    </mc:Choice>
+    <mc:Fallback>
+      <p:transition spd="slow">
+        <p:fade/>
+      </p:transition>
+    </mc:Fallback>
+  </mc:AlternateContent>
 </p:sldLayout>
 </file>
 
@@ -5121,7 +5205,7 @@
           <a:p>
             <a:fld id="{C3E5AAC7-6B59-49B4-9290-4C0B6A91FBE1}" type="datetimeFigureOut">
               <a:rPr lang="es-AR" smtClean="0"/>
-              <a:t>14/3/2022</a:t>
+              <a:t>16/3/2022</a:t>
             </a:fld>
             <a:endParaRPr lang="es-AR"/>
           </a:p>
@@ -5191,6 +5275,18 @@
   <p:clrMapOvr>
     <a:masterClrMapping/>
   </p:clrMapOvr>
+  <mc:AlternateContent xmlns:mc="http://schemas.openxmlformats.org/markup-compatibility/2006">
+    <mc:Choice xmlns:p159="http://schemas.microsoft.com/office/powerpoint/2015/09/main" Requires="p159">
+      <p:transition xmlns:p14="http://schemas.microsoft.com/office/powerpoint/2010/main" spd="slow" p14:dur="2000">
+        <p159:morph option="byObject"/>
+      </p:transition>
+    </mc:Choice>
+    <mc:Fallback>
+      <p:transition spd="slow">
+        <p:fade/>
+      </p:transition>
+    </mc:Fallback>
+  </mc:AlternateContent>
 </p:sldLayout>
 </file>
 
@@ -5234,7 +5330,7 @@
           <a:p>
             <a:fld id="{C3E5AAC7-6B59-49B4-9290-4C0B6A91FBE1}" type="datetimeFigureOut">
               <a:rPr lang="es-AR" smtClean="0"/>
-              <a:t>14/3/2022</a:t>
+              <a:t>16/3/2022</a:t>
             </a:fld>
             <a:endParaRPr lang="es-AR"/>
           </a:p>
@@ -5304,6 +5400,18 @@
   <p:clrMapOvr>
     <a:masterClrMapping/>
   </p:clrMapOvr>
+  <mc:AlternateContent xmlns:mc="http://schemas.openxmlformats.org/markup-compatibility/2006">
+    <mc:Choice xmlns:p159="http://schemas.microsoft.com/office/powerpoint/2015/09/main" Requires="p159">
+      <p:transition xmlns:p14="http://schemas.microsoft.com/office/powerpoint/2010/main" spd="slow" p14:dur="2000">
+        <p159:morph option="byObject"/>
+      </p:transition>
+    </mc:Choice>
+    <mc:Fallback>
+      <p:transition spd="slow">
+        <p:fade/>
+      </p:transition>
+    </mc:Fallback>
+  </mc:AlternateContent>
 </p:sldLayout>
 </file>
 
@@ -5547,7 +5655,7 @@
           <a:p>
             <a:fld id="{C3E5AAC7-6B59-49B4-9290-4C0B6A91FBE1}" type="datetimeFigureOut">
               <a:rPr lang="es-AR" smtClean="0"/>
-              <a:t>14/3/2022</a:t>
+              <a:t>16/3/2022</a:t>
             </a:fld>
             <a:endParaRPr lang="es-AR"/>
           </a:p>
@@ -5617,6 +5725,18 @@
   <p:clrMapOvr>
     <a:masterClrMapping/>
   </p:clrMapOvr>
+  <mc:AlternateContent xmlns:mc="http://schemas.openxmlformats.org/markup-compatibility/2006">
+    <mc:Choice xmlns:p159="http://schemas.microsoft.com/office/powerpoint/2015/09/main" Requires="p159">
+      <p:transition xmlns:p14="http://schemas.microsoft.com/office/powerpoint/2010/main" spd="slow" p14:dur="2000">
+        <p159:morph option="byObject"/>
+      </p:transition>
+    </mc:Choice>
+    <mc:Fallback>
+      <p:transition spd="slow">
+        <p:fade/>
+      </p:transition>
+    </mc:Fallback>
+  </mc:AlternateContent>
 </p:sldLayout>
 </file>
 
@@ -5836,7 +5956,7 @@
           <a:p>
             <a:fld id="{C3E5AAC7-6B59-49B4-9290-4C0B6A91FBE1}" type="datetimeFigureOut">
               <a:rPr lang="es-AR" smtClean="0"/>
-              <a:t>14/3/2022</a:t>
+              <a:t>16/3/2022</a:t>
             </a:fld>
             <a:endParaRPr lang="es-AR"/>
           </a:p>
@@ -5906,6 +6026,18 @@
   <p:clrMapOvr>
     <a:masterClrMapping/>
   </p:clrMapOvr>
+  <mc:AlternateContent xmlns:mc="http://schemas.openxmlformats.org/markup-compatibility/2006">
+    <mc:Choice xmlns:p159="http://schemas.microsoft.com/office/powerpoint/2015/09/main" Requires="p159">
+      <p:transition xmlns:p14="http://schemas.microsoft.com/office/powerpoint/2010/main" spd="slow" p14:dur="2000">
+        <p159:morph option="byObject"/>
+      </p:transition>
+    </mc:Choice>
+    <mc:Fallback>
+      <p:transition spd="slow">
+        <p:fade/>
+      </p:transition>
+    </mc:Fallback>
+  </mc:AlternateContent>
 </p:sldLayout>
 </file>
 
@@ -6082,7 +6214,7 @@
           <a:p>
             <a:fld id="{C3E5AAC7-6B59-49B4-9290-4C0B6A91FBE1}" type="datetimeFigureOut">
               <a:rPr lang="es-AR" smtClean="0"/>
-              <a:t>14/3/2022</a:t>
+              <a:t>16/3/2022</a:t>
             </a:fld>
             <a:endParaRPr lang="es-AR"/>
           </a:p>
@@ -6199,6 +6331,18 @@
     <p:sldLayoutId id="2147483658" r:id="rId10"/>
     <p:sldLayoutId id="2147483659" r:id="rId11"/>
   </p:sldLayoutIdLst>
+  <mc:AlternateContent xmlns:mc="http://schemas.openxmlformats.org/markup-compatibility/2006">
+    <mc:Choice xmlns:p159="http://schemas.microsoft.com/office/powerpoint/2015/09/main" Requires="p159">
+      <p:transition xmlns:p14="http://schemas.microsoft.com/office/powerpoint/2010/main" spd="slow" p14:dur="2000">
+        <p159:morph option="byObject"/>
+      </p:transition>
+    </mc:Choice>
+    <mc:Fallback>
+      <p:transition spd="slow">
+        <p:fade/>
+      </p:transition>
+    </mc:Fallback>
+  </mc:AlternateContent>
   <p:txStyles>
     <p:titleStyle>
       <a:lvl1pPr algn="l" defTabSz="914400" rtl="0" eaLnBrk="1" latinLnBrk="0" hangingPunct="1">
@@ -6609,12 +6753,16 @@
   <p:clrMapOvr>
     <a:masterClrMapping/>
   </p:clrMapOvr>
-  <mc:AlternateContent xmlns:mc="http://schemas.openxmlformats.org/markup-compatibility/2006" xmlns:p14="http://schemas.microsoft.com/office/powerpoint/2010/main">
-    <mc:Choice Requires="p14">
-      <p:transition p14:dur="10"/>
+  <mc:AlternateContent xmlns:mc="http://schemas.openxmlformats.org/markup-compatibility/2006">
+    <mc:Choice xmlns:p159="http://schemas.microsoft.com/office/powerpoint/2015/09/main" Requires="p159">
+      <p:transition xmlns:p14="http://schemas.microsoft.com/office/powerpoint/2010/main" spd="slow" p14:dur="2000">
+        <p159:morph option="byObject"/>
+      </p:transition>
     </mc:Choice>
-    <mc:Fallback xmlns="">
-      <p:transition/>
+    <mc:Fallback>
+      <p:transition spd="slow">
+        <p:fade/>
+      </p:transition>
     </mc:Fallback>
   </mc:AlternateContent>
   <p:timing>
@@ -7752,7 +7900,7 @@
                   </a:schemeClr>
                 </a:solidFill>
               </a:rPr>
-              <a:t>Préstamo: 		booleano</a:t>
+              <a:t>Préstamo: 		entero</a:t>
             </a:r>
           </a:p>
         </p:txBody>
@@ -7771,7 +7919,7 @@
         </p:nvSpPr>
         <p:spPr>
           <a:xfrm>
-            <a:off x="7163628" y="3499490"/>
+            <a:off x="7239828" y="3499490"/>
             <a:ext cx="3704095" cy="674274"/>
           </a:xfrm>
           <a:prstGeom prst="rect">
@@ -7934,7 +8082,7 @@
                   </a:schemeClr>
                 </a:solidFill>
               </a:rPr>
-              <a:t>Préstamo: 		booleano</a:t>
+              <a:t>Préstamo: 		entero</a:t>
             </a:r>
           </a:p>
         </p:txBody>
@@ -8210,6 +8358,18 @@
   <p:clrMapOvr>
     <a:masterClrMapping/>
   </p:clrMapOvr>
+  <mc:AlternateContent xmlns:mc="http://schemas.openxmlformats.org/markup-compatibility/2006">
+    <mc:Choice xmlns:p159="http://schemas.microsoft.com/office/powerpoint/2015/09/main" Requires="p159">
+      <p:transition xmlns:p14="http://schemas.microsoft.com/office/powerpoint/2010/main" spd="slow" p14:dur="2000">
+        <p159:morph option="byObject"/>
+      </p:transition>
+    </mc:Choice>
+    <mc:Fallback>
+      <p:transition spd="slow">
+        <p:fade/>
+      </p:transition>
+    </mc:Fallback>
+  </mc:AlternateContent>
   <p:timing>
     <p:tnLst>
       <p:par>
@@ -8464,6 +8624,164 @@
                       </p:childTnLst>
                     </p:cTn>
                   </p:par>
+                  <p:par>
+                    <p:cTn id="25" fill="hold">
+                      <p:stCondLst>
+                        <p:cond delay="indefinite"/>
+                      </p:stCondLst>
+                      <p:childTnLst>
+                        <p:par>
+                          <p:cTn id="26" fill="hold">
+                            <p:stCondLst>
+                              <p:cond delay="0"/>
+                            </p:stCondLst>
+                            <p:childTnLst>
+                              <p:par>
+                                <p:cTn id="27" presetID="10" presetClass="entr" presetSubtype="0" fill="hold" grpId="0" nodeType="clickEffect">
+                                  <p:stCondLst>
+                                    <p:cond delay="0"/>
+                                  </p:stCondLst>
+                                  <p:childTnLst>
+                                    <p:set>
+                                      <p:cBhvr>
+                                        <p:cTn id="28" dur="1" fill="hold">
+                                          <p:stCondLst>
+                                            <p:cond delay="0"/>
+                                          </p:stCondLst>
+                                        </p:cTn>
+                                        <p:tgtEl>
+                                          <p:spTgt spid="105"/>
+                                        </p:tgtEl>
+                                        <p:attrNameLst>
+                                          <p:attrName>style.visibility</p:attrName>
+                                        </p:attrNameLst>
+                                      </p:cBhvr>
+                                      <p:to>
+                                        <p:strVal val="visible"/>
+                                      </p:to>
+                                    </p:set>
+                                    <p:animEffect transition="in" filter="fade">
+                                      <p:cBhvr>
+                                        <p:cTn id="29" dur="500"/>
+                                        <p:tgtEl>
+                                          <p:spTgt spid="105"/>
+                                        </p:tgtEl>
+                                      </p:cBhvr>
+                                    </p:animEffect>
+                                  </p:childTnLst>
+                                </p:cTn>
+                              </p:par>
+                              <p:par>
+                                <p:cTn id="30" presetID="10" presetClass="entr" presetSubtype="0" fill="hold" grpId="0" nodeType="withEffect">
+                                  <p:stCondLst>
+                                    <p:cond delay="0"/>
+                                  </p:stCondLst>
+                                  <p:childTnLst>
+                                    <p:set>
+                                      <p:cBhvr>
+                                        <p:cTn id="31" dur="1" fill="hold">
+                                          <p:stCondLst>
+                                            <p:cond delay="0"/>
+                                          </p:stCondLst>
+                                        </p:cTn>
+                                        <p:tgtEl>
+                                          <p:spTgt spid="104"/>
+                                        </p:tgtEl>
+                                        <p:attrNameLst>
+                                          <p:attrName>style.visibility</p:attrName>
+                                        </p:attrNameLst>
+                                      </p:cBhvr>
+                                      <p:to>
+                                        <p:strVal val="visible"/>
+                                      </p:to>
+                                    </p:set>
+                                    <p:animEffect transition="in" filter="fade">
+                                      <p:cBhvr>
+                                        <p:cTn id="32" dur="500"/>
+                                        <p:tgtEl>
+                                          <p:spTgt spid="104"/>
+                                        </p:tgtEl>
+                                      </p:cBhvr>
+                                    </p:animEffect>
+                                  </p:childTnLst>
+                                </p:cTn>
+                              </p:par>
+                              <p:par>
+                                <p:cTn id="33" presetID="10" presetClass="entr" presetSubtype="0" fill="hold" grpId="0" nodeType="withEffect">
+                                  <p:stCondLst>
+                                    <p:cond delay="0"/>
+                                  </p:stCondLst>
+                                  <p:childTnLst>
+                                    <p:set>
+                                      <p:cBhvr>
+                                        <p:cTn id="34" dur="1" fill="hold">
+                                          <p:stCondLst>
+                                            <p:cond delay="0"/>
+                                          </p:stCondLst>
+                                        </p:cTn>
+                                        <p:tgtEl>
+                                          <p:spTgt spid="106"/>
+                                        </p:tgtEl>
+                                        <p:attrNameLst>
+                                          <p:attrName>style.visibility</p:attrName>
+                                        </p:attrNameLst>
+                                      </p:cBhvr>
+                                      <p:to>
+                                        <p:strVal val="visible"/>
+                                      </p:to>
+                                    </p:set>
+                                    <p:animEffect transition="in" filter="fade">
+                                      <p:cBhvr>
+                                        <p:cTn id="35" dur="500"/>
+                                        <p:tgtEl>
+                                          <p:spTgt spid="106"/>
+                                        </p:tgtEl>
+                                      </p:cBhvr>
+                                    </p:animEffect>
+                                  </p:childTnLst>
+                                </p:cTn>
+                              </p:par>
+                              <p:par>
+                                <p:cTn id="36" presetID="10" presetClass="entr" presetSubtype="0" fill="hold" grpId="0" nodeType="withEffect">
+                                  <p:stCondLst>
+                                    <p:cond delay="0"/>
+                                  </p:stCondLst>
+                                  <p:childTnLst>
+                                    <p:set>
+                                      <p:cBhvr>
+                                        <p:cTn id="37" dur="1" fill="hold">
+                                          <p:stCondLst>
+                                            <p:cond delay="0"/>
+                                          </p:stCondLst>
+                                        </p:cTn>
+                                        <p:tgtEl>
+                                          <p:spTgt spid="107"/>
+                                        </p:tgtEl>
+                                        <p:attrNameLst>
+                                          <p:attrName>style.visibility</p:attrName>
+                                        </p:attrNameLst>
+                                      </p:cBhvr>
+                                      <p:to>
+                                        <p:strVal val="visible"/>
+                                      </p:to>
+                                    </p:set>
+                                    <p:animEffect transition="in" filter="fade">
+                                      <p:cBhvr>
+                                        <p:cTn id="38" dur="500"/>
+                                        <p:tgtEl>
+                                          <p:spTgt spid="107"/>
+                                        </p:tgtEl>
+                                      </p:cBhvr>
+                                    </p:animEffect>
+                                  </p:childTnLst>
+                                </p:cTn>
+                              </p:par>
+                            </p:childTnLst>
+                          </p:cTn>
+                        </p:par>
+                      </p:childTnLst>
+                    </p:cTn>
+                  </p:par>
                 </p:childTnLst>
               </p:cTn>
               <p:prevCondLst>
@@ -8490,6 +8808,10 @@
       <p:bldP spid="94" grpId="0"/>
       <p:bldP spid="102" grpId="0" animBg="1"/>
       <p:bldP spid="103" grpId="0" animBg="1"/>
+      <p:bldP spid="104" grpId="0"/>
+      <p:bldP spid="105" grpId="0"/>
+      <p:bldP spid="106" grpId="0"/>
+      <p:bldP spid="107" grpId="0"/>
     </p:bldLst>
   </p:timing>
 </p:sld>
@@ -8534,7 +8856,7 @@
         </p:blipFill>
         <p:spPr>
           <a:xfrm>
-            <a:off x="1376990" y="2208780"/>
+            <a:off x="1376990" y="2253720"/>
             <a:ext cx="4719010" cy="2149496"/>
           </a:xfrm>
           <a:prstGeom prst="rect">
@@ -8667,7 +8989,7 @@
         </p:nvSpPr>
         <p:spPr>
           <a:xfrm>
-            <a:off x="8269247" y="1950291"/>
+            <a:off x="8269247" y="1995231"/>
             <a:ext cx="2194691" cy="674274"/>
           </a:xfrm>
           <a:prstGeom prst="rect">
@@ -8726,7 +9048,7 @@
               <p14:nvPr/>
             </p14:nvContentPartPr>
             <p14:xfrm>
-              <a:off x="5645280" y="2285100"/>
+              <a:off x="5645280" y="2330040"/>
               <a:ext cx="2327040" cy="1548360"/>
             </p14:xfrm>
           </p:contentPart>
@@ -8752,7 +9074,7 @@
             </p:blipFill>
             <p:spPr>
               <a:xfrm>
-                <a:off x="5627280" y="2267100"/>
+                <a:off x="5627280" y="2312040"/>
                 <a:ext cx="2362680" cy="1584000"/>
               </a:xfrm>
               <a:prstGeom prst="rect">
@@ -8777,7 +9099,7 @@
               <p14:nvPr/>
             </p14:nvContentPartPr>
             <p14:xfrm>
-              <a:off x="7877640" y="2192940"/>
+              <a:off x="7877640" y="2237880"/>
               <a:ext cx="108360" cy="236880"/>
             </p14:xfrm>
           </p:contentPart>
@@ -8803,8 +9125,8 @@
             </p:blipFill>
             <p:spPr>
               <a:xfrm>
-                <a:off x="7859640" y="2174940"/>
-                <a:ext cx="144000" cy="272520"/>
+                <a:off x="7859640" y="2219907"/>
+                <a:ext cx="144000" cy="272466"/>
               </a:xfrm>
               <a:prstGeom prst="rect">
                 <a:avLst/>
@@ -9026,6 +9348,18 @@
   <p:clrMapOvr>
     <a:masterClrMapping/>
   </p:clrMapOvr>
+  <mc:AlternateContent xmlns:mc="http://schemas.openxmlformats.org/markup-compatibility/2006">
+    <mc:Choice xmlns:p159="http://schemas.microsoft.com/office/powerpoint/2015/09/main" Requires="p159">
+      <p:transition xmlns:p14="http://schemas.microsoft.com/office/powerpoint/2010/main" spd="slow" p14:dur="2000">
+        <p159:morph option="byObject"/>
+      </p:transition>
+    </mc:Choice>
+    <mc:Fallback>
+      <p:transition spd="slow">
+        <p:fade/>
+      </p:transition>
+    </mc:Fallback>
+  </mc:AlternateContent>
   <p:timing>
     <p:tnLst>
       <p:par>
@@ -9047,7 +9381,7 @@
                             </p:stCondLst>
                             <p:childTnLst>
                               <p:par>
-                                <p:cTn id="5" presetID="10" presetClass="entr" presetSubtype="0" fill="hold" grpId="0" nodeType="clickEffect">
+                                <p:cTn id="5" presetID="10" presetClass="entr" presetSubtype="0" fill="hold" nodeType="clickEffect">
                                   <p:stCondLst>
                                     <p:cond delay="0"/>
                                   </p:stCondLst>
@@ -9055,6 +9389,164 @@
                                     <p:set>
                                       <p:cBhvr>
                                         <p:cTn id="6" dur="1" fill="hold">
+                                          <p:stCondLst>
+                                            <p:cond delay="0"/>
+                                          </p:stCondLst>
+                                        </p:cTn>
+                                        <p:tgtEl>
+                                          <p:spTgt spid="17"/>
+                                        </p:tgtEl>
+                                        <p:attrNameLst>
+                                          <p:attrName>style.visibility</p:attrName>
+                                        </p:attrNameLst>
+                                      </p:cBhvr>
+                                      <p:to>
+                                        <p:strVal val="visible"/>
+                                      </p:to>
+                                    </p:set>
+                                    <p:animEffect transition="in" filter="fade">
+                                      <p:cBhvr>
+                                        <p:cTn id="7" dur="500"/>
+                                        <p:tgtEl>
+                                          <p:spTgt spid="17"/>
+                                        </p:tgtEl>
+                                      </p:cBhvr>
+                                    </p:animEffect>
+                                  </p:childTnLst>
+                                </p:cTn>
+                              </p:par>
+                            </p:childTnLst>
+                          </p:cTn>
+                        </p:par>
+                      </p:childTnLst>
+                    </p:cTn>
+                  </p:par>
+                  <p:par>
+                    <p:cTn id="8" fill="hold">
+                      <p:stCondLst>
+                        <p:cond delay="indefinite"/>
+                      </p:stCondLst>
+                      <p:childTnLst>
+                        <p:par>
+                          <p:cTn id="9" fill="hold">
+                            <p:stCondLst>
+                              <p:cond delay="0"/>
+                            </p:stCondLst>
+                            <p:childTnLst>
+                              <p:par>
+                                <p:cTn id="10" presetID="10" presetClass="entr" presetSubtype="0" fill="hold" grpId="0" nodeType="clickEffect">
+                                  <p:stCondLst>
+                                    <p:cond delay="0"/>
+                                  </p:stCondLst>
+                                  <p:childTnLst>
+                                    <p:set>
+                                      <p:cBhvr>
+                                        <p:cTn id="11" dur="1" fill="hold">
+                                          <p:stCondLst>
+                                            <p:cond delay="0"/>
+                                          </p:stCondLst>
+                                        </p:cTn>
+                                        <p:tgtEl>
+                                          <p:spTgt spid="67"/>
+                                        </p:tgtEl>
+                                        <p:attrNameLst>
+                                          <p:attrName>style.visibility</p:attrName>
+                                        </p:attrNameLst>
+                                      </p:cBhvr>
+                                      <p:to>
+                                        <p:strVal val="visible"/>
+                                      </p:to>
+                                    </p:set>
+                                    <p:animEffect transition="in" filter="fade">
+                                      <p:cBhvr>
+                                        <p:cTn id="12" dur="500"/>
+                                        <p:tgtEl>
+                                          <p:spTgt spid="67"/>
+                                        </p:tgtEl>
+                                      </p:cBhvr>
+                                    </p:animEffect>
+                                  </p:childTnLst>
+                                </p:cTn>
+                              </p:par>
+                              <p:par>
+                                <p:cTn id="13" presetID="10" presetClass="entr" presetSubtype="0" fill="hold" nodeType="withEffect">
+                                  <p:stCondLst>
+                                    <p:cond delay="0"/>
+                                  </p:stCondLst>
+                                  <p:childTnLst>
+                                    <p:set>
+                                      <p:cBhvr>
+                                        <p:cTn id="14" dur="1" fill="hold">
+                                          <p:stCondLst>
+                                            <p:cond delay="0"/>
+                                          </p:stCondLst>
+                                        </p:cTn>
+                                        <p:tgtEl>
+                                          <p:spTgt spid="96"/>
+                                        </p:tgtEl>
+                                        <p:attrNameLst>
+                                          <p:attrName>style.visibility</p:attrName>
+                                        </p:attrNameLst>
+                                      </p:cBhvr>
+                                      <p:to>
+                                        <p:strVal val="visible"/>
+                                      </p:to>
+                                    </p:set>
+                                    <p:animEffect transition="in" filter="fade">
+                                      <p:cBhvr>
+                                        <p:cTn id="15" dur="500"/>
+                                        <p:tgtEl>
+                                          <p:spTgt spid="96"/>
+                                        </p:tgtEl>
+                                      </p:cBhvr>
+                                    </p:animEffect>
+                                  </p:childTnLst>
+                                </p:cTn>
+                              </p:par>
+                              <p:par>
+                                <p:cTn id="16" presetID="10" presetClass="entr" presetSubtype="0" fill="hold" nodeType="withEffect">
+                                  <p:stCondLst>
+                                    <p:cond delay="0"/>
+                                  </p:stCondLst>
+                                  <p:childTnLst>
+                                    <p:set>
+                                      <p:cBhvr>
+                                        <p:cTn id="17" dur="1" fill="hold">
+                                          <p:stCondLst>
+                                            <p:cond delay="0"/>
+                                          </p:stCondLst>
+                                        </p:cTn>
+                                        <p:tgtEl>
+                                          <p:spTgt spid="99"/>
+                                        </p:tgtEl>
+                                        <p:attrNameLst>
+                                          <p:attrName>style.visibility</p:attrName>
+                                        </p:attrNameLst>
+                                      </p:cBhvr>
+                                      <p:to>
+                                        <p:strVal val="visible"/>
+                                      </p:to>
+                                    </p:set>
+                                    <p:animEffect transition="in" filter="fade">
+                                      <p:cBhvr>
+                                        <p:cTn id="18" dur="500"/>
+                                        <p:tgtEl>
+                                          <p:spTgt spid="99"/>
+                                        </p:tgtEl>
+                                      </p:cBhvr>
+                                    </p:animEffect>
+                                  </p:childTnLst>
+                                </p:cTn>
+                              </p:par>
+                              <p:par>
+                                <p:cTn id="19" presetID="10" presetClass="entr" presetSubtype="0" fill="hold" grpId="0" nodeType="withEffect">
+                                  <p:stCondLst>
+                                    <p:cond delay="0"/>
+                                  </p:stCondLst>
+                                  <p:childTnLst>
+                                    <p:set>
+                                      <p:cBhvr>
+                                        <p:cTn id="20" dur="1" fill="hold">
                                           <p:stCondLst>
                                             <p:cond delay="0"/>
                                           </p:stCondLst>
@@ -9072,44 +9564,9 @@
                                     </p:set>
                                     <p:animEffect transition="in" filter="fade">
                                       <p:cBhvr>
-                                        <p:cTn id="7" dur="500"/>
+                                        <p:cTn id="21" dur="500"/>
                                         <p:tgtEl>
                                           <p:spTgt spid="66"/>
-                                        </p:tgtEl>
-                                      </p:cBhvr>
-                                    </p:animEffect>
-                                  </p:childTnLst>
-                                </p:cTn>
-                              </p:par>
-                              <p:par>
-                                <p:cTn id="8" presetID="10" presetClass="entr" presetSubtype="0" fill="hold" grpId="0" nodeType="withEffect">
-                                  <p:stCondLst>
-                                    <p:cond delay="0"/>
-                                  </p:stCondLst>
-                                  <p:childTnLst>
-                                    <p:set>
-                                      <p:cBhvr>
-                                        <p:cTn id="9" dur="1" fill="hold">
-                                          <p:stCondLst>
-                                            <p:cond delay="0"/>
-                                          </p:stCondLst>
-                                        </p:cTn>
-                                        <p:tgtEl>
-                                          <p:spTgt spid="67"/>
-                                        </p:tgtEl>
-                                        <p:attrNameLst>
-                                          <p:attrName>style.visibility</p:attrName>
-                                        </p:attrNameLst>
-                                      </p:cBhvr>
-                                      <p:to>
-                                        <p:strVal val="visible"/>
-                                      </p:to>
-                                    </p:set>
-                                    <p:animEffect transition="in" filter="fade">
-                                      <p:cBhvr>
-                                        <p:cTn id="10" dur="500"/>
-                                        <p:tgtEl>
-                                          <p:spTgt spid="67"/>
                                         </p:tgtEl>
                                       </p:cBhvr>
                                     </p:animEffect>
@@ -10332,7 +10789,7 @@
                   </a:schemeClr>
                 </a:solidFill>
               </a:rPr>
-              <a:t>booleano</a:t>
+              <a:t>entero</a:t>
             </a:r>
           </a:p>
         </p:txBody>
@@ -10569,7 +11026,7 @@
                   </a:schemeClr>
                 </a:solidFill>
               </a:rPr>
-              <a:t>Cantidad: 	</a:t>
+              <a:t>Existencias: 	</a:t>
             </a:r>
             <a:r>
               <a:rPr lang="es-AR" sz="2000" i="1" dirty="0">
@@ -10628,7 +11085,7 @@
                   </a:schemeClr>
                 </a:solidFill>
               </a:rPr>
-              <a:t>booleano</a:t>
+              <a:t>entero</a:t>
             </a:r>
           </a:p>
         </p:txBody>
@@ -10701,6 +11158,18 @@
   <p:clrMapOvr>
     <a:masterClrMapping/>
   </p:clrMapOvr>
+  <mc:AlternateContent xmlns:mc="http://schemas.openxmlformats.org/markup-compatibility/2006">
+    <mc:Choice xmlns:p159="http://schemas.microsoft.com/office/powerpoint/2015/09/main" Requires="p159">
+      <p:transition xmlns:p14="http://schemas.microsoft.com/office/powerpoint/2010/main" spd="slow" p14:dur="2000">
+        <p159:morph option="byObject"/>
+      </p:transition>
+    </mc:Choice>
+    <mc:Fallback>
+      <p:transition spd="slow">
+        <p:fade/>
+      </p:transition>
+    </mc:Fallback>
+  </mc:AlternateContent>
   <p:timing>
     <p:tnLst>
       <p:par>
@@ -10955,6 +11424,164 @@
                       </p:childTnLst>
                     </p:cTn>
                   </p:par>
+                  <p:par>
+                    <p:cTn id="25" fill="hold">
+                      <p:stCondLst>
+                        <p:cond delay="indefinite"/>
+                      </p:stCondLst>
+                      <p:childTnLst>
+                        <p:par>
+                          <p:cTn id="26" fill="hold">
+                            <p:stCondLst>
+                              <p:cond delay="0"/>
+                            </p:stCondLst>
+                            <p:childTnLst>
+                              <p:par>
+                                <p:cTn id="27" presetID="10" presetClass="entr" presetSubtype="0" fill="hold" grpId="0" nodeType="clickEffect">
+                                  <p:stCondLst>
+                                    <p:cond delay="0"/>
+                                  </p:stCondLst>
+                                  <p:childTnLst>
+                                    <p:set>
+                                      <p:cBhvr>
+                                        <p:cTn id="28" dur="1" fill="hold">
+                                          <p:stCondLst>
+                                            <p:cond delay="0"/>
+                                          </p:stCondLst>
+                                        </p:cTn>
+                                        <p:tgtEl>
+                                          <p:spTgt spid="30"/>
+                                        </p:tgtEl>
+                                        <p:attrNameLst>
+                                          <p:attrName>style.visibility</p:attrName>
+                                        </p:attrNameLst>
+                                      </p:cBhvr>
+                                      <p:to>
+                                        <p:strVal val="visible"/>
+                                      </p:to>
+                                    </p:set>
+                                    <p:animEffect transition="in" filter="fade">
+                                      <p:cBhvr>
+                                        <p:cTn id="29" dur="500"/>
+                                        <p:tgtEl>
+                                          <p:spTgt spid="30"/>
+                                        </p:tgtEl>
+                                      </p:cBhvr>
+                                    </p:animEffect>
+                                  </p:childTnLst>
+                                </p:cTn>
+                              </p:par>
+                              <p:par>
+                                <p:cTn id="30" presetID="10" presetClass="entr" presetSubtype="0" fill="hold" grpId="0" nodeType="withEffect">
+                                  <p:stCondLst>
+                                    <p:cond delay="0"/>
+                                  </p:stCondLst>
+                                  <p:childTnLst>
+                                    <p:set>
+                                      <p:cBhvr>
+                                        <p:cTn id="31" dur="1" fill="hold">
+                                          <p:stCondLst>
+                                            <p:cond delay="0"/>
+                                          </p:stCondLst>
+                                        </p:cTn>
+                                        <p:tgtEl>
+                                          <p:spTgt spid="29"/>
+                                        </p:tgtEl>
+                                        <p:attrNameLst>
+                                          <p:attrName>style.visibility</p:attrName>
+                                        </p:attrNameLst>
+                                      </p:cBhvr>
+                                      <p:to>
+                                        <p:strVal val="visible"/>
+                                      </p:to>
+                                    </p:set>
+                                    <p:animEffect transition="in" filter="fade">
+                                      <p:cBhvr>
+                                        <p:cTn id="32" dur="500"/>
+                                        <p:tgtEl>
+                                          <p:spTgt spid="29"/>
+                                        </p:tgtEl>
+                                      </p:cBhvr>
+                                    </p:animEffect>
+                                  </p:childTnLst>
+                                </p:cTn>
+                              </p:par>
+                              <p:par>
+                                <p:cTn id="33" presetID="10" presetClass="entr" presetSubtype="0" fill="hold" grpId="0" nodeType="withEffect">
+                                  <p:stCondLst>
+                                    <p:cond delay="0"/>
+                                  </p:stCondLst>
+                                  <p:childTnLst>
+                                    <p:set>
+                                      <p:cBhvr>
+                                        <p:cTn id="34" dur="1" fill="hold">
+                                          <p:stCondLst>
+                                            <p:cond delay="0"/>
+                                          </p:stCondLst>
+                                        </p:cTn>
+                                        <p:tgtEl>
+                                          <p:spTgt spid="31"/>
+                                        </p:tgtEl>
+                                        <p:attrNameLst>
+                                          <p:attrName>style.visibility</p:attrName>
+                                        </p:attrNameLst>
+                                      </p:cBhvr>
+                                      <p:to>
+                                        <p:strVal val="visible"/>
+                                      </p:to>
+                                    </p:set>
+                                    <p:animEffect transition="in" filter="fade">
+                                      <p:cBhvr>
+                                        <p:cTn id="35" dur="500"/>
+                                        <p:tgtEl>
+                                          <p:spTgt spid="31"/>
+                                        </p:tgtEl>
+                                      </p:cBhvr>
+                                    </p:animEffect>
+                                  </p:childTnLst>
+                                </p:cTn>
+                              </p:par>
+                              <p:par>
+                                <p:cTn id="36" presetID="10" presetClass="entr" presetSubtype="0" fill="hold" grpId="0" nodeType="withEffect">
+                                  <p:stCondLst>
+                                    <p:cond delay="0"/>
+                                  </p:stCondLst>
+                                  <p:childTnLst>
+                                    <p:set>
+                                      <p:cBhvr>
+                                        <p:cTn id="37" dur="1" fill="hold">
+                                          <p:stCondLst>
+                                            <p:cond delay="0"/>
+                                          </p:stCondLst>
+                                        </p:cTn>
+                                        <p:tgtEl>
+                                          <p:spTgt spid="32"/>
+                                        </p:tgtEl>
+                                        <p:attrNameLst>
+                                          <p:attrName>style.visibility</p:attrName>
+                                        </p:attrNameLst>
+                                      </p:cBhvr>
+                                      <p:to>
+                                        <p:strVal val="visible"/>
+                                      </p:to>
+                                    </p:set>
+                                    <p:animEffect transition="in" filter="fade">
+                                      <p:cBhvr>
+                                        <p:cTn id="38" dur="500"/>
+                                        <p:tgtEl>
+                                          <p:spTgt spid="32"/>
+                                        </p:tgtEl>
+                                      </p:cBhvr>
+                                    </p:animEffect>
+                                  </p:childTnLst>
+                                </p:cTn>
+                              </p:par>
+                            </p:childTnLst>
+                          </p:cTn>
+                        </p:par>
+                      </p:childTnLst>
+                    </p:cTn>
+                  </p:par>
                 </p:childTnLst>
               </p:cTn>
               <p:prevCondLst>
@@ -10981,6 +11608,10 @@
       <p:bldP spid="24" grpId="0"/>
       <p:bldP spid="27" grpId="0" animBg="1"/>
       <p:bldP spid="28" grpId="0" animBg="1"/>
+      <p:bldP spid="29" grpId="0"/>
+      <p:bldP spid="30" grpId="0"/>
+      <p:bldP spid="31" grpId="0"/>
+      <p:bldP spid="32" grpId="0"/>
     </p:bldLst>
   </p:timing>
 </p:sld>
@@ -11202,8 +11833,8 @@
           </a:p>
         </p:txBody>
       </p:sp>
-      <mc:AlternateContent xmlns:mc="http://schemas.openxmlformats.org/markup-compatibility/2006">
-        <mc:Choice xmlns:p14="http://schemas.microsoft.com/office/powerpoint/2010/main" Requires="p14">
+      <mc:AlternateContent xmlns:mc="http://schemas.openxmlformats.org/markup-compatibility/2006" xmlns:p14="http://schemas.microsoft.com/office/powerpoint/2010/main">
+        <mc:Choice Requires="p14">
           <p:contentPart p14:bwMode="auto" r:id="rId3">
             <p14:nvContentPartPr>
               <p14:cNvPr id="96" name="Entrada de lápiz 95">
@@ -11222,7 +11853,7 @@
             </p14:xfrm>
           </p:contentPart>
         </mc:Choice>
-        <mc:Fallback>
+        <mc:Fallback xmlns="">
           <p:pic>
             <p:nvPicPr>
               <p:cNvPr id="96" name="Entrada de lápiz 95">
@@ -11253,8 +11884,8 @@
           </p:pic>
         </mc:Fallback>
       </mc:AlternateContent>
-      <mc:AlternateContent xmlns:mc="http://schemas.openxmlformats.org/markup-compatibility/2006">
-        <mc:Choice xmlns:p14="http://schemas.microsoft.com/office/powerpoint/2010/main" Requires="p14">
+      <mc:AlternateContent xmlns:mc="http://schemas.openxmlformats.org/markup-compatibility/2006" xmlns:p14="http://schemas.microsoft.com/office/powerpoint/2010/main">
+        <mc:Choice Requires="p14">
           <p:contentPart p14:bwMode="auto" r:id="rId5">
             <p14:nvContentPartPr>
               <p14:cNvPr id="99" name="Entrada de lápiz 98">
@@ -11273,7 +11904,7 @@
             </p14:xfrm>
           </p:contentPart>
         </mc:Choice>
-        <mc:Fallback>
+        <mc:Fallback xmlns="">
           <p:pic>
             <p:nvPicPr>
               <p:cNvPr id="99" name="Entrada de lápiz 98">
@@ -11517,6 +12148,18 @@
   <p:clrMapOvr>
     <a:masterClrMapping/>
   </p:clrMapOvr>
+  <mc:AlternateContent xmlns:mc="http://schemas.openxmlformats.org/markup-compatibility/2006">
+    <mc:Choice xmlns:p159="http://schemas.microsoft.com/office/powerpoint/2015/09/main" Requires="p159">
+      <p:transition xmlns:p14="http://schemas.microsoft.com/office/powerpoint/2010/main" spd="slow" p14:dur="2000">
+        <p159:morph option="byObject"/>
+      </p:transition>
+    </mc:Choice>
+    <mc:Fallback>
+      <p:transition spd="slow">
+        <p:fade/>
+      </p:transition>
+    </mc:Fallback>
+  </mc:AlternateContent>
   <p:timing>
     <p:tnLst>
       <p:par>
@@ -11538,7 +12181,7 @@
                             </p:stCondLst>
                             <p:childTnLst>
                               <p:par>
-                                <p:cTn id="5" presetID="10" presetClass="entr" presetSubtype="0" fill="hold" grpId="0" nodeType="clickEffect">
+                                <p:cTn id="5" presetID="10" presetClass="entr" presetSubtype="0" fill="hold" nodeType="clickEffect">
                                   <p:stCondLst>
                                     <p:cond delay="0"/>
                                   </p:stCondLst>
@@ -11546,6 +12189,164 @@
                                     <p:set>
                                       <p:cBhvr>
                                         <p:cTn id="6" dur="1" fill="hold">
+                                          <p:stCondLst>
+                                            <p:cond delay="0"/>
+                                          </p:stCondLst>
+                                        </p:cTn>
+                                        <p:tgtEl>
+                                          <p:spTgt spid="20"/>
+                                        </p:tgtEl>
+                                        <p:attrNameLst>
+                                          <p:attrName>style.visibility</p:attrName>
+                                        </p:attrNameLst>
+                                      </p:cBhvr>
+                                      <p:to>
+                                        <p:strVal val="visible"/>
+                                      </p:to>
+                                    </p:set>
+                                    <p:animEffect transition="in" filter="fade">
+                                      <p:cBhvr>
+                                        <p:cTn id="7" dur="500"/>
+                                        <p:tgtEl>
+                                          <p:spTgt spid="20"/>
+                                        </p:tgtEl>
+                                      </p:cBhvr>
+                                    </p:animEffect>
+                                  </p:childTnLst>
+                                </p:cTn>
+                              </p:par>
+                            </p:childTnLst>
+                          </p:cTn>
+                        </p:par>
+                      </p:childTnLst>
+                    </p:cTn>
+                  </p:par>
+                  <p:par>
+                    <p:cTn id="8" fill="hold">
+                      <p:stCondLst>
+                        <p:cond delay="indefinite"/>
+                      </p:stCondLst>
+                      <p:childTnLst>
+                        <p:par>
+                          <p:cTn id="9" fill="hold">
+                            <p:stCondLst>
+                              <p:cond delay="0"/>
+                            </p:stCondLst>
+                            <p:childTnLst>
+                              <p:par>
+                                <p:cTn id="10" presetID="10" presetClass="entr" presetSubtype="0" fill="hold" grpId="0" nodeType="clickEffect">
+                                  <p:stCondLst>
+                                    <p:cond delay="0"/>
+                                  </p:stCondLst>
+                                  <p:childTnLst>
+                                    <p:set>
+                                      <p:cBhvr>
+                                        <p:cTn id="11" dur="1" fill="hold">
+                                          <p:stCondLst>
+                                            <p:cond delay="0"/>
+                                          </p:stCondLst>
+                                        </p:cTn>
+                                        <p:tgtEl>
+                                          <p:spTgt spid="67"/>
+                                        </p:tgtEl>
+                                        <p:attrNameLst>
+                                          <p:attrName>style.visibility</p:attrName>
+                                        </p:attrNameLst>
+                                      </p:cBhvr>
+                                      <p:to>
+                                        <p:strVal val="visible"/>
+                                      </p:to>
+                                    </p:set>
+                                    <p:animEffect transition="in" filter="fade">
+                                      <p:cBhvr>
+                                        <p:cTn id="12" dur="500"/>
+                                        <p:tgtEl>
+                                          <p:spTgt spid="67"/>
+                                        </p:tgtEl>
+                                      </p:cBhvr>
+                                    </p:animEffect>
+                                  </p:childTnLst>
+                                </p:cTn>
+                              </p:par>
+                              <p:par>
+                                <p:cTn id="13" presetID="10" presetClass="entr" presetSubtype="0" fill="hold" nodeType="withEffect">
+                                  <p:stCondLst>
+                                    <p:cond delay="0"/>
+                                  </p:stCondLst>
+                                  <p:childTnLst>
+                                    <p:set>
+                                      <p:cBhvr>
+                                        <p:cTn id="14" dur="1" fill="hold">
+                                          <p:stCondLst>
+                                            <p:cond delay="0"/>
+                                          </p:stCondLst>
+                                        </p:cTn>
+                                        <p:tgtEl>
+                                          <p:spTgt spid="96"/>
+                                        </p:tgtEl>
+                                        <p:attrNameLst>
+                                          <p:attrName>style.visibility</p:attrName>
+                                        </p:attrNameLst>
+                                      </p:cBhvr>
+                                      <p:to>
+                                        <p:strVal val="visible"/>
+                                      </p:to>
+                                    </p:set>
+                                    <p:animEffect transition="in" filter="fade">
+                                      <p:cBhvr>
+                                        <p:cTn id="15" dur="500"/>
+                                        <p:tgtEl>
+                                          <p:spTgt spid="96"/>
+                                        </p:tgtEl>
+                                      </p:cBhvr>
+                                    </p:animEffect>
+                                  </p:childTnLst>
+                                </p:cTn>
+                              </p:par>
+                              <p:par>
+                                <p:cTn id="16" presetID="10" presetClass="entr" presetSubtype="0" fill="hold" nodeType="withEffect">
+                                  <p:stCondLst>
+                                    <p:cond delay="0"/>
+                                  </p:stCondLst>
+                                  <p:childTnLst>
+                                    <p:set>
+                                      <p:cBhvr>
+                                        <p:cTn id="17" dur="1" fill="hold">
+                                          <p:stCondLst>
+                                            <p:cond delay="0"/>
+                                          </p:stCondLst>
+                                        </p:cTn>
+                                        <p:tgtEl>
+                                          <p:spTgt spid="99"/>
+                                        </p:tgtEl>
+                                        <p:attrNameLst>
+                                          <p:attrName>style.visibility</p:attrName>
+                                        </p:attrNameLst>
+                                      </p:cBhvr>
+                                      <p:to>
+                                        <p:strVal val="visible"/>
+                                      </p:to>
+                                    </p:set>
+                                    <p:animEffect transition="in" filter="fade">
+                                      <p:cBhvr>
+                                        <p:cTn id="18" dur="500"/>
+                                        <p:tgtEl>
+                                          <p:spTgt spid="99"/>
+                                        </p:tgtEl>
+                                      </p:cBhvr>
+                                    </p:animEffect>
+                                  </p:childTnLst>
+                                </p:cTn>
+                              </p:par>
+                              <p:par>
+                                <p:cTn id="19" presetID="10" presetClass="entr" presetSubtype="0" fill="hold" grpId="0" nodeType="withEffect">
+                                  <p:stCondLst>
+                                    <p:cond delay="0"/>
+                                  </p:stCondLst>
+                                  <p:childTnLst>
+                                    <p:set>
+                                      <p:cBhvr>
+                                        <p:cTn id="20" dur="1" fill="hold">
                                           <p:stCondLst>
                                             <p:cond delay="0"/>
                                           </p:stCondLst>
@@ -11563,44 +12364,9 @@
                                     </p:set>
                                     <p:animEffect transition="in" filter="fade">
                                       <p:cBhvr>
-                                        <p:cTn id="7" dur="500"/>
+                                        <p:cTn id="21" dur="500"/>
                                         <p:tgtEl>
                                           <p:spTgt spid="66"/>
-                                        </p:tgtEl>
-                                      </p:cBhvr>
-                                    </p:animEffect>
-                                  </p:childTnLst>
-                                </p:cTn>
-                              </p:par>
-                              <p:par>
-                                <p:cTn id="8" presetID="10" presetClass="entr" presetSubtype="0" fill="hold" grpId="0" nodeType="withEffect">
-                                  <p:stCondLst>
-                                    <p:cond delay="0"/>
-                                  </p:stCondLst>
-                                  <p:childTnLst>
-                                    <p:set>
-                                      <p:cBhvr>
-                                        <p:cTn id="9" dur="1" fill="hold">
-                                          <p:stCondLst>
-                                            <p:cond delay="0"/>
-                                          </p:stCondLst>
-                                        </p:cTn>
-                                        <p:tgtEl>
-                                          <p:spTgt spid="67"/>
-                                        </p:tgtEl>
-                                        <p:attrNameLst>
-                                          <p:attrName>style.visibility</p:attrName>
-                                        </p:attrNameLst>
-                                      </p:cBhvr>
-                                      <p:to>
-                                        <p:strVal val="visible"/>
-                                      </p:to>
-                                    </p:set>
-                                    <p:animEffect transition="in" filter="fade">
-                                      <p:cBhvr>
-                                        <p:cTn id="10" dur="500"/>
-                                        <p:tgtEl>
-                                          <p:spTgt spid="67"/>
                                         </p:tgtEl>
                                       </p:cBhvr>
                                     </p:animEffect>
@@ -13465,6 +14231,18 @@
   <p:clrMapOvr>
     <a:masterClrMapping/>
   </p:clrMapOvr>
+  <mc:AlternateContent xmlns:mc="http://schemas.openxmlformats.org/markup-compatibility/2006">
+    <mc:Choice xmlns:p159="http://schemas.microsoft.com/office/powerpoint/2015/09/main" Requires="p159">
+      <p:transition xmlns:p14="http://schemas.microsoft.com/office/powerpoint/2010/main" spd="slow" p14:dur="2000">
+        <p159:morph option="byObject"/>
+      </p:transition>
+    </mc:Choice>
+    <mc:Fallback>
+      <p:transition spd="slow">
+        <p:fade/>
+      </p:transition>
+    </mc:Fallback>
+  </mc:AlternateContent>
   <p:timing>
     <p:tnLst>
       <p:par>
@@ -13719,6 +14497,164 @@
                       </p:childTnLst>
                     </p:cTn>
                   </p:par>
+                  <p:par>
+                    <p:cTn id="25" fill="hold">
+                      <p:stCondLst>
+                        <p:cond delay="indefinite"/>
+                      </p:stCondLst>
+                      <p:childTnLst>
+                        <p:par>
+                          <p:cTn id="26" fill="hold">
+                            <p:stCondLst>
+                              <p:cond delay="0"/>
+                            </p:stCondLst>
+                            <p:childTnLst>
+                              <p:par>
+                                <p:cTn id="27" presetID="10" presetClass="entr" presetSubtype="0" fill="hold" grpId="0" nodeType="clickEffect">
+                                  <p:stCondLst>
+                                    <p:cond delay="0"/>
+                                  </p:stCondLst>
+                                  <p:childTnLst>
+                                    <p:set>
+                                      <p:cBhvr>
+                                        <p:cTn id="28" dur="1" fill="hold">
+                                          <p:stCondLst>
+                                            <p:cond delay="0"/>
+                                          </p:stCondLst>
+                                        </p:cTn>
+                                        <p:tgtEl>
+                                          <p:spTgt spid="14"/>
+                                        </p:tgtEl>
+                                        <p:attrNameLst>
+                                          <p:attrName>style.visibility</p:attrName>
+                                        </p:attrNameLst>
+                                      </p:cBhvr>
+                                      <p:to>
+                                        <p:strVal val="visible"/>
+                                      </p:to>
+                                    </p:set>
+                                    <p:animEffect transition="in" filter="fade">
+                                      <p:cBhvr>
+                                        <p:cTn id="29" dur="500"/>
+                                        <p:tgtEl>
+                                          <p:spTgt spid="14"/>
+                                        </p:tgtEl>
+                                      </p:cBhvr>
+                                    </p:animEffect>
+                                  </p:childTnLst>
+                                </p:cTn>
+                              </p:par>
+                              <p:par>
+                                <p:cTn id="30" presetID="10" presetClass="entr" presetSubtype="0" fill="hold" grpId="0" nodeType="withEffect">
+                                  <p:stCondLst>
+                                    <p:cond delay="0"/>
+                                  </p:stCondLst>
+                                  <p:childTnLst>
+                                    <p:set>
+                                      <p:cBhvr>
+                                        <p:cTn id="31" dur="1" fill="hold">
+                                          <p:stCondLst>
+                                            <p:cond delay="0"/>
+                                          </p:stCondLst>
+                                        </p:cTn>
+                                        <p:tgtEl>
+                                          <p:spTgt spid="15"/>
+                                        </p:tgtEl>
+                                        <p:attrNameLst>
+                                          <p:attrName>style.visibility</p:attrName>
+                                        </p:attrNameLst>
+                                      </p:cBhvr>
+                                      <p:to>
+                                        <p:strVal val="visible"/>
+                                      </p:to>
+                                    </p:set>
+                                    <p:animEffect transition="in" filter="fade">
+                                      <p:cBhvr>
+                                        <p:cTn id="32" dur="500"/>
+                                        <p:tgtEl>
+                                          <p:spTgt spid="15"/>
+                                        </p:tgtEl>
+                                      </p:cBhvr>
+                                    </p:animEffect>
+                                  </p:childTnLst>
+                                </p:cTn>
+                              </p:par>
+                              <p:par>
+                                <p:cTn id="33" presetID="10" presetClass="entr" presetSubtype="0" fill="hold" grpId="0" nodeType="withEffect">
+                                  <p:stCondLst>
+                                    <p:cond delay="0"/>
+                                  </p:stCondLst>
+                                  <p:childTnLst>
+                                    <p:set>
+                                      <p:cBhvr>
+                                        <p:cTn id="34" dur="1" fill="hold">
+                                          <p:stCondLst>
+                                            <p:cond delay="0"/>
+                                          </p:stCondLst>
+                                        </p:cTn>
+                                        <p:tgtEl>
+                                          <p:spTgt spid="18"/>
+                                        </p:tgtEl>
+                                        <p:attrNameLst>
+                                          <p:attrName>style.visibility</p:attrName>
+                                        </p:attrNameLst>
+                                      </p:cBhvr>
+                                      <p:to>
+                                        <p:strVal val="visible"/>
+                                      </p:to>
+                                    </p:set>
+                                    <p:animEffect transition="in" filter="fade">
+                                      <p:cBhvr>
+                                        <p:cTn id="35" dur="500"/>
+                                        <p:tgtEl>
+                                          <p:spTgt spid="18"/>
+                                        </p:tgtEl>
+                                      </p:cBhvr>
+                                    </p:animEffect>
+                                  </p:childTnLst>
+                                </p:cTn>
+                              </p:par>
+                              <p:par>
+                                <p:cTn id="36" presetID="10" presetClass="entr" presetSubtype="0" fill="hold" grpId="0" nodeType="withEffect">
+                                  <p:stCondLst>
+                                    <p:cond delay="0"/>
+                                  </p:stCondLst>
+                                  <p:childTnLst>
+                                    <p:set>
+                                      <p:cBhvr>
+                                        <p:cTn id="37" dur="1" fill="hold">
+                                          <p:stCondLst>
+                                            <p:cond delay="0"/>
+                                          </p:stCondLst>
+                                        </p:cTn>
+                                        <p:tgtEl>
+                                          <p:spTgt spid="16"/>
+                                        </p:tgtEl>
+                                        <p:attrNameLst>
+                                          <p:attrName>style.visibility</p:attrName>
+                                        </p:attrNameLst>
+                                      </p:cBhvr>
+                                      <p:to>
+                                        <p:strVal val="visible"/>
+                                      </p:to>
+                                    </p:set>
+                                    <p:animEffect transition="in" filter="fade">
+                                      <p:cBhvr>
+                                        <p:cTn id="38" dur="500"/>
+                                        <p:tgtEl>
+                                          <p:spTgt spid="16"/>
+                                        </p:tgtEl>
+                                      </p:cBhvr>
+                                    </p:animEffect>
+                                  </p:childTnLst>
+                                </p:cTn>
+                              </p:par>
+                            </p:childTnLst>
+                          </p:cTn>
+                        </p:par>
+                      </p:childTnLst>
+                    </p:cTn>
+                  </p:par>
                 </p:childTnLst>
               </p:cTn>
               <p:prevCondLst>
@@ -13745,6 +14681,10 @@
       <p:bldP spid="9" grpId="0"/>
       <p:bldP spid="12" grpId="0" animBg="1"/>
       <p:bldP spid="13" grpId="0" animBg="1"/>
+      <p:bldP spid="14" grpId="0"/>
+      <p:bldP spid="15" grpId="0"/>
+      <p:bldP spid="16" grpId="0"/>
+      <p:bldP spid="18" grpId="0"/>
     </p:bldLst>
   </p:timing>
 </p:sld>
@@ -14122,12 +15062,16 @@
   <p:clrMapOvr>
     <a:masterClrMapping/>
   </p:clrMapOvr>
-  <mc:AlternateContent xmlns:mc="http://schemas.openxmlformats.org/markup-compatibility/2006" xmlns:p14="http://schemas.microsoft.com/office/powerpoint/2010/main">
-    <mc:Choice Requires="p14">
-      <p:transition p14:dur="10"/>
+  <mc:AlternateContent xmlns:mc="http://schemas.openxmlformats.org/markup-compatibility/2006">
+    <mc:Choice xmlns:p159="http://schemas.microsoft.com/office/powerpoint/2015/09/main" Requires="p159">
+      <p:transition xmlns:p14="http://schemas.microsoft.com/office/powerpoint/2010/main" spd="slow" p14:dur="2000">
+        <p159:morph option="byObject"/>
+      </p:transition>
     </mc:Choice>
-    <mc:Fallback xmlns="">
-      <p:transition/>
+    <mc:Fallback>
+      <p:transition spd="slow">
+        <p:fade/>
+      </p:transition>
     </mc:Fallback>
   </mc:AlternateContent>
   <p:timing>
@@ -14768,12 +15712,16 @@
   <p:clrMapOvr>
     <a:masterClrMapping/>
   </p:clrMapOvr>
-  <mc:AlternateContent xmlns:mc="http://schemas.openxmlformats.org/markup-compatibility/2006" xmlns:p14="http://schemas.microsoft.com/office/powerpoint/2010/main">
-    <mc:Choice Requires="p14">
-      <p:transition p14:dur="10"/>
+  <mc:AlternateContent xmlns:mc="http://schemas.openxmlformats.org/markup-compatibility/2006">
+    <mc:Choice xmlns:p159="http://schemas.microsoft.com/office/powerpoint/2015/09/main" Requires="p159">
+      <p:transition xmlns:p14="http://schemas.microsoft.com/office/powerpoint/2010/main" spd="slow" p14:dur="2000">
+        <p159:morph option="byObject"/>
+      </p:transition>
     </mc:Choice>
-    <mc:Fallback xmlns="">
-      <p:transition/>
+    <mc:Fallback>
+      <p:transition spd="slow">
+        <p:fade/>
+      </p:transition>
     </mc:Fallback>
   </mc:AlternateContent>
   <p:timing>
@@ -14989,12 +15937,16 @@
   <p:clrMapOvr>
     <a:masterClrMapping/>
   </p:clrMapOvr>
-  <mc:AlternateContent xmlns:mc="http://schemas.openxmlformats.org/markup-compatibility/2006" xmlns:p14="http://schemas.microsoft.com/office/powerpoint/2010/main">
-    <mc:Choice Requires="p14">
-      <p:transition p14:dur="10"/>
+  <mc:AlternateContent xmlns:mc="http://schemas.openxmlformats.org/markup-compatibility/2006">
+    <mc:Choice xmlns:p159="http://schemas.microsoft.com/office/powerpoint/2015/09/main" Requires="p159">
+      <p:transition xmlns:p14="http://schemas.microsoft.com/office/powerpoint/2010/main" spd="slow" p14:dur="2000">
+        <p159:morph option="byObject"/>
+      </p:transition>
     </mc:Choice>
-    <mc:Fallback xmlns="">
-      <p:transition/>
+    <mc:Fallback>
+      <p:transition spd="slow">
+        <p:fade/>
+      </p:transition>
     </mc:Fallback>
   </mc:AlternateContent>
   <p:timing>
@@ -15889,12 +16841,16 @@
   <p:clrMapOvr>
     <a:masterClrMapping/>
   </p:clrMapOvr>
-  <mc:AlternateContent xmlns:mc="http://schemas.openxmlformats.org/markup-compatibility/2006" xmlns:p14="http://schemas.microsoft.com/office/powerpoint/2010/main">
-    <mc:Choice Requires="p14">
-      <p:transition p14:dur="10"/>
+  <mc:AlternateContent xmlns:mc="http://schemas.openxmlformats.org/markup-compatibility/2006">
+    <mc:Choice xmlns:p159="http://schemas.microsoft.com/office/powerpoint/2015/09/main" Requires="p159">
+      <p:transition xmlns:p14="http://schemas.microsoft.com/office/powerpoint/2010/main" spd="slow" p14:dur="2000">
+        <p159:morph option="byObject"/>
+      </p:transition>
     </mc:Choice>
-    <mc:Fallback xmlns="">
-      <p:transition/>
+    <mc:Fallback>
+      <p:transition spd="slow">
+        <p:fade/>
+      </p:transition>
     </mc:Fallback>
   </mc:AlternateContent>
   <p:timing>
@@ -17441,12 +18397,16 @@
   <p:clrMapOvr>
     <a:masterClrMapping/>
   </p:clrMapOvr>
-  <mc:AlternateContent xmlns:mc="http://schemas.openxmlformats.org/markup-compatibility/2006" xmlns:p14="http://schemas.microsoft.com/office/powerpoint/2010/main">
-    <mc:Choice Requires="p14">
-      <p:transition p14:dur="10"/>
+  <mc:AlternateContent xmlns:mc="http://schemas.openxmlformats.org/markup-compatibility/2006">
+    <mc:Choice xmlns:p159="http://schemas.microsoft.com/office/powerpoint/2015/09/main" Requires="p159">
+      <p:transition xmlns:p14="http://schemas.microsoft.com/office/powerpoint/2010/main" spd="slow" p14:dur="2000">
+        <p159:morph option="byObject"/>
+      </p:transition>
     </mc:Choice>
-    <mc:Fallback xmlns="">
-      <p:transition/>
+    <mc:Fallback>
+      <p:transition spd="slow">
+        <p:fade/>
+      </p:transition>
     </mc:Fallback>
   </mc:AlternateContent>
   <p:timing>
@@ -18055,12 +19015,16 @@
   <p:clrMapOvr>
     <a:masterClrMapping/>
   </p:clrMapOvr>
-  <mc:AlternateContent xmlns:mc="http://schemas.openxmlformats.org/markup-compatibility/2006" xmlns:p14="http://schemas.microsoft.com/office/powerpoint/2010/main">
-    <mc:Choice Requires="p14">
-      <p:transition p14:dur="10"/>
+  <mc:AlternateContent xmlns:mc="http://schemas.openxmlformats.org/markup-compatibility/2006">
+    <mc:Choice xmlns:p159="http://schemas.microsoft.com/office/powerpoint/2015/09/main" Requires="p159">
+      <p:transition xmlns:p14="http://schemas.microsoft.com/office/powerpoint/2010/main" spd="slow" p14:dur="2000">
+        <p159:morph option="byObject"/>
+      </p:transition>
     </mc:Choice>
-    <mc:Fallback xmlns="">
-      <p:transition/>
+    <mc:Fallback>
+      <p:transition spd="slow">
+        <p:fade/>
+      </p:transition>
     </mc:Fallback>
   </mc:AlternateContent>
   <p:timing>
@@ -18423,7 +19387,7 @@
           <p:nvPr/>
         </p:nvPicPr>
         <p:blipFill rotWithShape="1">
-          <a:blip r:embed="rId3"/>
+          <a:blip r:embed="rId2"/>
           <a:srcRect l="-369" r="59119" b="63811"/>
           <a:stretch/>
         </p:blipFill>
@@ -18457,9 +19421,9 @@
             <a:chExt cx="1877400" cy="781920"/>
           </a:xfrm>
         </p:grpSpPr>
-        <mc:AlternateContent xmlns:mc="http://schemas.openxmlformats.org/markup-compatibility/2006">
-          <mc:Choice xmlns:p14="http://schemas.microsoft.com/office/powerpoint/2010/main" Requires="p14">
-            <p:contentPart p14:bwMode="auto" r:id="rId4">
+        <mc:AlternateContent xmlns:mc="http://schemas.openxmlformats.org/markup-compatibility/2006" xmlns:p14="http://schemas.microsoft.com/office/powerpoint/2010/main">
+          <mc:Choice Requires="p14">
+            <p:contentPart p14:bwMode="auto" r:id="rId3">
               <p14:nvContentPartPr>
                 <p14:cNvPr id="2101" name="Entrada de lápiz 2100">
                   <a:extLst>
@@ -18477,7 +19441,7 @@
               </p14:xfrm>
             </p:contentPart>
           </mc:Choice>
-          <mc:Fallback>
+          <mc:Fallback xmlns="">
             <p:pic>
               <p:nvPicPr>
                 <p:cNvPr id="2101" name="Entrada de lápiz 2100">
@@ -18508,8 +19472,8 @@
             </p:pic>
           </mc:Fallback>
         </mc:AlternateContent>
-        <mc:AlternateContent xmlns:mc="http://schemas.openxmlformats.org/markup-compatibility/2006">
-          <mc:Choice xmlns:p14="http://schemas.microsoft.com/office/powerpoint/2010/main" Requires="p14">
+        <mc:AlternateContent xmlns:mc="http://schemas.openxmlformats.org/markup-compatibility/2006" xmlns:p14="http://schemas.microsoft.com/office/powerpoint/2010/main">
+          <mc:Choice Requires="p14">
             <p:contentPart p14:bwMode="auto" r:id="rId6">
               <p14:nvContentPartPr>
                 <p14:cNvPr id="2102" name="Entrada de lápiz 2101">
@@ -18528,7 +19492,7 @@
               </p14:xfrm>
             </p:contentPart>
           </mc:Choice>
-          <mc:Fallback>
+          <mc:Fallback xmlns="">
             <p:pic>
               <p:nvPicPr>
                 <p:cNvPr id="2102" name="Entrada de lápiz 2101">
@@ -18559,8 +19523,8 @@
             </p:pic>
           </mc:Fallback>
         </mc:AlternateContent>
-        <mc:AlternateContent xmlns:mc="http://schemas.openxmlformats.org/markup-compatibility/2006">
-          <mc:Choice xmlns:p14="http://schemas.microsoft.com/office/powerpoint/2010/main" Requires="p14">
+        <mc:AlternateContent xmlns:mc="http://schemas.openxmlformats.org/markup-compatibility/2006" xmlns:p14="http://schemas.microsoft.com/office/powerpoint/2010/main">
+          <mc:Choice Requires="p14">
             <p:contentPart p14:bwMode="auto" r:id="rId8">
               <p14:nvContentPartPr>
                 <p14:cNvPr id="2103" name="Entrada de lápiz 2102">
@@ -18579,7 +19543,7 @@
               </p14:xfrm>
             </p:contentPart>
           </mc:Choice>
-          <mc:Fallback>
+          <mc:Fallback xmlns="">
             <p:pic>
               <p:nvPicPr>
                 <p:cNvPr id="2103" name="Entrada de lápiz 2102">
@@ -18610,8 +19574,8 @@
             </p:pic>
           </mc:Fallback>
         </mc:AlternateContent>
-        <mc:AlternateContent xmlns:mc="http://schemas.openxmlformats.org/markup-compatibility/2006">
-          <mc:Choice xmlns:p14="http://schemas.microsoft.com/office/powerpoint/2010/main" Requires="p14">
+        <mc:AlternateContent xmlns:mc="http://schemas.openxmlformats.org/markup-compatibility/2006" xmlns:p14="http://schemas.microsoft.com/office/powerpoint/2010/main">
+          <mc:Choice Requires="p14">
             <p:contentPart p14:bwMode="auto" r:id="rId10">
               <p14:nvContentPartPr>
                 <p14:cNvPr id="2105" name="Entrada de lápiz 2104">
@@ -18630,7 +19594,7 @@
               </p14:xfrm>
             </p:contentPart>
           </mc:Choice>
-          <mc:Fallback>
+          <mc:Fallback xmlns="">
             <p:pic>
               <p:nvPicPr>
                 <p:cNvPr id="2105" name="Entrada de lápiz 2104">
@@ -18661,8 +19625,8 @@
             </p:pic>
           </mc:Fallback>
         </mc:AlternateContent>
-        <mc:AlternateContent xmlns:mc="http://schemas.openxmlformats.org/markup-compatibility/2006">
-          <mc:Choice xmlns:p14="http://schemas.microsoft.com/office/powerpoint/2010/main" Requires="p14">
+        <mc:AlternateContent xmlns:mc="http://schemas.openxmlformats.org/markup-compatibility/2006" xmlns:p14="http://schemas.microsoft.com/office/powerpoint/2010/main">
+          <mc:Choice Requires="p14">
             <p:contentPart p14:bwMode="auto" r:id="rId12">
               <p14:nvContentPartPr>
                 <p14:cNvPr id="2106" name="Entrada de lápiz 2105">
@@ -18681,7 +19645,7 @@
               </p14:xfrm>
             </p:contentPart>
           </mc:Choice>
-          <mc:Fallback>
+          <mc:Fallback xmlns="">
             <p:pic>
               <p:nvPicPr>
                 <p:cNvPr id="2106" name="Entrada de lápiz 2105">
@@ -18712,8 +19676,8 @@
             </p:pic>
           </mc:Fallback>
         </mc:AlternateContent>
-        <mc:AlternateContent xmlns:mc="http://schemas.openxmlformats.org/markup-compatibility/2006">
-          <mc:Choice xmlns:p14="http://schemas.microsoft.com/office/powerpoint/2010/main" Requires="p14">
+        <mc:AlternateContent xmlns:mc="http://schemas.openxmlformats.org/markup-compatibility/2006" xmlns:p14="http://schemas.microsoft.com/office/powerpoint/2010/main">
+          <mc:Choice Requires="p14">
             <p:contentPart p14:bwMode="auto" r:id="rId14">
               <p14:nvContentPartPr>
                 <p14:cNvPr id="2107" name="Entrada de lápiz 2106">
@@ -18732,7 +19696,7 @@
               </p14:xfrm>
             </p:contentPart>
           </mc:Choice>
-          <mc:Fallback>
+          <mc:Fallback xmlns="">
             <p:pic>
               <p:nvPicPr>
                 <p:cNvPr id="2107" name="Entrada de lápiz 2106">
@@ -18763,8 +19727,8 @@
             </p:pic>
           </mc:Fallback>
         </mc:AlternateContent>
-        <mc:AlternateContent xmlns:mc="http://schemas.openxmlformats.org/markup-compatibility/2006">
-          <mc:Choice xmlns:p14="http://schemas.microsoft.com/office/powerpoint/2010/main" Requires="p14">
+        <mc:AlternateContent xmlns:mc="http://schemas.openxmlformats.org/markup-compatibility/2006" xmlns:p14="http://schemas.microsoft.com/office/powerpoint/2010/main">
+          <mc:Choice Requires="p14">
             <p:contentPart p14:bwMode="auto" r:id="rId16">
               <p14:nvContentPartPr>
                 <p14:cNvPr id="2108" name="Entrada de lápiz 2107">
@@ -18783,7 +19747,7 @@
               </p14:xfrm>
             </p:contentPart>
           </mc:Choice>
-          <mc:Fallback>
+          <mc:Fallback xmlns="">
             <p:pic>
               <p:nvPicPr>
                 <p:cNvPr id="2108" name="Entrada de lápiz 2107">
@@ -18814,8 +19778,8 @@
             </p:pic>
           </mc:Fallback>
         </mc:AlternateContent>
-        <mc:AlternateContent xmlns:mc="http://schemas.openxmlformats.org/markup-compatibility/2006">
-          <mc:Choice xmlns:p14="http://schemas.microsoft.com/office/powerpoint/2010/main" Requires="p14">
+        <mc:AlternateContent xmlns:mc="http://schemas.openxmlformats.org/markup-compatibility/2006" xmlns:p14="http://schemas.microsoft.com/office/powerpoint/2010/main">
+          <mc:Choice Requires="p14">
             <p:contentPart p14:bwMode="auto" r:id="rId18">
               <p14:nvContentPartPr>
                 <p14:cNvPr id="2109" name="Entrada de lápiz 2108">
@@ -18834,7 +19798,7 @@
               </p14:xfrm>
             </p:contentPart>
           </mc:Choice>
-          <mc:Fallback>
+          <mc:Fallback xmlns="">
             <p:pic>
               <p:nvPicPr>
                 <p:cNvPr id="2109" name="Entrada de lápiz 2108">
@@ -18865,8 +19829,8 @@
             </p:pic>
           </mc:Fallback>
         </mc:AlternateContent>
-        <mc:AlternateContent xmlns:mc="http://schemas.openxmlformats.org/markup-compatibility/2006">
-          <mc:Choice xmlns:p14="http://schemas.microsoft.com/office/powerpoint/2010/main" Requires="p14">
+        <mc:AlternateContent xmlns:mc="http://schemas.openxmlformats.org/markup-compatibility/2006" xmlns:p14="http://schemas.microsoft.com/office/powerpoint/2010/main">
+          <mc:Choice Requires="p14">
             <p:contentPart p14:bwMode="auto" r:id="rId20">
               <p14:nvContentPartPr>
                 <p14:cNvPr id="2110" name="Entrada de lápiz 2109">
@@ -18885,7 +19849,7 @@
               </p14:xfrm>
             </p:contentPart>
           </mc:Choice>
-          <mc:Fallback>
+          <mc:Fallback xmlns="">
             <p:pic>
               <p:nvPicPr>
                 <p:cNvPr id="2110" name="Entrada de lápiz 2109">
@@ -18916,8 +19880,8 @@
             </p:pic>
           </mc:Fallback>
         </mc:AlternateContent>
-        <mc:AlternateContent xmlns:mc="http://schemas.openxmlformats.org/markup-compatibility/2006">
-          <mc:Choice xmlns:p14="http://schemas.microsoft.com/office/powerpoint/2010/main" Requires="p14">
+        <mc:AlternateContent xmlns:mc="http://schemas.openxmlformats.org/markup-compatibility/2006" xmlns:p14="http://schemas.microsoft.com/office/powerpoint/2010/main">
+          <mc:Choice Requires="p14">
             <p:contentPart p14:bwMode="auto" r:id="rId22">
               <p14:nvContentPartPr>
                 <p14:cNvPr id="2111" name="Entrada de lápiz 2110">
@@ -18936,7 +19900,7 @@
               </p14:xfrm>
             </p:contentPart>
           </mc:Choice>
-          <mc:Fallback>
+          <mc:Fallback xmlns="">
             <p:pic>
               <p:nvPicPr>
                 <p:cNvPr id="2111" name="Entrada de lápiz 2110">
@@ -18967,8 +19931,8 @@
             </p:pic>
           </mc:Fallback>
         </mc:AlternateContent>
-        <mc:AlternateContent xmlns:mc="http://schemas.openxmlformats.org/markup-compatibility/2006">
-          <mc:Choice xmlns:p14="http://schemas.microsoft.com/office/powerpoint/2010/main" Requires="p14">
+        <mc:AlternateContent xmlns:mc="http://schemas.openxmlformats.org/markup-compatibility/2006" xmlns:p14="http://schemas.microsoft.com/office/powerpoint/2010/main">
+          <mc:Choice Requires="p14">
             <p:contentPart p14:bwMode="auto" r:id="rId24">
               <p14:nvContentPartPr>
                 <p14:cNvPr id="2112" name="Entrada de lápiz 2111">
@@ -18987,7 +19951,7 @@
               </p14:xfrm>
             </p:contentPart>
           </mc:Choice>
-          <mc:Fallback>
+          <mc:Fallback xmlns="">
             <p:pic>
               <p:nvPicPr>
                 <p:cNvPr id="2112" name="Entrada de lápiz 2111">
@@ -19018,8 +19982,8 @@
             </p:pic>
           </mc:Fallback>
         </mc:AlternateContent>
-        <mc:AlternateContent xmlns:mc="http://schemas.openxmlformats.org/markup-compatibility/2006">
-          <mc:Choice xmlns:p14="http://schemas.microsoft.com/office/powerpoint/2010/main" Requires="p14">
+        <mc:AlternateContent xmlns:mc="http://schemas.openxmlformats.org/markup-compatibility/2006" xmlns:p14="http://schemas.microsoft.com/office/powerpoint/2010/main">
+          <mc:Choice Requires="p14">
             <p:contentPart p14:bwMode="auto" r:id="rId26">
               <p14:nvContentPartPr>
                 <p14:cNvPr id="2113" name="Entrada de lápiz 2112">
@@ -19038,7 +20002,7 @@
               </p14:xfrm>
             </p:contentPart>
           </mc:Choice>
-          <mc:Fallback>
+          <mc:Fallback xmlns="">
             <p:pic>
               <p:nvPicPr>
                 <p:cNvPr id="2113" name="Entrada de lápiz 2112">
@@ -19069,8 +20033,8 @@
             </p:pic>
           </mc:Fallback>
         </mc:AlternateContent>
-        <mc:AlternateContent xmlns:mc="http://schemas.openxmlformats.org/markup-compatibility/2006">
-          <mc:Choice xmlns:p14="http://schemas.microsoft.com/office/powerpoint/2010/main" Requires="p14">
+        <mc:AlternateContent xmlns:mc="http://schemas.openxmlformats.org/markup-compatibility/2006" xmlns:p14="http://schemas.microsoft.com/office/powerpoint/2010/main">
+          <mc:Choice Requires="p14">
             <p:contentPart p14:bwMode="auto" r:id="rId28">
               <p14:nvContentPartPr>
                 <p14:cNvPr id="2114" name="Entrada de lápiz 2113">
@@ -19089,7 +20053,7 @@
               </p14:xfrm>
             </p:contentPart>
           </mc:Choice>
-          <mc:Fallback>
+          <mc:Fallback xmlns="">
             <p:pic>
               <p:nvPicPr>
                 <p:cNvPr id="2114" name="Entrada de lápiz 2113">
@@ -19120,8 +20084,8 @@
             </p:pic>
           </mc:Fallback>
         </mc:AlternateContent>
-        <mc:AlternateContent xmlns:mc="http://schemas.openxmlformats.org/markup-compatibility/2006">
-          <mc:Choice xmlns:p14="http://schemas.microsoft.com/office/powerpoint/2010/main" Requires="p14">
+        <mc:AlternateContent xmlns:mc="http://schemas.openxmlformats.org/markup-compatibility/2006" xmlns:p14="http://schemas.microsoft.com/office/powerpoint/2010/main">
+          <mc:Choice Requires="p14">
             <p:contentPart p14:bwMode="auto" r:id="rId30">
               <p14:nvContentPartPr>
                 <p14:cNvPr id="2115" name="Entrada de lápiz 2114">
@@ -19140,7 +20104,7 @@
               </p14:xfrm>
             </p:contentPart>
           </mc:Choice>
-          <mc:Fallback>
+          <mc:Fallback xmlns="">
             <p:pic>
               <p:nvPicPr>
                 <p:cNvPr id="2115" name="Entrada de lápiz 2114">
@@ -19171,8 +20135,8 @@
             </p:pic>
           </mc:Fallback>
         </mc:AlternateContent>
-        <mc:AlternateContent xmlns:mc="http://schemas.openxmlformats.org/markup-compatibility/2006">
-          <mc:Choice xmlns:p14="http://schemas.microsoft.com/office/powerpoint/2010/main" Requires="p14">
+        <mc:AlternateContent xmlns:mc="http://schemas.openxmlformats.org/markup-compatibility/2006" xmlns:p14="http://schemas.microsoft.com/office/powerpoint/2010/main">
+          <mc:Choice Requires="p14">
             <p:contentPart p14:bwMode="auto" r:id="rId32">
               <p14:nvContentPartPr>
                 <p14:cNvPr id="2116" name="Entrada de lápiz 2115">
@@ -19191,7 +20155,7 @@
               </p14:xfrm>
             </p:contentPart>
           </mc:Choice>
-          <mc:Fallback>
+          <mc:Fallback xmlns="">
             <p:pic>
               <p:nvPicPr>
                 <p:cNvPr id="2116" name="Entrada de lápiz 2115">
@@ -19222,8 +20186,8 @@
             </p:pic>
           </mc:Fallback>
         </mc:AlternateContent>
-        <mc:AlternateContent xmlns:mc="http://schemas.openxmlformats.org/markup-compatibility/2006">
-          <mc:Choice xmlns:p14="http://schemas.microsoft.com/office/powerpoint/2010/main" Requires="p14">
+        <mc:AlternateContent xmlns:mc="http://schemas.openxmlformats.org/markup-compatibility/2006" xmlns:p14="http://schemas.microsoft.com/office/powerpoint/2010/main">
+          <mc:Choice Requires="p14">
             <p:contentPart p14:bwMode="auto" r:id="rId34">
               <p14:nvContentPartPr>
                 <p14:cNvPr id="2117" name="Entrada de lápiz 2116">
@@ -19242,7 +20206,7 @@
               </p14:xfrm>
             </p:contentPart>
           </mc:Choice>
-          <mc:Fallback>
+          <mc:Fallback xmlns="">
             <p:pic>
               <p:nvPicPr>
                 <p:cNvPr id="2117" name="Entrada de lápiz 2116">
@@ -19273,8 +20237,8 @@
             </p:pic>
           </mc:Fallback>
         </mc:AlternateContent>
-        <mc:AlternateContent xmlns:mc="http://schemas.openxmlformats.org/markup-compatibility/2006">
-          <mc:Choice xmlns:p14="http://schemas.microsoft.com/office/powerpoint/2010/main" Requires="p14">
+        <mc:AlternateContent xmlns:mc="http://schemas.openxmlformats.org/markup-compatibility/2006" xmlns:p14="http://schemas.microsoft.com/office/powerpoint/2010/main">
+          <mc:Choice Requires="p14">
             <p:contentPart p14:bwMode="auto" r:id="rId36">
               <p14:nvContentPartPr>
                 <p14:cNvPr id="2119" name="Entrada de lápiz 2118">
@@ -19293,7 +20257,7 @@
               </p14:xfrm>
             </p:contentPart>
           </mc:Choice>
-          <mc:Fallback>
+          <mc:Fallback xmlns="">
             <p:pic>
               <p:nvPicPr>
                 <p:cNvPr id="2119" name="Entrada de lápiz 2118">
@@ -19324,8 +20288,8 @@
             </p:pic>
           </mc:Fallback>
         </mc:AlternateContent>
-        <mc:AlternateContent xmlns:mc="http://schemas.openxmlformats.org/markup-compatibility/2006">
-          <mc:Choice xmlns:p14="http://schemas.microsoft.com/office/powerpoint/2010/main" Requires="p14">
+        <mc:AlternateContent xmlns:mc="http://schemas.openxmlformats.org/markup-compatibility/2006" xmlns:p14="http://schemas.microsoft.com/office/powerpoint/2010/main">
+          <mc:Choice Requires="p14">
             <p:contentPart p14:bwMode="auto" r:id="rId38">
               <p14:nvContentPartPr>
                 <p14:cNvPr id="2120" name="Entrada de lápiz 2119">
@@ -19344,7 +20308,7 @@
               </p14:xfrm>
             </p:contentPart>
           </mc:Choice>
-          <mc:Fallback>
+          <mc:Fallback xmlns="">
             <p:pic>
               <p:nvPicPr>
                 <p:cNvPr id="2120" name="Entrada de lápiz 2119">
@@ -19375,8 +20339,8 @@
             </p:pic>
           </mc:Fallback>
         </mc:AlternateContent>
-        <mc:AlternateContent xmlns:mc="http://schemas.openxmlformats.org/markup-compatibility/2006">
-          <mc:Choice xmlns:p14="http://schemas.microsoft.com/office/powerpoint/2010/main" Requires="p14">
+        <mc:AlternateContent xmlns:mc="http://schemas.openxmlformats.org/markup-compatibility/2006" xmlns:p14="http://schemas.microsoft.com/office/powerpoint/2010/main">
+          <mc:Choice Requires="p14">
             <p:contentPart p14:bwMode="auto" r:id="rId40">
               <p14:nvContentPartPr>
                 <p14:cNvPr id="2121" name="Entrada de lápiz 2120">
@@ -19395,7 +20359,7 @@
               </p14:xfrm>
             </p:contentPart>
           </mc:Choice>
-          <mc:Fallback>
+          <mc:Fallback xmlns="">
             <p:pic>
               <p:nvPicPr>
                 <p:cNvPr id="2121" name="Entrada de lápiz 2120">
@@ -19426,8 +20390,8 @@
             </p:pic>
           </mc:Fallback>
         </mc:AlternateContent>
-        <mc:AlternateContent xmlns:mc="http://schemas.openxmlformats.org/markup-compatibility/2006">
-          <mc:Choice xmlns:p14="http://schemas.microsoft.com/office/powerpoint/2010/main" Requires="p14">
+        <mc:AlternateContent xmlns:mc="http://schemas.openxmlformats.org/markup-compatibility/2006" xmlns:p14="http://schemas.microsoft.com/office/powerpoint/2010/main">
+          <mc:Choice Requires="p14">
             <p:contentPart p14:bwMode="auto" r:id="rId42">
               <p14:nvContentPartPr>
                 <p14:cNvPr id="2122" name="Entrada de lápiz 2121">
@@ -19446,7 +20410,7 @@
               </p14:xfrm>
             </p:contentPart>
           </mc:Choice>
-          <mc:Fallback>
+          <mc:Fallback xmlns="">
             <p:pic>
               <p:nvPicPr>
                 <p:cNvPr id="2122" name="Entrada de lápiz 2121">
@@ -19477,8 +20441,8 @@
             </p:pic>
           </mc:Fallback>
         </mc:AlternateContent>
-        <mc:AlternateContent xmlns:mc="http://schemas.openxmlformats.org/markup-compatibility/2006">
-          <mc:Choice xmlns:p14="http://schemas.microsoft.com/office/powerpoint/2010/main" Requires="p14">
+        <mc:AlternateContent xmlns:mc="http://schemas.openxmlformats.org/markup-compatibility/2006" xmlns:p14="http://schemas.microsoft.com/office/powerpoint/2010/main">
+          <mc:Choice Requires="p14">
             <p:contentPart p14:bwMode="auto" r:id="rId44">
               <p14:nvContentPartPr>
                 <p14:cNvPr id="2123" name="Entrada de lápiz 2122">
@@ -19497,7 +20461,7 @@
               </p14:xfrm>
             </p:contentPart>
           </mc:Choice>
-          <mc:Fallback>
+          <mc:Fallback xmlns="">
             <p:pic>
               <p:nvPicPr>
                 <p:cNvPr id="2123" name="Entrada de lápiz 2122">
@@ -19528,8 +20492,8 @@
             </p:pic>
           </mc:Fallback>
         </mc:AlternateContent>
-        <mc:AlternateContent xmlns:mc="http://schemas.openxmlformats.org/markup-compatibility/2006">
-          <mc:Choice xmlns:p14="http://schemas.microsoft.com/office/powerpoint/2010/main" Requires="p14">
+        <mc:AlternateContent xmlns:mc="http://schemas.openxmlformats.org/markup-compatibility/2006" xmlns:p14="http://schemas.microsoft.com/office/powerpoint/2010/main">
+          <mc:Choice Requires="p14">
             <p:contentPart p14:bwMode="auto" r:id="rId46">
               <p14:nvContentPartPr>
                 <p14:cNvPr id="2124" name="Entrada de lápiz 2123">
@@ -19548,7 +20512,7 @@
               </p14:xfrm>
             </p:contentPart>
           </mc:Choice>
-          <mc:Fallback>
+          <mc:Fallback xmlns="">
             <p:pic>
               <p:nvPicPr>
                 <p:cNvPr id="2124" name="Entrada de lápiz 2123">
@@ -19579,8 +20543,8 @@
             </p:pic>
           </mc:Fallback>
         </mc:AlternateContent>
-        <mc:AlternateContent xmlns:mc="http://schemas.openxmlformats.org/markup-compatibility/2006">
-          <mc:Choice xmlns:p14="http://schemas.microsoft.com/office/powerpoint/2010/main" Requires="p14">
+        <mc:AlternateContent xmlns:mc="http://schemas.openxmlformats.org/markup-compatibility/2006" xmlns:p14="http://schemas.microsoft.com/office/powerpoint/2010/main">
+          <mc:Choice Requires="p14">
             <p:contentPart p14:bwMode="auto" r:id="rId48">
               <p14:nvContentPartPr>
                 <p14:cNvPr id="2125" name="Entrada de lápiz 2124">
@@ -19599,7 +20563,7 @@
               </p14:xfrm>
             </p:contentPart>
           </mc:Choice>
-          <mc:Fallback>
+          <mc:Fallback xmlns="">
             <p:pic>
               <p:nvPicPr>
                 <p:cNvPr id="2125" name="Entrada de lápiz 2124">
@@ -19630,8 +20594,8 @@
             </p:pic>
           </mc:Fallback>
         </mc:AlternateContent>
-        <mc:AlternateContent xmlns:mc="http://schemas.openxmlformats.org/markup-compatibility/2006">
-          <mc:Choice xmlns:p14="http://schemas.microsoft.com/office/powerpoint/2010/main" Requires="p14">
+        <mc:AlternateContent xmlns:mc="http://schemas.openxmlformats.org/markup-compatibility/2006" xmlns:p14="http://schemas.microsoft.com/office/powerpoint/2010/main">
+          <mc:Choice Requires="p14">
             <p:contentPart p14:bwMode="auto" r:id="rId50">
               <p14:nvContentPartPr>
                 <p14:cNvPr id="2126" name="Entrada de lápiz 2125">
@@ -19650,7 +20614,7 @@
               </p14:xfrm>
             </p:contentPart>
           </mc:Choice>
-          <mc:Fallback>
+          <mc:Fallback xmlns="">
             <p:pic>
               <p:nvPicPr>
                 <p:cNvPr id="2126" name="Entrada de lápiz 2125">
@@ -19681,8 +20645,8 @@
             </p:pic>
           </mc:Fallback>
         </mc:AlternateContent>
-        <mc:AlternateContent xmlns:mc="http://schemas.openxmlformats.org/markup-compatibility/2006">
-          <mc:Choice xmlns:p14="http://schemas.microsoft.com/office/powerpoint/2010/main" Requires="p14">
+        <mc:AlternateContent xmlns:mc="http://schemas.openxmlformats.org/markup-compatibility/2006" xmlns:p14="http://schemas.microsoft.com/office/powerpoint/2010/main">
+          <mc:Choice Requires="p14">
             <p:contentPart p14:bwMode="auto" r:id="rId52">
               <p14:nvContentPartPr>
                 <p14:cNvPr id="2127" name="Entrada de lápiz 2126">
@@ -19701,7 +20665,7 @@
               </p14:xfrm>
             </p:contentPart>
           </mc:Choice>
-          <mc:Fallback>
+          <mc:Fallback xmlns="">
             <p:pic>
               <p:nvPicPr>
                 <p:cNvPr id="2127" name="Entrada de lápiz 2126">
@@ -19732,8 +20696,8 @@
             </p:pic>
           </mc:Fallback>
         </mc:AlternateContent>
-        <mc:AlternateContent xmlns:mc="http://schemas.openxmlformats.org/markup-compatibility/2006">
-          <mc:Choice xmlns:p14="http://schemas.microsoft.com/office/powerpoint/2010/main" Requires="p14">
+        <mc:AlternateContent xmlns:mc="http://schemas.openxmlformats.org/markup-compatibility/2006" xmlns:p14="http://schemas.microsoft.com/office/powerpoint/2010/main">
+          <mc:Choice Requires="p14">
             <p:contentPart p14:bwMode="auto" r:id="rId54">
               <p14:nvContentPartPr>
                 <p14:cNvPr id="2128" name="Entrada de lápiz 2127">
@@ -19752,7 +20716,7 @@
               </p14:xfrm>
             </p:contentPart>
           </mc:Choice>
-          <mc:Fallback>
+          <mc:Fallback xmlns="">
             <p:pic>
               <p:nvPicPr>
                 <p:cNvPr id="2128" name="Entrada de lápiz 2127">
@@ -19783,8 +20747,8 @@
             </p:pic>
           </mc:Fallback>
         </mc:AlternateContent>
-        <mc:AlternateContent xmlns:mc="http://schemas.openxmlformats.org/markup-compatibility/2006">
-          <mc:Choice xmlns:p14="http://schemas.microsoft.com/office/powerpoint/2010/main" Requires="p14">
+        <mc:AlternateContent xmlns:mc="http://schemas.openxmlformats.org/markup-compatibility/2006" xmlns:p14="http://schemas.microsoft.com/office/powerpoint/2010/main">
+          <mc:Choice Requires="p14">
             <p:contentPart p14:bwMode="auto" r:id="rId56">
               <p14:nvContentPartPr>
                 <p14:cNvPr id="2129" name="Entrada de lápiz 2128">
@@ -19803,7 +20767,7 @@
               </p14:xfrm>
             </p:contentPart>
           </mc:Choice>
-          <mc:Fallback>
+          <mc:Fallback xmlns="">
             <p:pic>
               <p:nvPicPr>
                 <p:cNvPr id="2129" name="Entrada de lápiz 2128">
@@ -19834,8 +20798,8 @@
             </p:pic>
           </mc:Fallback>
         </mc:AlternateContent>
-        <mc:AlternateContent xmlns:mc="http://schemas.openxmlformats.org/markup-compatibility/2006">
-          <mc:Choice xmlns:p14="http://schemas.microsoft.com/office/powerpoint/2010/main" Requires="p14">
+        <mc:AlternateContent xmlns:mc="http://schemas.openxmlformats.org/markup-compatibility/2006" xmlns:p14="http://schemas.microsoft.com/office/powerpoint/2010/main">
+          <mc:Choice Requires="p14">
             <p:contentPart p14:bwMode="auto" r:id="rId58">
               <p14:nvContentPartPr>
                 <p14:cNvPr id="2130" name="Entrada de lápiz 2129">
@@ -19854,7 +20818,7 @@
               </p14:xfrm>
             </p:contentPart>
           </mc:Choice>
-          <mc:Fallback>
+          <mc:Fallback xmlns="">
             <p:pic>
               <p:nvPicPr>
                 <p:cNvPr id="2130" name="Entrada de lápiz 2129">
@@ -19885,8 +20849,8 @@
             </p:pic>
           </mc:Fallback>
         </mc:AlternateContent>
-        <mc:AlternateContent xmlns:mc="http://schemas.openxmlformats.org/markup-compatibility/2006">
-          <mc:Choice xmlns:p14="http://schemas.microsoft.com/office/powerpoint/2010/main" Requires="p14">
+        <mc:AlternateContent xmlns:mc="http://schemas.openxmlformats.org/markup-compatibility/2006" xmlns:p14="http://schemas.microsoft.com/office/powerpoint/2010/main">
+          <mc:Choice Requires="p14">
             <p:contentPart p14:bwMode="auto" r:id="rId60">
               <p14:nvContentPartPr>
                 <p14:cNvPr id="2131" name="Entrada de lápiz 2130">
@@ -19905,7 +20869,7 @@
               </p14:xfrm>
             </p:contentPart>
           </mc:Choice>
-          <mc:Fallback>
+          <mc:Fallback xmlns="">
             <p:pic>
               <p:nvPicPr>
                 <p:cNvPr id="2131" name="Entrada de lápiz 2130">
@@ -19936,8 +20900,8 @@
             </p:pic>
           </mc:Fallback>
         </mc:AlternateContent>
-        <mc:AlternateContent xmlns:mc="http://schemas.openxmlformats.org/markup-compatibility/2006">
-          <mc:Choice xmlns:p14="http://schemas.microsoft.com/office/powerpoint/2010/main" Requires="p14">
+        <mc:AlternateContent xmlns:mc="http://schemas.openxmlformats.org/markup-compatibility/2006" xmlns:p14="http://schemas.microsoft.com/office/powerpoint/2010/main">
+          <mc:Choice Requires="p14">
             <p:contentPart p14:bwMode="auto" r:id="rId62">
               <p14:nvContentPartPr>
                 <p14:cNvPr id="2132" name="Entrada de lápiz 2131">
@@ -19956,7 +20920,7 @@
               </p14:xfrm>
             </p:contentPart>
           </mc:Choice>
-          <mc:Fallback>
+          <mc:Fallback xmlns="">
             <p:pic>
               <p:nvPicPr>
                 <p:cNvPr id="2132" name="Entrada de lápiz 2131">
@@ -19987,8 +20951,8 @@
             </p:pic>
           </mc:Fallback>
         </mc:AlternateContent>
-        <mc:AlternateContent xmlns:mc="http://schemas.openxmlformats.org/markup-compatibility/2006">
-          <mc:Choice xmlns:p14="http://schemas.microsoft.com/office/powerpoint/2010/main" Requires="p14">
+        <mc:AlternateContent xmlns:mc="http://schemas.openxmlformats.org/markup-compatibility/2006" xmlns:p14="http://schemas.microsoft.com/office/powerpoint/2010/main">
+          <mc:Choice Requires="p14">
             <p:contentPart p14:bwMode="auto" r:id="rId64">
               <p14:nvContentPartPr>
                 <p14:cNvPr id="2133" name="Entrada de lápiz 2132">
@@ -20007,7 +20971,7 @@
               </p14:xfrm>
             </p:contentPart>
           </mc:Choice>
-          <mc:Fallback>
+          <mc:Fallback xmlns="">
             <p:pic>
               <p:nvPicPr>
                 <p:cNvPr id="2133" name="Entrada de lápiz 2132">
@@ -20038,8 +21002,8 @@
             </p:pic>
           </mc:Fallback>
         </mc:AlternateContent>
-        <mc:AlternateContent xmlns:mc="http://schemas.openxmlformats.org/markup-compatibility/2006">
-          <mc:Choice xmlns:p14="http://schemas.microsoft.com/office/powerpoint/2010/main" Requires="p14">
+        <mc:AlternateContent xmlns:mc="http://schemas.openxmlformats.org/markup-compatibility/2006" xmlns:p14="http://schemas.microsoft.com/office/powerpoint/2010/main">
+          <mc:Choice Requires="p14">
             <p:contentPart p14:bwMode="auto" r:id="rId66">
               <p14:nvContentPartPr>
                 <p14:cNvPr id="2134" name="Entrada de lápiz 2133">
@@ -20058,7 +21022,7 @@
               </p14:xfrm>
             </p:contentPart>
           </mc:Choice>
-          <mc:Fallback>
+          <mc:Fallback xmlns="">
             <p:pic>
               <p:nvPicPr>
                 <p:cNvPr id="2134" name="Entrada de lápiz 2133">
@@ -20089,8 +21053,8 @@
             </p:pic>
           </mc:Fallback>
         </mc:AlternateContent>
-        <mc:AlternateContent xmlns:mc="http://schemas.openxmlformats.org/markup-compatibility/2006">
-          <mc:Choice xmlns:p14="http://schemas.microsoft.com/office/powerpoint/2010/main" Requires="p14">
+        <mc:AlternateContent xmlns:mc="http://schemas.openxmlformats.org/markup-compatibility/2006" xmlns:p14="http://schemas.microsoft.com/office/powerpoint/2010/main">
+          <mc:Choice Requires="p14">
             <p:contentPart p14:bwMode="auto" r:id="rId68">
               <p14:nvContentPartPr>
                 <p14:cNvPr id="2135" name="Entrada de lápiz 2134">
@@ -20109,7 +21073,7 @@
               </p14:xfrm>
             </p:contentPart>
           </mc:Choice>
-          <mc:Fallback>
+          <mc:Fallback xmlns="">
             <p:pic>
               <p:nvPicPr>
                 <p:cNvPr id="2135" name="Entrada de lápiz 2134">
@@ -20140,8 +21104,8 @@
             </p:pic>
           </mc:Fallback>
         </mc:AlternateContent>
-        <mc:AlternateContent xmlns:mc="http://schemas.openxmlformats.org/markup-compatibility/2006">
-          <mc:Choice xmlns:p14="http://schemas.microsoft.com/office/powerpoint/2010/main" Requires="p14">
+        <mc:AlternateContent xmlns:mc="http://schemas.openxmlformats.org/markup-compatibility/2006" xmlns:p14="http://schemas.microsoft.com/office/powerpoint/2010/main">
+          <mc:Choice Requires="p14">
             <p:contentPart p14:bwMode="auto" r:id="rId70">
               <p14:nvContentPartPr>
                 <p14:cNvPr id="2136" name="Entrada de lápiz 2135">
@@ -20160,7 +21124,7 @@
               </p14:xfrm>
             </p:contentPart>
           </mc:Choice>
-          <mc:Fallback>
+          <mc:Fallback xmlns="">
             <p:pic>
               <p:nvPicPr>
                 <p:cNvPr id="2136" name="Entrada de lápiz 2135">
@@ -20212,8 +21176,8 @@
             <a:chExt cx="1357920" cy="514080"/>
           </a:xfrm>
         </p:grpSpPr>
-        <mc:AlternateContent xmlns:mc="http://schemas.openxmlformats.org/markup-compatibility/2006">
-          <mc:Choice xmlns:p14="http://schemas.microsoft.com/office/powerpoint/2010/main" Requires="p14">
+        <mc:AlternateContent xmlns:mc="http://schemas.openxmlformats.org/markup-compatibility/2006" xmlns:p14="http://schemas.microsoft.com/office/powerpoint/2010/main">
+          <mc:Choice Requires="p14">
             <p:contentPart p14:bwMode="auto" r:id="rId72">
               <p14:nvContentPartPr>
                 <p14:cNvPr id="2144" name="Entrada de lápiz 2143">
@@ -20232,7 +21196,7 @@
               </p14:xfrm>
             </p:contentPart>
           </mc:Choice>
-          <mc:Fallback>
+          <mc:Fallback xmlns="">
             <p:pic>
               <p:nvPicPr>
                 <p:cNvPr id="2144" name="Entrada de lápiz 2143">
@@ -20263,8 +21227,8 @@
             </p:pic>
           </mc:Fallback>
         </mc:AlternateContent>
-        <mc:AlternateContent xmlns:mc="http://schemas.openxmlformats.org/markup-compatibility/2006">
-          <mc:Choice xmlns:p14="http://schemas.microsoft.com/office/powerpoint/2010/main" Requires="p14">
+        <mc:AlternateContent xmlns:mc="http://schemas.openxmlformats.org/markup-compatibility/2006" xmlns:p14="http://schemas.microsoft.com/office/powerpoint/2010/main">
+          <mc:Choice Requires="p14">
             <p:contentPart p14:bwMode="auto" r:id="rId74">
               <p14:nvContentPartPr>
                 <p14:cNvPr id="2145" name="Entrada de lápiz 2144">
@@ -20283,7 +21247,7 @@
               </p14:xfrm>
             </p:contentPart>
           </mc:Choice>
-          <mc:Fallback>
+          <mc:Fallback xmlns="">
             <p:pic>
               <p:nvPicPr>
                 <p:cNvPr id="2145" name="Entrada de lápiz 2144">
@@ -20314,8 +21278,8 @@
             </p:pic>
           </mc:Fallback>
         </mc:AlternateContent>
-        <mc:AlternateContent xmlns:mc="http://schemas.openxmlformats.org/markup-compatibility/2006">
-          <mc:Choice xmlns:p14="http://schemas.microsoft.com/office/powerpoint/2010/main" Requires="p14">
+        <mc:AlternateContent xmlns:mc="http://schemas.openxmlformats.org/markup-compatibility/2006" xmlns:p14="http://schemas.microsoft.com/office/powerpoint/2010/main">
+          <mc:Choice Requires="p14">
             <p:contentPart p14:bwMode="auto" r:id="rId76">
               <p14:nvContentPartPr>
                 <p14:cNvPr id="2147" name="Entrada de lápiz 2146">
@@ -20334,7 +21298,7 @@
               </p14:xfrm>
             </p:contentPart>
           </mc:Choice>
-          <mc:Fallback>
+          <mc:Fallback xmlns="">
             <p:pic>
               <p:nvPicPr>
                 <p:cNvPr id="2147" name="Entrada de lápiz 2146">
@@ -20365,8 +21329,8 @@
             </p:pic>
           </mc:Fallback>
         </mc:AlternateContent>
-        <mc:AlternateContent xmlns:mc="http://schemas.openxmlformats.org/markup-compatibility/2006">
-          <mc:Choice xmlns:p14="http://schemas.microsoft.com/office/powerpoint/2010/main" Requires="p14">
+        <mc:AlternateContent xmlns:mc="http://schemas.openxmlformats.org/markup-compatibility/2006" xmlns:p14="http://schemas.microsoft.com/office/powerpoint/2010/main">
+          <mc:Choice Requires="p14">
             <p:contentPart p14:bwMode="auto" r:id="rId78">
               <p14:nvContentPartPr>
                 <p14:cNvPr id="2148" name="Entrada de lápiz 2147">
@@ -20385,7 +21349,7 @@
               </p14:xfrm>
             </p:contentPart>
           </mc:Choice>
-          <mc:Fallback>
+          <mc:Fallback xmlns="">
             <p:pic>
               <p:nvPicPr>
                 <p:cNvPr id="2148" name="Entrada de lápiz 2147">
@@ -20437,8 +21401,8 @@
             <a:chExt cx="1027440" cy="884160"/>
           </a:xfrm>
         </p:grpSpPr>
-        <mc:AlternateContent xmlns:mc="http://schemas.openxmlformats.org/markup-compatibility/2006">
-          <mc:Choice xmlns:p14="http://schemas.microsoft.com/office/powerpoint/2010/main" Requires="p14">
+        <mc:AlternateContent xmlns:mc="http://schemas.openxmlformats.org/markup-compatibility/2006" xmlns:p14="http://schemas.microsoft.com/office/powerpoint/2010/main">
+          <mc:Choice Requires="p14">
             <p:contentPart p14:bwMode="auto" r:id="rId80">
               <p14:nvContentPartPr>
                 <p14:cNvPr id="2197" name="Entrada de lápiz 2196">
@@ -20457,7 +21421,7 @@
               </p14:xfrm>
             </p:contentPart>
           </mc:Choice>
-          <mc:Fallback>
+          <mc:Fallback xmlns="">
             <p:pic>
               <p:nvPicPr>
                 <p:cNvPr id="2197" name="Entrada de lápiz 2196">
@@ -20488,8 +21452,8 @@
             </p:pic>
           </mc:Fallback>
         </mc:AlternateContent>
-        <mc:AlternateContent xmlns:mc="http://schemas.openxmlformats.org/markup-compatibility/2006">
-          <mc:Choice xmlns:p14="http://schemas.microsoft.com/office/powerpoint/2010/main" Requires="p14">
+        <mc:AlternateContent xmlns:mc="http://schemas.openxmlformats.org/markup-compatibility/2006" xmlns:p14="http://schemas.microsoft.com/office/powerpoint/2010/main">
+          <mc:Choice Requires="p14">
             <p:contentPart p14:bwMode="auto" r:id="rId82">
               <p14:nvContentPartPr>
                 <p14:cNvPr id="2198" name="Entrada de lápiz 2197">
@@ -20508,7 +21472,7 @@
               </p14:xfrm>
             </p:contentPart>
           </mc:Choice>
-          <mc:Fallback>
+          <mc:Fallback xmlns="">
             <p:pic>
               <p:nvPicPr>
                 <p:cNvPr id="2198" name="Entrada de lápiz 2197">
@@ -20539,8 +21503,8 @@
             </p:pic>
           </mc:Fallback>
         </mc:AlternateContent>
-        <mc:AlternateContent xmlns:mc="http://schemas.openxmlformats.org/markup-compatibility/2006">
-          <mc:Choice xmlns:p14="http://schemas.microsoft.com/office/powerpoint/2010/main" Requires="p14">
+        <mc:AlternateContent xmlns:mc="http://schemas.openxmlformats.org/markup-compatibility/2006" xmlns:p14="http://schemas.microsoft.com/office/powerpoint/2010/main">
+          <mc:Choice Requires="p14">
             <p:contentPart p14:bwMode="auto" r:id="rId84">
               <p14:nvContentPartPr>
                 <p14:cNvPr id="2199" name="Entrada de lápiz 2198">
@@ -20559,7 +21523,7 @@
               </p14:xfrm>
             </p:contentPart>
           </mc:Choice>
-          <mc:Fallback>
+          <mc:Fallback xmlns="">
             <p:pic>
               <p:nvPicPr>
                 <p:cNvPr id="2199" name="Entrada de lápiz 2198">
@@ -20590,8 +21554,8 @@
             </p:pic>
           </mc:Fallback>
         </mc:AlternateContent>
-        <mc:AlternateContent xmlns:mc="http://schemas.openxmlformats.org/markup-compatibility/2006">
-          <mc:Choice xmlns:p14="http://schemas.microsoft.com/office/powerpoint/2010/main" Requires="p14">
+        <mc:AlternateContent xmlns:mc="http://schemas.openxmlformats.org/markup-compatibility/2006" xmlns:p14="http://schemas.microsoft.com/office/powerpoint/2010/main">
+          <mc:Choice Requires="p14">
             <p:contentPart p14:bwMode="auto" r:id="rId86">
               <p14:nvContentPartPr>
                 <p14:cNvPr id="2200" name="Entrada de lápiz 2199">
@@ -20610,7 +21574,7 @@
               </p14:xfrm>
             </p:contentPart>
           </mc:Choice>
-          <mc:Fallback>
+          <mc:Fallback xmlns="">
             <p:pic>
               <p:nvPicPr>
                 <p:cNvPr id="2200" name="Entrada de lápiz 2199">
@@ -20641,8 +21605,8 @@
             </p:pic>
           </mc:Fallback>
         </mc:AlternateContent>
-        <mc:AlternateContent xmlns:mc="http://schemas.openxmlformats.org/markup-compatibility/2006">
-          <mc:Choice xmlns:p14="http://schemas.microsoft.com/office/powerpoint/2010/main" Requires="p14">
+        <mc:AlternateContent xmlns:mc="http://schemas.openxmlformats.org/markup-compatibility/2006" xmlns:p14="http://schemas.microsoft.com/office/powerpoint/2010/main">
+          <mc:Choice Requires="p14">
             <p:contentPart p14:bwMode="auto" r:id="rId88">
               <p14:nvContentPartPr>
                 <p14:cNvPr id="2201" name="Entrada de lápiz 2200">
@@ -20661,7 +21625,7 @@
               </p14:xfrm>
             </p:contentPart>
           </mc:Choice>
-          <mc:Fallback>
+          <mc:Fallback xmlns="">
             <p:pic>
               <p:nvPicPr>
                 <p:cNvPr id="2201" name="Entrada de lápiz 2200">
@@ -20692,8 +21656,8 @@
             </p:pic>
           </mc:Fallback>
         </mc:AlternateContent>
-        <mc:AlternateContent xmlns:mc="http://schemas.openxmlformats.org/markup-compatibility/2006">
-          <mc:Choice xmlns:p14="http://schemas.microsoft.com/office/powerpoint/2010/main" Requires="p14">
+        <mc:AlternateContent xmlns:mc="http://schemas.openxmlformats.org/markup-compatibility/2006" xmlns:p14="http://schemas.microsoft.com/office/powerpoint/2010/main">
+          <mc:Choice Requires="p14">
             <p:contentPart p14:bwMode="auto" r:id="rId90">
               <p14:nvContentPartPr>
                 <p14:cNvPr id="2203" name="Entrada de lápiz 2202">
@@ -20712,7 +21676,7 @@
               </p14:xfrm>
             </p:contentPart>
           </mc:Choice>
-          <mc:Fallback>
+          <mc:Fallback xmlns="">
             <p:pic>
               <p:nvPicPr>
                 <p:cNvPr id="2203" name="Entrada de lápiz 2202">
@@ -20743,8 +21707,8 @@
             </p:pic>
           </mc:Fallback>
         </mc:AlternateContent>
-        <mc:AlternateContent xmlns:mc="http://schemas.openxmlformats.org/markup-compatibility/2006">
-          <mc:Choice xmlns:p14="http://schemas.microsoft.com/office/powerpoint/2010/main" Requires="p14">
+        <mc:AlternateContent xmlns:mc="http://schemas.openxmlformats.org/markup-compatibility/2006" xmlns:p14="http://schemas.microsoft.com/office/powerpoint/2010/main">
+          <mc:Choice Requires="p14">
             <p:contentPart p14:bwMode="auto" r:id="rId92">
               <p14:nvContentPartPr>
                 <p14:cNvPr id="2204" name="Entrada de lápiz 2203">
@@ -20763,7 +21727,7 @@
               </p14:xfrm>
             </p:contentPart>
           </mc:Choice>
-          <mc:Fallback>
+          <mc:Fallback xmlns="">
             <p:pic>
               <p:nvPicPr>
                 <p:cNvPr id="2204" name="Entrada de lápiz 2203">
@@ -20794,8 +21758,8 @@
             </p:pic>
           </mc:Fallback>
         </mc:AlternateContent>
-        <mc:AlternateContent xmlns:mc="http://schemas.openxmlformats.org/markup-compatibility/2006">
-          <mc:Choice xmlns:p14="http://schemas.microsoft.com/office/powerpoint/2010/main" Requires="p14">
+        <mc:AlternateContent xmlns:mc="http://schemas.openxmlformats.org/markup-compatibility/2006" xmlns:p14="http://schemas.microsoft.com/office/powerpoint/2010/main">
+          <mc:Choice Requires="p14">
             <p:contentPart p14:bwMode="auto" r:id="rId94">
               <p14:nvContentPartPr>
                 <p14:cNvPr id="2205" name="Entrada de lápiz 2204">
@@ -20814,7 +21778,7 @@
               </p14:xfrm>
             </p:contentPart>
           </mc:Choice>
-          <mc:Fallback>
+          <mc:Fallback xmlns="">
             <p:pic>
               <p:nvPicPr>
                 <p:cNvPr id="2205" name="Entrada de lápiz 2204">
@@ -20845,8 +21809,8 @@
             </p:pic>
           </mc:Fallback>
         </mc:AlternateContent>
-        <mc:AlternateContent xmlns:mc="http://schemas.openxmlformats.org/markup-compatibility/2006">
-          <mc:Choice xmlns:p14="http://schemas.microsoft.com/office/powerpoint/2010/main" Requires="p14">
+        <mc:AlternateContent xmlns:mc="http://schemas.openxmlformats.org/markup-compatibility/2006" xmlns:p14="http://schemas.microsoft.com/office/powerpoint/2010/main">
+          <mc:Choice Requires="p14">
             <p:contentPart p14:bwMode="auto" r:id="rId96">
               <p14:nvContentPartPr>
                 <p14:cNvPr id="2206" name="Entrada de lápiz 2205">
@@ -20865,7 +21829,7 @@
               </p14:xfrm>
             </p:contentPart>
           </mc:Choice>
-          <mc:Fallback>
+          <mc:Fallback xmlns="">
             <p:pic>
               <p:nvPicPr>
                 <p:cNvPr id="2206" name="Entrada de lápiz 2205">
@@ -20896,8 +21860,8 @@
             </p:pic>
           </mc:Fallback>
         </mc:AlternateContent>
-        <mc:AlternateContent xmlns:mc="http://schemas.openxmlformats.org/markup-compatibility/2006">
-          <mc:Choice xmlns:p14="http://schemas.microsoft.com/office/powerpoint/2010/main" Requires="p14">
+        <mc:AlternateContent xmlns:mc="http://schemas.openxmlformats.org/markup-compatibility/2006" xmlns:p14="http://schemas.microsoft.com/office/powerpoint/2010/main">
+          <mc:Choice Requires="p14">
             <p:contentPart p14:bwMode="auto" r:id="rId98">
               <p14:nvContentPartPr>
                 <p14:cNvPr id="2207" name="Entrada de lápiz 2206">
@@ -20916,7 +21880,7 @@
               </p14:xfrm>
             </p:contentPart>
           </mc:Choice>
-          <mc:Fallback>
+          <mc:Fallback xmlns="">
             <p:pic>
               <p:nvPicPr>
                 <p:cNvPr id="2207" name="Entrada de lápiz 2206">
@@ -20947,8 +21911,8 @@
             </p:pic>
           </mc:Fallback>
         </mc:AlternateContent>
-        <mc:AlternateContent xmlns:mc="http://schemas.openxmlformats.org/markup-compatibility/2006">
-          <mc:Choice xmlns:p14="http://schemas.microsoft.com/office/powerpoint/2010/main" Requires="p14">
+        <mc:AlternateContent xmlns:mc="http://schemas.openxmlformats.org/markup-compatibility/2006" xmlns:p14="http://schemas.microsoft.com/office/powerpoint/2010/main">
+          <mc:Choice Requires="p14">
             <p:contentPart p14:bwMode="auto" r:id="rId100">
               <p14:nvContentPartPr>
                 <p14:cNvPr id="2208" name="Entrada de lápiz 2207">
@@ -20967,7 +21931,7 @@
               </p14:xfrm>
             </p:contentPart>
           </mc:Choice>
-          <mc:Fallback>
+          <mc:Fallback xmlns="">
             <p:pic>
               <p:nvPicPr>
                 <p:cNvPr id="2208" name="Entrada de lápiz 2207">
@@ -20998,8 +21962,8 @@
             </p:pic>
           </mc:Fallback>
         </mc:AlternateContent>
-        <mc:AlternateContent xmlns:mc="http://schemas.openxmlformats.org/markup-compatibility/2006">
-          <mc:Choice xmlns:p14="http://schemas.microsoft.com/office/powerpoint/2010/main" Requires="p14">
+        <mc:AlternateContent xmlns:mc="http://schemas.openxmlformats.org/markup-compatibility/2006" xmlns:p14="http://schemas.microsoft.com/office/powerpoint/2010/main">
+          <mc:Choice Requires="p14">
             <p:contentPart p14:bwMode="auto" r:id="rId102">
               <p14:nvContentPartPr>
                 <p14:cNvPr id="2209" name="Entrada de lápiz 2208">
@@ -21018,7 +21982,7 @@
               </p14:xfrm>
             </p:contentPart>
           </mc:Choice>
-          <mc:Fallback>
+          <mc:Fallback xmlns="">
             <p:pic>
               <p:nvPicPr>
                 <p:cNvPr id="2209" name="Entrada de lápiz 2208">
@@ -21049,8 +22013,8 @@
             </p:pic>
           </mc:Fallback>
         </mc:AlternateContent>
-        <mc:AlternateContent xmlns:mc="http://schemas.openxmlformats.org/markup-compatibility/2006">
-          <mc:Choice xmlns:p14="http://schemas.microsoft.com/office/powerpoint/2010/main" Requires="p14">
+        <mc:AlternateContent xmlns:mc="http://schemas.openxmlformats.org/markup-compatibility/2006" xmlns:p14="http://schemas.microsoft.com/office/powerpoint/2010/main">
+          <mc:Choice Requires="p14">
             <p:contentPart p14:bwMode="auto" r:id="rId104">
               <p14:nvContentPartPr>
                 <p14:cNvPr id="2210" name="Entrada de lápiz 2209">
@@ -21069,7 +22033,7 @@
               </p14:xfrm>
             </p:contentPart>
           </mc:Choice>
-          <mc:Fallback>
+          <mc:Fallback xmlns="">
             <p:pic>
               <p:nvPicPr>
                 <p:cNvPr id="2210" name="Entrada de lápiz 2209">
@@ -21100,8 +22064,8 @@
             </p:pic>
           </mc:Fallback>
         </mc:AlternateContent>
-        <mc:AlternateContent xmlns:mc="http://schemas.openxmlformats.org/markup-compatibility/2006">
-          <mc:Choice xmlns:p14="http://schemas.microsoft.com/office/powerpoint/2010/main" Requires="p14">
+        <mc:AlternateContent xmlns:mc="http://schemas.openxmlformats.org/markup-compatibility/2006" xmlns:p14="http://schemas.microsoft.com/office/powerpoint/2010/main">
+          <mc:Choice Requires="p14">
             <p:contentPart p14:bwMode="auto" r:id="rId106">
               <p14:nvContentPartPr>
                 <p14:cNvPr id="2211" name="Entrada de lápiz 2210">
@@ -21120,7 +22084,7 @@
               </p14:xfrm>
             </p:contentPart>
           </mc:Choice>
-          <mc:Fallback>
+          <mc:Fallback xmlns="">
             <p:pic>
               <p:nvPicPr>
                 <p:cNvPr id="2211" name="Entrada de lápiz 2210">
@@ -21151,8 +22115,8 @@
             </p:pic>
           </mc:Fallback>
         </mc:AlternateContent>
-        <mc:AlternateContent xmlns:mc="http://schemas.openxmlformats.org/markup-compatibility/2006">
-          <mc:Choice xmlns:p14="http://schemas.microsoft.com/office/powerpoint/2010/main" Requires="p14">
+        <mc:AlternateContent xmlns:mc="http://schemas.openxmlformats.org/markup-compatibility/2006" xmlns:p14="http://schemas.microsoft.com/office/powerpoint/2010/main">
+          <mc:Choice Requires="p14">
             <p:contentPart p14:bwMode="auto" r:id="rId108">
               <p14:nvContentPartPr>
                 <p14:cNvPr id="2212" name="Entrada de lápiz 2211">
@@ -21171,7 +22135,7 @@
               </p14:xfrm>
             </p:contentPart>
           </mc:Choice>
-          <mc:Fallback>
+          <mc:Fallback xmlns="">
             <p:pic>
               <p:nvPicPr>
                 <p:cNvPr id="2212" name="Entrada de lápiz 2211">
@@ -21202,8 +22166,8 @@
             </p:pic>
           </mc:Fallback>
         </mc:AlternateContent>
-        <mc:AlternateContent xmlns:mc="http://schemas.openxmlformats.org/markup-compatibility/2006">
-          <mc:Choice xmlns:p14="http://schemas.microsoft.com/office/powerpoint/2010/main" Requires="p14">
+        <mc:AlternateContent xmlns:mc="http://schemas.openxmlformats.org/markup-compatibility/2006" xmlns:p14="http://schemas.microsoft.com/office/powerpoint/2010/main">
+          <mc:Choice Requires="p14">
             <p:contentPart p14:bwMode="auto" r:id="rId110">
               <p14:nvContentPartPr>
                 <p14:cNvPr id="2213" name="Entrada de lápiz 2212">
@@ -21222,7 +22186,7 @@
               </p14:xfrm>
             </p:contentPart>
           </mc:Choice>
-          <mc:Fallback>
+          <mc:Fallback xmlns="">
             <p:pic>
               <p:nvPicPr>
                 <p:cNvPr id="2213" name="Entrada de lápiz 2212">
@@ -21253,8 +22217,8 @@
             </p:pic>
           </mc:Fallback>
         </mc:AlternateContent>
-        <mc:AlternateContent xmlns:mc="http://schemas.openxmlformats.org/markup-compatibility/2006">
-          <mc:Choice xmlns:p14="http://schemas.microsoft.com/office/powerpoint/2010/main" Requires="p14">
+        <mc:AlternateContent xmlns:mc="http://schemas.openxmlformats.org/markup-compatibility/2006" xmlns:p14="http://schemas.microsoft.com/office/powerpoint/2010/main">
+          <mc:Choice Requires="p14">
             <p:contentPart p14:bwMode="auto" r:id="rId112">
               <p14:nvContentPartPr>
                 <p14:cNvPr id="2214" name="Entrada de lápiz 2213">
@@ -21273,7 +22237,7 @@
               </p14:xfrm>
             </p:contentPart>
           </mc:Choice>
-          <mc:Fallback>
+          <mc:Fallback xmlns="">
             <p:pic>
               <p:nvPicPr>
                 <p:cNvPr id="2214" name="Entrada de lápiz 2213">
@@ -21325,8 +22289,8 @@
             <a:chExt cx="1520640" cy="561600"/>
           </a:xfrm>
         </p:grpSpPr>
-        <mc:AlternateContent xmlns:mc="http://schemas.openxmlformats.org/markup-compatibility/2006">
-          <mc:Choice xmlns:p14="http://schemas.microsoft.com/office/powerpoint/2010/main" Requires="p14">
+        <mc:AlternateContent xmlns:mc="http://schemas.openxmlformats.org/markup-compatibility/2006" xmlns:p14="http://schemas.microsoft.com/office/powerpoint/2010/main">
+          <mc:Choice Requires="p14">
             <p:contentPart p14:bwMode="auto" r:id="rId114">
               <p14:nvContentPartPr>
                 <p14:cNvPr id="2217" name="Entrada de lápiz 2216">
@@ -21345,7 +22309,7 @@
               </p14:xfrm>
             </p:contentPart>
           </mc:Choice>
-          <mc:Fallback>
+          <mc:Fallback xmlns="">
             <p:pic>
               <p:nvPicPr>
                 <p:cNvPr id="2217" name="Entrada de lápiz 2216">
@@ -21376,8 +22340,8 @@
             </p:pic>
           </mc:Fallback>
         </mc:AlternateContent>
-        <mc:AlternateContent xmlns:mc="http://schemas.openxmlformats.org/markup-compatibility/2006">
-          <mc:Choice xmlns:p14="http://schemas.microsoft.com/office/powerpoint/2010/main" Requires="p14">
+        <mc:AlternateContent xmlns:mc="http://schemas.openxmlformats.org/markup-compatibility/2006" xmlns:p14="http://schemas.microsoft.com/office/powerpoint/2010/main">
+          <mc:Choice Requires="p14">
             <p:contentPart p14:bwMode="auto" r:id="rId116">
               <p14:nvContentPartPr>
                 <p14:cNvPr id="2218" name="Entrada de lápiz 2217">
@@ -21396,7 +22360,7 @@
               </p14:xfrm>
             </p:contentPart>
           </mc:Choice>
-          <mc:Fallback>
+          <mc:Fallback xmlns="">
             <p:pic>
               <p:nvPicPr>
                 <p:cNvPr id="2218" name="Entrada de lápiz 2217">
@@ -21427,8 +22391,8 @@
             </p:pic>
           </mc:Fallback>
         </mc:AlternateContent>
-        <mc:AlternateContent xmlns:mc="http://schemas.openxmlformats.org/markup-compatibility/2006">
-          <mc:Choice xmlns:p14="http://schemas.microsoft.com/office/powerpoint/2010/main" Requires="p14">
+        <mc:AlternateContent xmlns:mc="http://schemas.openxmlformats.org/markup-compatibility/2006" xmlns:p14="http://schemas.microsoft.com/office/powerpoint/2010/main">
+          <mc:Choice Requires="p14">
             <p:contentPart p14:bwMode="auto" r:id="rId118">
               <p14:nvContentPartPr>
                 <p14:cNvPr id="2220" name="Entrada de lápiz 2219">
@@ -21447,7 +22411,7 @@
               </p14:xfrm>
             </p:contentPart>
           </mc:Choice>
-          <mc:Fallback>
+          <mc:Fallback xmlns="">
             <p:pic>
               <p:nvPicPr>
                 <p:cNvPr id="2220" name="Entrada de lápiz 2219">
@@ -21478,8 +22442,8 @@
             </p:pic>
           </mc:Fallback>
         </mc:AlternateContent>
-        <mc:AlternateContent xmlns:mc="http://schemas.openxmlformats.org/markup-compatibility/2006">
-          <mc:Choice xmlns:p14="http://schemas.microsoft.com/office/powerpoint/2010/main" Requires="p14">
+        <mc:AlternateContent xmlns:mc="http://schemas.openxmlformats.org/markup-compatibility/2006" xmlns:p14="http://schemas.microsoft.com/office/powerpoint/2010/main">
+          <mc:Choice Requires="p14">
             <p:contentPart p14:bwMode="auto" r:id="rId120">
               <p14:nvContentPartPr>
                 <p14:cNvPr id="2222" name="Entrada de lápiz 2221">
@@ -21498,7 +22462,7 @@
               </p14:xfrm>
             </p:contentPart>
           </mc:Choice>
-          <mc:Fallback>
+          <mc:Fallback xmlns="">
             <p:pic>
               <p:nvPicPr>
                 <p:cNvPr id="2222" name="Entrada de lápiz 2221">
@@ -21550,8 +22514,8 @@
             <a:chExt cx="1192680" cy="433440"/>
           </a:xfrm>
         </p:grpSpPr>
-        <mc:AlternateContent xmlns:mc="http://schemas.openxmlformats.org/markup-compatibility/2006">
-          <mc:Choice xmlns:p14="http://schemas.microsoft.com/office/powerpoint/2010/main" Requires="p14">
+        <mc:AlternateContent xmlns:mc="http://schemas.openxmlformats.org/markup-compatibility/2006" xmlns:p14="http://schemas.microsoft.com/office/powerpoint/2010/main">
+          <mc:Choice Requires="p14">
             <p:contentPart p14:bwMode="auto" r:id="rId122">
               <p14:nvContentPartPr>
                 <p14:cNvPr id="302" name="Entrada de lápiz 301">
@@ -21570,7 +22534,7 @@
               </p14:xfrm>
             </p:contentPart>
           </mc:Choice>
-          <mc:Fallback>
+          <mc:Fallback xmlns="">
             <p:pic>
               <p:nvPicPr>
                 <p:cNvPr id="302" name="Entrada de lápiz 301">
@@ -21601,8 +22565,8 @@
             </p:pic>
           </mc:Fallback>
         </mc:AlternateContent>
-        <mc:AlternateContent xmlns:mc="http://schemas.openxmlformats.org/markup-compatibility/2006">
-          <mc:Choice xmlns:p14="http://schemas.microsoft.com/office/powerpoint/2010/main" Requires="p14">
+        <mc:AlternateContent xmlns:mc="http://schemas.openxmlformats.org/markup-compatibility/2006" xmlns:p14="http://schemas.microsoft.com/office/powerpoint/2010/main">
+          <mc:Choice Requires="p14">
             <p:contentPart p14:bwMode="auto" r:id="rId124">
               <p14:nvContentPartPr>
                 <p14:cNvPr id="303" name="Entrada de lápiz 302">
@@ -21621,7 +22585,7 @@
               </p14:xfrm>
             </p:contentPart>
           </mc:Choice>
-          <mc:Fallback>
+          <mc:Fallback xmlns="">
             <p:pic>
               <p:nvPicPr>
                 <p:cNvPr id="303" name="Entrada de lápiz 302">
@@ -21652,8 +22616,8 @@
             </p:pic>
           </mc:Fallback>
         </mc:AlternateContent>
-        <mc:AlternateContent xmlns:mc="http://schemas.openxmlformats.org/markup-compatibility/2006">
-          <mc:Choice xmlns:p14="http://schemas.microsoft.com/office/powerpoint/2010/main" Requires="p14">
+        <mc:AlternateContent xmlns:mc="http://schemas.openxmlformats.org/markup-compatibility/2006" xmlns:p14="http://schemas.microsoft.com/office/powerpoint/2010/main">
+          <mc:Choice Requires="p14">
             <p:contentPart p14:bwMode="auto" r:id="rId126">
               <p14:nvContentPartPr>
                 <p14:cNvPr id="304" name="Entrada de lápiz 303">
@@ -21672,7 +22636,7 @@
               </p14:xfrm>
             </p:contentPart>
           </mc:Choice>
-          <mc:Fallback>
+          <mc:Fallback xmlns="">
             <p:pic>
               <p:nvPicPr>
                 <p:cNvPr id="304" name="Entrada de lápiz 303">
@@ -21703,8 +22667,8 @@
             </p:pic>
           </mc:Fallback>
         </mc:AlternateContent>
-        <mc:AlternateContent xmlns:mc="http://schemas.openxmlformats.org/markup-compatibility/2006">
-          <mc:Choice xmlns:p14="http://schemas.microsoft.com/office/powerpoint/2010/main" Requires="p14">
+        <mc:AlternateContent xmlns:mc="http://schemas.openxmlformats.org/markup-compatibility/2006" xmlns:p14="http://schemas.microsoft.com/office/powerpoint/2010/main">
+          <mc:Choice Requires="p14">
             <p:contentPart p14:bwMode="auto" r:id="rId128">
               <p14:nvContentPartPr>
                 <p14:cNvPr id="305" name="Entrada de lápiz 304">
@@ -21723,7 +22687,7 @@
               </p14:xfrm>
             </p:contentPart>
           </mc:Choice>
-          <mc:Fallback>
+          <mc:Fallback xmlns="">
             <p:pic>
               <p:nvPicPr>
                 <p:cNvPr id="305" name="Entrada de lápiz 304">
@@ -21754,8 +22718,8 @@
             </p:pic>
           </mc:Fallback>
         </mc:AlternateContent>
-        <mc:AlternateContent xmlns:mc="http://schemas.openxmlformats.org/markup-compatibility/2006">
-          <mc:Choice xmlns:p14="http://schemas.microsoft.com/office/powerpoint/2010/main" Requires="p14">
+        <mc:AlternateContent xmlns:mc="http://schemas.openxmlformats.org/markup-compatibility/2006" xmlns:p14="http://schemas.microsoft.com/office/powerpoint/2010/main">
+          <mc:Choice Requires="p14">
             <p:contentPart p14:bwMode="auto" r:id="rId130">
               <p14:nvContentPartPr>
                 <p14:cNvPr id="306" name="Entrada de lápiz 305">
@@ -21774,7 +22738,7 @@
               </p14:xfrm>
             </p:contentPart>
           </mc:Choice>
-          <mc:Fallback>
+          <mc:Fallback xmlns="">
             <p:pic>
               <p:nvPicPr>
                 <p:cNvPr id="306" name="Entrada de lápiz 305">
@@ -21805,8 +22769,8 @@
             </p:pic>
           </mc:Fallback>
         </mc:AlternateContent>
-        <mc:AlternateContent xmlns:mc="http://schemas.openxmlformats.org/markup-compatibility/2006">
-          <mc:Choice xmlns:p14="http://schemas.microsoft.com/office/powerpoint/2010/main" Requires="p14">
+        <mc:AlternateContent xmlns:mc="http://schemas.openxmlformats.org/markup-compatibility/2006" xmlns:p14="http://schemas.microsoft.com/office/powerpoint/2010/main">
+          <mc:Choice Requires="p14">
             <p:contentPart p14:bwMode="auto" r:id="rId132">
               <p14:nvContentPartPr>
                 <p14:cNvPr id="307" name="Entrada de lápiz 306">
@@ -21825,7 +22789,7 @@
               </p14:xfrm>
             </p:contentPart>
           </mc:Choice>
-          <mc:Fallback>
+          <mc:Fallback xmlns="">
             <p:pic>
               <p:nvPicPr>
                 <p:cNvPr id="307" name="Entrada de lápiz 306">
@@ -21856,8 +22820,8 @@
             </p:pic>
           </mc:Fallback>
         </mc:AlternateContent>
-        <mc:AlternateContent xmlns:mc="http://schemas.openxmlformats.org/markup-compatibility/2006">
-          <mc:Choice xmlns:p14="http://schemas.microsoft.com/office/powerpoint/2010/main" Requires="p14">
+        <mc:AlternateContent xmlns:mc="http://schemas.openxmlformats.org/markup-compatibility/2006" xmlns:p14="http://schemas.microsoft.com/office/powerpoint/2010/main">
+          <mc:Choice Requires="p14">
             <p:contentPart p14:bwMode="auto" r:id="rId134">
               <p14:nvContentPartPr>
                 <p14:cNvPr id="308" name="Entrada de lápiz 307">
@@ -21876,7 +22840,7 @@
               </p14:xfrm>
             </p:contentPart>
           </mc:Choice>
-          <mc:Fallback>
+          <mc:Fallback xmlns="">
             <p:pic>
               <p:nvPicPr>
                 <p:cNvPr id="308" name="Entrada de lápiz 307">
@@ -21907,8 +22871,8 @@
             </p:pic>
           </mc:Fallback>
         </mc:AlternateContent>
-        <mc:AlternateContent xmlns:mc="http://schemas.openxmlformats.org/markup-compatibility/2006">
-          <mc:Choice xmlns:p14="http://schemas.microsoft.com/office/powerpoint/2010/main" Requires="p14">
+        <mc:AlternateContent xmlns:mc="http://schemas.openxmlformats.org/markup-compatibility/2006" xmlns:p14="http://schemas.microsoft.com/office/powerpoint/2010/main">
+          <mc:Choice Requires="p14">
             <p:contentPart p14:bwMode="auto" r:id="rId136">
               <p14:nvContentPartPr>
                 <p14:cNvPr id="309" name="Entrada de lápiz 308">
@@ -21927,7 +22891,7 @@
               </p14:xfrm>
             </p:contentPart>
           </mc:Choice>
-          <mc:Fallback>
+          <mc:Fallback xmlns="">
             <p:pic>
               <p:nvPicPr>
                 <p:cNvPr id="309" name="Entrada de lápiz 308">
@@ -21958,8 +22922,8 @@
             </p:pic>
           </mc:Fallback>
         </mc:AlternateContent>
-        <mc:AlternateContent xmlns:mc="http://schemas.openxmlformats.org/markup-compatibility/2006">
-          <mc:Choice xmlns:p14="http://schemas.microsoft.com/office/powerpoint/2010/main" Requires="p14">
+        <mc:AlternateContent xmlns:mc="http://schemas.openxmlformats.org/markup-compatibility/2006" xmlns:p14="http://schemas.microsoft.com/office/powerpoint/2010/main">
+          <mc:Choice Requires="p14">
             <p:contentPart p14:bwMode="auto" r:id="rId138">
               <p14:nvContentPartPr>
                 <p14:cNvPr id="310" name="Entrada de lápiz 309">
@@ -21978,7 +22942,7 @@
               </p14:xfrm>
             </p:contentPart>
           </mc:Choice>
-          <mc:Fallback>
+          <mc:Fallback xmlns="">
             <p:pic>
               <p:nvPicPr>
                 <p:cNvPr id="310" name="Entrada de lápiz 309">
@@ -22009,8 +22973,8 @@
             </p:pic>
           </mc:Fallback>
         </mc:AlternateContent>
-        <mc:AlternateContent xmlns:mc="http://schemas.openxmlformats.org/markup-compatibility/2006">
-          <mc:Choice xmlns:p14="http://schemas.microsoft.com/office/powerpoint/2010/main" Requires="p14">
+        <mc:AlternateContent xmlns:mc="http://schemas.openxmlformats.org/markup-compatibility/2006" xmlns:p14="http://schemas.microsoft.com/office/powerpoint/2010/main">
+          <mc:Choice Requires="p14">
             <p:contentPart p14:bwMode="auto" r:id="rId140">
               <p14:nvContentPartPr>
                 <p14:cNvPr id="311" name="Entrada de lápiz 310">
@@ -22029,7 +22993,7 @@
               </p14:xfrm>
             </p:contentPart>
           </mc:Choice>
-          <mc:Fallback>
+          <mc:Fallback xmlns="">
             <p:pic>
               <p:nvPicPr>
                 <p:cNvPr id="311" name="Entrada de lápiz 310">
@@ -22060,8 +23024,8 @@
             </p:pic>
           </mc:Fallback>
         </mc:AlternateContent>
-        <mc:AlternateContent xmlns:mc="http://schemas.openxmlformats.org/markup-compatibility/2006">
-          <mc:Choice xmlns:p14="http://schemas.microsoft.com/office/powerpoint/2010/main" Requires="p14">
+        <mc:AlternateContent xmlns:mc="http://schemas.openxmlformats.org/markup-compatibility/2006" xmlns:p14="http://schemas.microsoft.com/office/powerpoint/2010/main">
+          <mc:Choice Requires="p14">
             <p:contentPart p14:bwMode="auto" r:id="rId142">
               <p14:nvContentPartPr>
                 <p14:cNvPr id="312" name="Entrada de lápiz 311">
@@ -22080,7 +23044,7 @@
               </p14:xfrm>
             </p:contentPart>
           </mc:Choice>
-          <mc:Fallback>
+          <mc:Fallback xmlns="">
             <p:pic>
               <p:nvPicPr>
                 <p:cNvPr id="312" name="Entrada de lápiz 311">
@@ -22132,8 +23096,8 @@
             <a:chExt cx="3995820" cy="893902"/>
           </a:xfrm>
         </p:grpSpPr>
-        <mc:AlternateContent xmlns:mc="http://schemas.openxmlformats.org/markup-compatibility/2006">
-          <mc:Choice xmlns:p14="http://schemas.microsoft.com/office/powerpoint/2010/main" Requires="p14">
+        <mc:AlternateContent xmlns:mc="http://schemas.openxmlformats.org/markup-compatibility/2006" xmlns:p14="http://schemas.microsoft.com/office/powerpoint/2010/main">
+          <mc:Choice Requires="p14">
             <p:contentPart p14:bwMode="auto" r:id="rId144">
               <p14:nvContentPartPr>
                 <p14:cNvPr id="2245" name="Entrada de lápiz 2244">
@@ -22152,7 +23116,7 @@
               </p14:xfrm>
             </p:contentPart>
           </mc:Choice>
-          <mc:Fallback>
+          <mc:Fallback xmlns="">
             <p:pic>
               <p:nvPicPr>
                 <p:cNvPr id="2245" name="Entrada de lápiz 2244">
@@ -22183,8 +23147,8 @@
             </p:pic>
           </mc:Fallback>
         </mc:AlternateContent>
-        <mc:AlternateContent xmlns:mc="http://schemas.openxmlformats.org/markup-compatibility/2006">
-          <mc:Choice xmlns:p14="http://schemas.microsoft.com/office/powerpoint/2010/main" Requires="p14">
+        <mc:AlternateContent xmlns:mc="http://schemas.openxmlformats.org/markup-compatibility/2006" xmlns:p14="http://schemas.microsoft.com/office/powerpoint/2010/main">
+          <mc:Choice Requires="p14">
             <p:contentPart p14:bwMode="auto" r:id="rId145">
               <p14:nvContentPartPr>
                 <p14:cNvPr id="2246" name="Entrada de lápiz 2245">
@@ -22203,7 +23167,7 @@
               </p14:xfrm>
             </p:contentPart>
           </mc:Choice>
-          <mc:Fallback>
+          <mc:Fallback xmlns="">
             <p:pic>
               <p:nvPicPr>
                 <p:cNvPr id="2246" name="Entrada de lápiz 2245">
@@ -22234,8 +23198,8 @@
             </p:pic>
           </mc:Fallback>
         </mc:AlternateContent>
-        <mc:AlternateContent xmlns:mc="http://schemas.openxmlformats.org/markup-compatibility/2006">
-          <mc:Choice xmlns:p14="http://schemas.microsoft.com/office/powerpoint/2010/main" Requires="p14">
+        <mc:AlternateContent xmlns:mc="http://schemas.openxmlformats.org/markup-compatibility/2006" xmlns:p14="http://schemas.microsoft.com/office/powerpoint/2010/main">
+          <mc:Choice Requires="p14">
             <p:contentPart p14:bwMode="auto" r:id="rId146">
               <p14:nvContentPartPr>
                 <p14:cNvPr id="2247" name="Entrada de lápiz 2246">
@@ -22254,7 +23218,7 @@
               </p14:xfrm>
             </p:contentPart>
           </mc:Choice>
-          <mc:Fallback>
+          <mc:Fallback xmlns="">
             <p:pic>
               <p:nvPicPr>
                 <p:cNvPr id="2247" name="Entrada de lápiz 2246">
@@ -22285,8 +23249,8 @@
             </p:pic>
           </mc:Fallback>
         </mc:AlternateContent>
-        <mc:AlternateContent xmlns:mc="http://schemas.openxmlformats.org/markup-compatibility/2006">
-          <mc:Choice xmlns:p14="http://schemas.microsoft.com/office/powerpoint/2010/main" Requires="p14">
+        <mc:AlternateContent xmlns:mc="http://schemas.openxmlformats.org/markup-compatibility/2006" xmlns:p14="http://schemas.microsoft.com/office/powerpoint/2010/main">
+          <mc:Choice Requires="p14">
             <p:contentPart p14:bwMode="auto" r:id="rId147">
               <p14:nvContentPartPr>
                 <p14:cNvPr id="2248" name="Entrada de lápiz 2247">
@@ -22305,7 +23269,7 @@
               </p14:xfrm>
             </p:contentPart>
           </mc:Choice>
-          <mc:Fallback>
+          <mc:Fallback xmlns="">
             <p:pic>
               <p:nvPicPr>
                 <p:cNvPr id="2248" name="Entrada de lápiz 2247">
@@ -22336,8 +23300,8 @@
             </p:pic>
           </mc:Fallback>
         </mc:AlternateContent>
-        <mc:AlternateContent xmlns:mc="http://schemas.openxmlformats.org/markup-compatibility/2006">
-          <mc:Choice xmlns:p14="http://schemas.microsoft.com/office/powerpoint/2010/main" Requires="p14">
+        <mc:AlternateContent xmlns:mc="http://schemas.openxmlformats.org/markup-compatibility/2006" xmlns:p14="http://schemas.microsoft.com/office/powerpoint/2010/main">
+          <mc:Choice Requires="p14">
             <p:contentPart p14:bwMode="auto" r:id="rId148">
               <p14:nvContentPartPr>
                 <p14:cNvPr id="2249" name="Entrada de lápiz 2248">
@@ -22356,7 +23320,7 @@
               </p14:xfrm>
             </p:contentPart>
           </mc:Choice>
-          <mc:Fallback>
+          <mc:Fallback xmlns="">
             <p:pic>
               <p:nvPicPr>
                 <p:cNvPr id="2249" name="Entrada de lápiz 2248">
@@ -22387,8 +23351,8 @@
             </p:pic>
           </mc:Fallback>
         </mc:AlternateContent>
-        <mc:AlternateContent xmlns:mc="http://schemas.openxmlformats.org/markup-compatibility/2006">
-          <mc:Choice xmlns:p14="http://schemas.microsoft.com/office/powerpoint/2010/main" Requires="p14">
+        <mc:AlternateContent xmlns:mc="http://schemas.openxmlformats.org/markup-compatibility/2006" xmlns:p14="http://schemas.microsoft.com/office/powerpoint/2010/main">
+          <mc:Choice Requires="p14">
             <p:contentPart p14:bwMode="auto" r:id="rId149">
               <p14:nvContentPartPr>
                 <p14:cNvPr id="2250" name="Entrada de lápiz 2249">
@@ -22407,7 +23371,7 @@
               </p14:xfrm>
             </p:contentPart>
           </mc:Choice>
-          <mc:Fallback>
+          <mc:Fallback xmlns="">
             <p:pic>
               <p:nvPicPr>
                 <p:cNvPr id="2250" name="Entrada de lápiz 2249">
@@ -22438,8 +23402,8 @@
             </p:pic>
           </mc:Fallback>
         </mc:AlternateContent>
-        <mc:AlternateContent xmlns:mc="http://schemas.openxmlformats.org/markup-compatibility/2006">
-          <mc:Choice xmlns:p14="http://schemas.microsoft.com/office/powerpoint/2010/main" Requires="p14">
+        <mc:AlternateContent xmlns:mc="http://schemas.openxmlformats.org/markup-compatibility/2006" xmlns:p14="http://schemas.microsoft.com/office/powerpoint/2010/main">
+          <mc:Choice Requires="p14">
             <p:contentPart p14:bwMode="auto" r:id="rId150">
               <p14:nvContentPartPr>
                 <p14:cNvPr id="2251" name="Entrada de lápiz 2250">
@@ -22458,7 +23422,7 @@
               </p14:xfrm>
             </p:contentPart>
           </mc:Choice>
-          <mc:Fallback>
+          <mc:Fallback xmlns="">
             <p:pic>
               <p:nvPicPr>
                 <p:cNvPr id="2251" name="Entrada de lápiz 2250">
@@ -22489,8 +23453,8 @@
             </p:pic>
           </mc:Fallback>
         </mc:AlternateContent>
-        <mc:AlternateContent xmlns:mc="http://schemas.openxmlformats.org/markup-compatibility/2006">
-          <mc:Choice xmlns:p14="http://schemas.microsoft.com/office/powerpoint/2010/main" Requires="p14">
+        <mc:AlternateContent xmlns:mc="http://schemas.openxmlformats.org/markup-compatibility/2006" xmlns:p14="http://schemas.microsoft.com/office/powerpoint/2010/main">
+          <mc:Choice Requires="p14">
             <p:contentPart p14:bwMode="auto" r:id="rId151">
               <p14:nvContentPartPr>
                 <p14:cNvPr id="2252" name="Entrada de lápiz 2251">
@@ -22509,7 +23473,7 @@
               </p14:xfrm>
             </p:contentPart>
           </mc:Choice>
-          <mc:Fallback>
+          <mc:Fallback xmlns="">
             <p:pic>
               <p:nvPicPr>
                 <p:cNvPr id="2252" name="Entrada de lápiz 2251">
@@ -22540,8 +23504,8 @@
             </p:pic>
           </mc:Fallback>
         </mc:AlternateContent>
-        <mc:AlternateContent xmlns:mc="http://schemas.openxmlformats.org/markup-compatibility/2006">
-          <mc:Choice xmlns:p14="http://schemas.microsoft.com/office/powerpoint/2010/main" Requires="p14">
+        <mc:AlternateContent xmlns:mc="http://schemas.openxmlformats.org/markup-compatibility/2006" xmlns:p14="http://schemas.microsoft.com/office/powerpoint/2010/main">
+          <mc:Choice Requires="p14">
             <p:contentPart p14:bwMode="auto" r:id="rId152">
               <p14:nvContentPartPr>
                 <p14:cNvPr id="2253" name="Entrada de lápiz 2252">
@@ -22560,7 +23524,7 @@
               </p14:xfrm>
             </p:contentPart>
           </mc:Choice>
-          <mc:Fallback>
+          <mc:Fallback xmlns="">
             <p:pic>
               <p:nvPicPr>
                 <p:cNvPr id="2253" name="Entrada de lápiz 2252">
@@ -22591,8 +23555,8 @@
             </p:pic>
           </mc:Fallback>
         </mc:AlternateContent>
-        <mc:AlternateContent xmlns:mc="http://schemas.openxmlformats.org/markup-compatibility/2006">
-          <mc:Choice xmlns:p14="http://schemas.microsoft.com/office/powerpoint/2010/main" Requires="p14">
+        <mc:AlternateContent xmlns:mc="http://schemas.openxmlformats.org/markup-compatibility/2006" xmlns:p14="http://schemas.microsoft.com/office/powerpoint/2010/main">
+          <mc:Choice Requires="p14">
             <p:contentPart p14:bwMode="auto" r:id="rId153">
               <p14:nvContentPartPr>
                 <p14:cNvPr id="2254" name="Entrada de lápiz 2253">
@@ -22611,7 +23575,7 @@
               </p14:xfrm>
             </p:contentPart>
           </mc:Choice>
-          <mc:Fallback>
+          <mc:Fallback xmlns="">
             <p:pic>
               <p:nvPicPr>
                 <p:cNvPr id="2254" name="Entrada de lápiz 2253">
@@ -22642,8 +23606,8 @@
             </p:pic>
           </mc:Fallback>
         </mc:AlternateContent>
-        <mc:AlternateContent xmlns:mc="http://schemas.openxmlformats.org/markup-compatibility/2006">
-          <mc:Choice xmlns:p14="http://schemas.microsoft.com/office/powerpoint/2010/main" Requires="p14">
+        <mc:AlternateContent xmlns:mc="http://schemas.openxmlformats.org/markup-compatibility/2006" xmlns:p14="http://schemas.microsoft.com/office/powerpoint/2010/main">
+          <mc:Choice Requires="p14">
             <p:contentPart p14:bwMode="auto" r:id="rId154">
               <p14:nvContentPartPr>
                 <p14:cNvPr id="2255" name="Entrada de lápiz 2254">
@@ -22662,7 +23626,7 @@
               </p14:xfrm>
             </p:contentPart>
           </mc:Choice>
-          <mc:Fallback>
+          <mc:Fallback xmlns="">
             <p:pic>
               <p:nvPicPr>
                 <p:cNvPr id="2255" name="Entrada de lápiz 2254">
@@ -22693,8 +23657,8 @@
             </p:pic>
           </mc:Fallback>
         </mc:AlternateContent>
-        <mc:AlternateContent xmlns:mc="http://schemas.openxmlformats.org/markup-compatibility/2006">
-          <mc:Choice xmlns:p14="http://schemas.microsoft.com/office/powerpoint/2010/main" Requires="p14">
+        <mc:AlternateContent xmlns:mc="http://schemas.openxmlformats.org/markup-compatibility/2006" xmlns:p14="http://schemas.microsoft.com/office/powerpoint/2010/main">
+          <mc:Choice Requires="p14">
             <p:contentPart p14:bwMode="auto" r:id="rId155">
               <p14:nvContentPartPr>
                 <p14:cNvPr id="2257" name="Entrada de lápiz 2256">
@@ -22713,7 +23677,7 @@
               </p14:xfrm>
             </p:contentPart>
           </mc:Choice>
-          <mc:Fallback>
+          <mc:Fallback xmlns="">
             <p:pic>
               <p:nvPicPr>
                 <p:cNvPr id="2257" name="Entrada de lápiz 2256">
@@ -22744,8 +23708,8 @@
             </p:pic>
           </mc:Fallback>
         </mc:AlternateContent>
-        <mc:AlternateContent xmlns:mc="http://schemas.openxmlformats.org/markup-compatibility/2006">
-          <mc:Choice xmlns:p14="http://schemas.microsoft.com/office/powerpoint/2010/main" Requires="p14">
+        <mc:AlternateContent xmlns:mc="http://schemas.openxmlformats.org/markup-compatibility/2006" xmlns:p14="http://schemas.microsoft.com/office/powerpoint/2010/main">
+          <mc:Choice Requires="p14">
             <p:contentPart p14:bwMode="auto" r:id="rId157">
               <p14:nvContentPartPr>
                 <p14:cNvPr id="2258" name="Entrada de lápiz 2257">
@@ -22764,7 +23728,7 @@
               </p14:xfrm>
             </p:contentPart>
           </mc:Choice>
-          <mc:Fallback>
+          <mc:Fallback xmlns="">
             <p:pic>
               <p:nvPicPr>
                 <p:cNvPr id="2258" name="Entrada de lápiz 2257">
@@ -22795,8 +23759,8 @@
             </p:pic>
           </mc:Fallback>
         </mc:AlternateContent>
-        <mc:AlternateContent xmlns:mc="http://schemas.openxmlformats.org/markup-compatibility/2006">
-          <mc:Choice xmlns:p14="http://schemas.microsoft.com/office/powerpoint/2010/main" Requires="p14">
+        <mc:AlternateContent xmlns:mc="http://schemas.openxmlformats.org/markup-compatibility/2006" xmlns:p14="http://schemas.microsoft.com/office/powerpoint/2010/main">
+          <mc:Choice Requires="p14">
             <p:contentPart p14:bwMode="auto" r:id="rId159">
               <p14:nvContentPartPr>
                 <p14:cNvPr id="2259" name="Entrada de lápiz 2258">
@@ -22815,7 +23779,7 @@
               </p14:xfrm>
             </p:contentPart>
           </mc:Choice>
-          <mc:Fallback>
+          <mc:Fallback xmlns="">
             <p:pic>
               <p:nvPicPr>
                 <p:cNvPr id="2259" name="Entrada de lápiz 2258">
@@ -22846,8 +23810,8 @@
             </p:pic>
           </mc:Fallback>
         </mc:AlternateContent>
-        <mc:AlternateContent xmlns:mc="http://schemas.openxmlformats.org/markup-compatibility/2006">
-          <mc:Choice xmlns:p14="http://schemas.microsoft.com/office/powerpoint/2010/main" Requires="p14">
+        <mc:AlternateContent xmlns:mc="http://schemas.openxmlformats.org/markup-compatibility/2006" xmlns:p14="http://schemas.microsoft.com/office/powerpoint/2010/main">
+          <mc:Choice Requires="p14">
             <p:contentPart p14:bwMode="auto" r:id="rId161">
               <p14:nvContentPartPr>
                 <p14:cNvPr id="2260" name="Entrada de lápiz 2259">
@@ -22866,7 +23830,7 @@
               </p14:xfrm>
             </p:contentPart>
           </mc:Choice>
-          <mc:Fallback>
+          <mc:Fallback xmlns="">
             <p:pic>
               <p:nvPicPr>
                 <p:cNvPr id="2260" name="Entrada de lápiz 2259">
@@ -22897,8 +23861,8 @@
             </p:pic>
           </mc:Fallback>
         </mc:AlternateContent>
-        <mc:AlternateContent xmlns:mc="http://schemas.openxmlformats.org/markup-compatibility/2006">
-          <mc:Choice xmlns:p14="http://schemas.microsoft.com/office/powerpoint/2010/main" Requires="p14">
+        <mc:AlternateContent xmlns:mc="http://schemas.openxmlformats.org/markup-compatibility/2006" xmlns:p14="http://schemas.microsoft.com/office/powerpoint/2010/main">
+          <mc:Choice Requires="p14">
             <p:contentPart p14:bwMode="auto" r:id="rId163">
               <p14:nvContentPartPr>
                 <p14:cNvPr id="2261" name="Entrada de lápiz 2260">
@@ -22917,7 +23881,7 @@
               </p14:xfrm>
             </p:contentPart>
           </mc:Choice>
-          <mc:Fallback>
+          <mc:Fallback xmlns="">
             <p:pic>
               <p:nvPicPr>
                 <p:cNvPr id="2261" name="Entrada de lápiz 2260">
@@ -22948,8 +23912,8 @@
             </p:pic>
           </mc:Fallback>
         </mc:AlternateContent>
-        <mc:AlternateContent xmlns:mc="http://schemas.openxmlformats.org/markup-compatibility/2006">
-          <mc:Choice xmlns:p14="http://schemas.microsoft.com/office/powerpoint/2010/main" Requires="p14">
+        <mc:AlternateContent xmlns:mc="http://schemas.openxmlformats.org/markup-compatibility/2006" xmlns:p14="http://schemas.microsoft.com/office/powerpoint/2010/main">
+          <mc:Choice Requires="p14">
             <p:contentPart p14:bwMode="auto" r:id="rId165">
               <p14:nvContentPartPr>
                 <p14:cNvPr id="2262" name="Entrada de lápiz 2261">
@@ -22968,7 +23932,7 @@
               </p14:xfrm>
             </p:contentPart>
           </mc:Choice>
-          <mc:Fallback>
+          <mc:Fallback xmlns="">
             <p:pic>
               <p:nvPicPr>
                 <p:cNvPr id="2262" name="Entrada de lápiz 2261">
@@ -22999,8 +23963,8 @@
             </p:pic>
           </mc:Fallback>
         </mc:AlternateContent>
-        <mc:AlternateContent xmlns:mc="http://schemas.openxmlformats.org/markup-compatibility/2006">
-          <mc:Choice xmlns:p14="http://schemas.microsoft.com/office/powerpoint/2010/main" Requires="p14">
+        <mc:AlternateContent xmlns:mc="http://schemas.openxmlformats.org/markup-compatibility/2006" xmlns:p14="http://schemas.microsoft.com/office/powerpoint/2010/main">
+          <mc:Choice Requires="p14">
             <p:contentPart p14:bwMode="auto" r:id="rId167">
               <p14:nvContentPartPr>
                 <p14:cNvPr id="2263" name="Entrada de lápiz 2262">
@@ -23019,7 +23983,7 @@
               </p14:xfrm>
             </p:contentPart>
           </mc:Choice>
-          <mc:Fallback>
+          <mc:Fallback xmlns="">
             <p:pic>
               <p:nvPicPr>
                 <p:cNvPr id="2263" name="Entrada de lápiz 2262">
@@ -23050,8 +24014,8 @@
             </p:pic>
           </mc:Fallback>
         </mc:AlternateContent>
-        <mc:AlternateContent xmlns:mc="http://schemas.openxmlformats.org/markup-compatibility/2006">
-          <mc:Choice xmlns:p14="http://schemas.microsoft.com/office/powerpoint/2010/main" Requires="p14">
+        <mc:AlternateContent xmlns:mc="http://schemas.openxmlformats.org/markup-compatibility/2006" xmlns:p14="http://schemas.microsoft.com/office/powerpoint/2010/main">
+          <mc:Choice Requires="p14">
             <p:contentPart p14:bwMode="auto" r:id="rId169">
               <p14:nvContentPartPr>
                 <p14:cNvPr id="2264" name="Entrada de lápiz 2263">
@@ -23070,7 +24034,7 @@
               </p14:xfrm>
             </p:contentPart>
           </mc:Choice>
-          <mc:Fallback>
+          <mc:Fallback xmlns="">
             <p:pic>
               <p:nvPicPr>
                 <p:cNvPr id="2264" name="Entrada de lápiz 2263">
@@ -23101,8 +24065,8 @@
             </p:pic>
           </mc:Fallback>
         </mc:AlternateContent>
-        <mc:AlternateContent xmlns:mc="http://schemas.openxmlformats.org/markup-compatibility/2006">
-          <mc:Choice xmlns:p14="http://schemas.microsoft.com/office/powerpoint/2010/main" Requires="p14">
+        <mc:AlternateContent xmlns:mc="http://schemas.openxmlformats.org/markup-compatibility/2006" xmlns:p14="http://schemas.microsoft.com/office/powerpoint/2010/main">
+          <mc:Choice Requires="p14">
             <p:contentPart p14:bwMode="auto" r:id="rId171">
               <p14:nvContentPartPr>
                 <p14:cNvPr id="2265" name="Entrada de lápiz 2264">
@@ -23121,7 +24085,7 @@
               </p14:xfrm>
             </p:contentPart>
           </mc:Choice>
-          <mc:Fallback>
+          <mc:Fallback xmlns="">
             <p:pic>
               <p:nvPicPr>
                 <p:cNvPr id="2265" name="Entrada de lápiz 2264">
@@ -23152,8 +24116,8 @@
             </p:pic>
           </mc:Fallback>
         </mc:AlternateContent>
-        <mc:AlternateContent xmlns:mc="http://schemas.openxmlformats.org/markup-compatibility/2006">
-          <mc:Choice xmlns:p14="http://schemas.microsoft.com/office/powerpoint/2010/main" Requires="p14">
+        <mc:AlternateContent xmlns:mc="http://schemas.openxmlformats.org/markup-compatibility/2006" xmlns:p14="http://schemas.microsoft.com/office/powerpoint/2010/main">
+          <mc:Choice Requires="p14">
             <p:contentPart p14:bwMode="auto" r:id="rId173">
               <p14:nvContentPartPr>
                 <p14:cNvPr id="2275" name="Entrada de lápiz 2274">
@@ -23172,7 +24136,7 @@
               </p14:xfrm>
             </p:contentPart>
           </mc:Choice>
-          <mc:Fallback>
+          <mc:Fallback xmlns="">
             <p:pic>
               <p:nvPicPr>
                 <p:cNvPr id="2275" name="Entrada de lápiz 2274">
@@ -23203,8 +24167,8 @@
             </p:pic>
           </mc:Fallback>
         </mc:AlternateContent>
-        <mc:AlternateContent xmlns:mc="http://schemas.openxmlformats.org/markup-compatibility/2006">
-          <mc:Choice xmlns:p14="http://schemas.microsoft.com/office/powerpoint/2010/main" Requires="p14">
+        <mc:AlternateContent xmlns:mc="http://schemas.openxmlformats.org/markup-compatibility/2006" xmlns:p14="http://schemas.microsoft.com/office/powerpoint/2010/main">
+          <mc:Choice Requires="p14">
             <p:contentPart p14:bwMode="auto" r:id="rId175">
               <p14:nvContentPartPr>
                 <p14:cNvPr id="2276" name="Entrada de lápiz 2275">
@@ -23223,7 +24187,7 @@
               </p14:xfrm>
             </p:contentPart>
           </mc:Choice>
-          <mc:Fallback>
+          <mc:Fallback xmlns="">
             <p:pic>
               <p:nvPicPr>
                 <p:cNvPr id="2276" name="Entrada de lápiz 2275">
@@ -23254,8 +24218,8 @@
             </p:pic>
           </mc:Fallback>
         </mc:AlternateContent>
-        <mc:AlternateContent xmlns:mc="http://schemas.openxmlformats.org/markup-compatibility/2006">
-          <mc:Choice xmlns:p14="http://schemas.microsoft.com/office/powerpoint/2010/main" Requires="p14">
+        <mc:AlternateContent xmlns:mc="http://schemas.openxmlformats.org/markup-compatibility/2006" xmlns:p14="http://schemas.microsoft.com/office/powerpoint/2010/main">
+          <mc:Choice Requires="p14">
             <p:contentPart p14:bwMode="auto" r:id="rId177">
               <p14:nvContentPartPr>
                 <p14:cNvPr id="2277" name="Entrada de lápiz 2276">
@@ -23274,7 +24238,7 @@
               </p14:xfrm>
             </p:contentPart>
           </mc:Choice>
-          <mc:Fallback>
+          <mc:Fallback xmlns="">
             <p:pic>
               <p:nvPicPr>
                 <p:cNvPr id="2277" name="Entrada de lápiz 2276">
@@ -23305,8 +24269,8 @@
             </p:pic>
           </mc:Fallback>
         </mc:AlternateContent>
-        <mc:AlternateContent xmlns:mc="http://schemas.openxmlformats.org/markup-compatibility/2006">
-          <mc:Choice xmlns:p14="http://schemas.microsoft.com/office/powerpoint/2010/main" Requires="p14">
+        <mc:AlternateContent xmlns:mc="http://schemas.openxmlformats.org/markup-compatibility/2006" xmlns:p14="http://schemas.microsoft.com/office/powerpoint/2010/main">
+          <mc:Choice Requires="p14">
             <p:contentPart p14:bwMode="auto" r:id="rId179">
               <p14:nvContentPartPr>
                 <p14:cNvPr id="2278" name="Entrada de lápiz 2277">
@@ -23325,7 +24289,7 @@
               </p14:xfrm>
             </p:contentPart>
           </mc:Choice>
-          <mc:Fallback>
+          <mc:Fallback xmlns="">
             <p:pic>
               <p:nvPicPr>
                 <p:cNvPr id="2278" name="Entrada de lápiz 2277">
@@ -23356,8 +24320,8 @@
             </p:pic>
           </mc:Fallback>
         </mc:AlternateContent>
-        <mc:AlternateContent xmlns:mc="http://schemas.openxmlformats.org/markup-compatibility/2006">
-          <mc:Choice xmlns:p14="http://schemas.microsoft.com/office/powerpoint/2010/main" Requires="p14">
+        <mc:AlternateContent xmlns:mc="http://schemas.openxmlformats.org/markup-compatibility/2006" xmlns:p14="http://schemas.microsoft.com/office/powerpoint/2010/main">
+          <mc:Choice Requires="p14">
             <p:contentPart p14:bwMode="auto" r:id="rId181">
               <p14:nvContentPartPr>
                 <p14:cNvPr id="2279" name="Entrada de lápiz 2278">
@@ -23376,7 +24340,7 @@
               </p14:xfrm>
             </p:contentPart>
           </mc:Choice>
-          <mc:Fallback>
+          <mc:Fallback xmlns="">
             <p:pic>
               <p:nvPicPr>
                 <p:cNvPr id="2279" name="Entrada de lápiz 2278">
@@ -23407,8 +24371,8 @@
             </p:pic>
           </mc:Fallback>
         </mc:AlternateContent>
-        <mc:AlternateContent xmlns:mc="http://schemas.openxmlformats.org/markup-compatibility/2006">
-          <mc:Choice xmlns:p14="http://schemas.microsoft.com/office/powerpoint/2010/main" Requires="p14">
+        <mc:AlternateContent xmlns:mc="http://schemas.openxmlformats.org/markup-compatibility/2006" xmlns:p14="http://schemas.microsoft.com/office/powerpoint/2010/main">
+          <mc:Choice Requires="p14">
             <p:contentPart p14:bwMode="auto" r:id="rId183">
               <p14:nvContentPartPr>
                 <p14:cNvPr id="2280" name="Entrada de lápiz 2279">
@@ -23427,7 +24391,7 @@
               </p14:xfrm>
             </p:contentPart>
           </mc:Choice>
-          <mc:Fallback>
+          <mc:Fallback xmlns="">
             <p:pic>
               <p:nvPicPr>
                 <p:cNvPr id="2280" name="Entrada de lápiz 2279">
@@ -23458,8 +24422,8 @@
             </p:pic>
           </mc:Fallback>
         </mc:AlternateContent>
-        <mc:AlternateContent xmlns:mc="http://schemas.openxmlformats.org/markup-compatibility/2006">
-          <mc:Choice xmlns:p14="http://schemas.microsoft.com/office/powerpoint/2010/main" Requires="p14">
+        <mc:AlternateContent xmlns:mc="http://schemas.openxmlformats.org/markup-compatibility/2006" xmlns:p14="http://schemas.microsoft.com/office/powerpoint/2010/main">
+          <mc:Choice Requires="p14">
             <p:contentPart p14:bwMode="auto" r:id="rId185">
               <p14:nvContentPartPr>
                 <p14:cNvPr id="2281" name="Entrada de lápiz 2280">
@@ -23478,7 +24442,7 @@
               </p14:xfrm>
             </p:contentPart>
           </mc:Choice>
-          <mc:Fallback>
+          <mc:Fallback xmlns="">
             <p:pic>
               <p:nvPicPr>
                 <p:cNvPr id="2281" name="Entrada de lápiz 2280">
@@ -23509,8 +24473,8 @@
             </p:pic>
           </mc:Fallback>
         </mc:AlternateContent>
-        <mc:AlternateContent xmlns:mc="http://schemas.openxmlformats.org/markup-compatibility/2006">
-          <mc:Choice xmlns:p14="http://schemas.microsoft.com/office/powerpoint/2010/main" Requires="p14">
+        <mc:AlternateContent xmlns:mc="http://schemas.openxmlformats.org/markup-compatibility/2006" xmlns:p14="http://schemas.microsoft.com/office/powerpoint/2010/main">
+          <mc:Choice Requires="p14">
             <p:contentPart p14:bwMode="auto" r:id="rId187">
               <p14:nvContentPartPr>
                 <p14:cNvPr id="2282" name="Entrada de lápiz 2281">
@@ -23529,7 +24493,7 @@
               </p14:xfrm>
             </p:contentPart>
           </mc:Choice>
-          <mc:Fallback>
+          <mc:Fallback xmlns="">
             <p:pic>
               <p:nvPicPr>
                 <p:cNvPr id="2282" name="Entrada de lápiz 2281">
@@ -23560,8 +24524,8 @@
             </p:pic>
           </mc:Fallback>
         </mc:AlternateContent>
-        <mc:AlternateContent xmlns:mc="http://schemas.openxmlformats.org/markup-compatibility/2006">
-          <mc:Choice xmlns:p14="http://schemas.microsoft.com/office/powerpoint/2010/main" Requires="p14">
+        <mc:AlternateContent xmlns:mc="http://schemas.openxmlformats.org/markup-compatibility/2006" xmlns:p14="http://schemas.microsoft.com/office/powerpoint/2010/main">
+          <mc:Choice Requires="p14">
             <p:contentPart p14:bwMode="auto" r:id="rId189">
               <p14:nvContentPartPr>
                 <p14:cNvPr id="2283" name="Entrada de lápiz 2282">
@@ -23580,7 +24544,7 @@
               </p14:xfrm>
             </p:contentPart>
           </mc:Choice>
-          <mc:Fallback>
+          <mc:Fallback xmlns="">
             <p:pic>
               <p:nvPicPr>
                 <p:cNvPr id="2283" name="Entrada de lápiz 2282">
@@ -23611,8 +24575,8 @@
             </p:pic>
           </mc:Fallback>
         </mc:AlternateContent>
-        <mc:AlternateContent xmlns:mc="http://schemas.openxmlformats.org/markup-compatibility/2006">
-          <mc:Choice xmlns:p14="http://schemas.microsoft.com/office/powerpoint/2010/main" Requires="p14">
+        <mc:AlternateContent xmlns:mc="http://schemas.openxmlformats.org/markup-compatibility/2006" xmlns:p14="http://schemas.microsoft.com/office/powerpoint/2010/main">
+          <mc:Choice Requires="p14">
             <p:contentPart p14:bwMode="auto" r:id="rId191">
               <p14:nvContentPartPr>
                 <p14:cNvPr id="2285" name="Entrada de lápiz 2284">
@@ -23631,7 +24595,7 @@
               </p14:xfrm>
             </p:contentPart>
           </mc:Choice>
-          <mc:Fallback>
+          <mc:Fallback xmlns="">
             <p:pic>
               <p:nvPicPr>
                 <p:cNvPr id="2285" name="Entrada de lápiz 2284">
@@ -23662,8 +24626,8 @@
             </p:pic>
           </mc:Fallback>
         </mc:AlternateContent>
-        <mc:AlternateContent xmlns:mc="http://schemas.openxmlformats.org/markup-compatibility/2006">
-          <mc:Choice xmlns:p14="http://schemas.microsoft.com/office/powerpoint/2010/main" Requires="p14">
+        <mc:AlternateContent xmlns:mc="http://schemas.openxmlformats.org/markup-compatibility/2006" xmlns:p14="http://schemas.microsoft.com/office/powerpoint/2010/main">
+          <mc:Choice Requires="p14">
             <p:contentPart p14:bwMode="auto" r:id="rId193">
               <p14:nvContentPartPr>
                 <p14:cNvPr id="2286" name="Entrada de lápiz 2285">
@@ -23682,7 +24646,7 @@
               </p14:xfrm>
             </p:contentPart>
           </mc:Choice>
-          <mc:Fallback>
+          <mc:Fallback xmlns="">
             <p:pic>
               <p:nvPicPr>
                 <p:cNvPr id="2286" name="Entrada de lápiz 2285">
@@ -23713,8 +24677,8 @@
             </p:pic>
           </mc:Fallback>
         </mc:AlternateContent>
-        <mc:AlternateContent xmlns:mc="http://schemas.openxmlformats.org/markup-compatibility/2006">
-          <mc:Choice xmlns:p14="http://schemas.microsoft.com/office/powerpoint/2010/main" Requires="p14">
+        <mc:AlternateContent xmlns:mc="http://schemas.openxmlformats.org/markup-compatibility/2006" xmlns:p14="http://schemas.microsoft.com/office/powerpoint/2010/main">
+          <mc:Choice Requires="p14">
             <p:contentPart p14:bwMode="auto" r:id="rId195">
               <p14:nvContentPartPr>
                 <p14:cNvPr id="2287" name="Entrada de lápiz 2286">
@@ -23733,7 +24697,7 @@
               </p14:xfrm>
             </p:contentPart>
           </mc:Choice>
-          <mc:Fallback>
+          <mc:Fallback xmlns="">
             <p:pic>
               <p:nvPicPr>
                 <p:cNvPr id="2287" name="Entrada de lápiz 2286">
@@ -23764,8 +24728,8 @@
             </p:pic>
           </mc:Fallback>
         </mc:AlternateContent>
-        <mc:AlternateContent xmlns:mc="http://schemas.openxmlformats.org/markup-compatibility/2006">
-          <mc:Choice xmlns:p14="http://schemas.microsoft.com/office/powerpoint/2010/main" Requires="p14">
+        <mc:AlternateContent xmlns:mc="http://schemas.openxmlformats.org/markup-compatibility/2006" xmlns:p14="http://schemas.microsoft.com/office/powerpoint/2010/main">
+          <mc:Choice Requires="p14">
             <p:contentPart p14:bwMode="auto" r:id="rId197">
               <p14:nvContentPartPr>
                 <p14:cNvPr id="2291" name="Entrada de lápiz 2290">
@@ -23784,7 +24748,7 @@
               </p14:xfrm>
             </p:contentPart>
           </mc:Choice>
-          <mc:Fallback>
+          <mc:Fallback xmlns="">
             <p:pic>
               <p:nvPicPr>
                 <p:cNvPr id="2291" name="Entrada de lápiz 2290">
@@ -23815,8 +24779,8 @@
             </p:pic>
           </mc:Fallback>
         </mc:AlternateContent>
-        <mc:AlternateContent xmlns:mc="http://schemas.openxmlformats.org/markup-compatibility/2006">
-          <mc:Choice xmlns:p14="http://schemas.microsoft.com/office/powerpoint/2010/main" Requires="p14">
+        <mc:AlternateContent xmlns:mc="http://schemas.openxmlformats.org/markup-compatibility/2006" xmlns:p14="http://schemas.microsoft.com/office/powerpoint/2010/main">
+          <mc:Choice Requires="p14">
             <p:contentPart p14:bwMode="auto" r:id="rId199">
               <p14:nvContentPartPr>
                 <p14:cNvPr id="2292" name="Entrada de lápiz 2291">
@@ -23835,7 +24799,7 @@
               </p14:xfrm>
             </p:contentPart>
           </mc:Choice>
-          <mc:Fallback>
+          <mc:Fallback xmlns="">
             <p:pic>
               <p:nvPicPr>
                 <p:cNvPr id="2292" name="Entrada de lápiz 2291">
@@ -23866,8 +24830,8 @@
             </p:pic>
           </mc:Fallback>
         </mc:AlternateContent>
-        <mc:AlternateContent xmlns:mc="http://schemas.openxmlformats.org/markup-compatibility/2006">
-          <mc:Choice xmlns:p14="http://schemas.microsoft.com/office/powerpoint/2010/main" Requires="p14">
+        <mc:AlternateContent xmlns:mc="http://schemas.openxmlformats.org/markup-compatibility/2006" xmlns:p14="http://schemas.microsoft.com/office/powerpoint/2010/main">
+          <mc:Choice Requires="p14">
             <p:contentPart p14:bwMode="auto" r:id="rId201">
               <p14:nvContentPartPr>
                 <p14:cNvPr id="2294" name="Entrada de lápiz 2293">
@@ -23886,7 +24850,7 @@
               </p14:xfrm>
             </p:contentPart>
           </mc:Choice>
-          <mc:Fallback>
+          <mc:Fallback xmlns="">
             <p:pic>
               <p:nvPicPr>
                 <p:cNvPr id="2294" name="Entrada de lápiz 2293">
@@ -23917,8 +24881,8 @@
             </p:pic>
           </mc:Fallback>
         </mc:AlternateContent>
-        <mc:AlternateContent xmlns:mc="http://schemas.openxmlformats.org/markup-compatibility/2006">
-          <mc:Choice xmlns:p14="http://schemas.microsoft.com/office/powerpoint/2010/main" Requires="p14">
+        <mc:AlternateContent xmlns:mc="http://schemas.openxmlformats.org/markup-compatibility/2006" xmlns:p14="http://schemas.microsoft.com/office/powerpoint/2010/main">
+          <mc:Choice Requires="p14">
             <p:contentPart p14:bwMode="auto" r:id="rId203">
               <p14:nvContentPartPr>
                 <p14:cNvPr id="2295" name="Entrada de lápiz 2294">
@@ -23937,7 +24901,7 @@
               </p14:xfrm>
             </p:contentPart>
           </mc:Choice>
-          <mc:Fallback>
+          <mc:Fallback xmlns="">
             <p:pic>
               <p:nvPicPr>
                 <p:cNvPr id="2295" name="Entrada de lápiz 2294">
@@ -23979,12 +24943,16 @@
   <p:clrMapOvr>
     <a:masterClrMapping/>
   </p:clrMapOvr>
-  <mc:AlternateContent xmlns:mc="http://schemas.openxmlformats.org/markup-compatibility/2006" xmlns:p14="http://schemas.microsoft.com/office/powerpoint/2010/main">
-    <mc:Choice Requires="p14">
-      <p:transition p14:dur="10"/>
+  <mc:AlternateContent xmlns:mc="http://schemas.openxmlformats.org/markup-compatibility/2006">
+    <mc:Choice xmlns:p159="http://schemas.microsoft.com/office/powerpoint/2015/09/main" Requires="p159">
+      <p:transition xmlns:p14="http://schemas.microsoft.com/office/powerpoint/2010/main" spd="slow" p14:dur="2000">
+        <p159:morph option="byObject"/>
+      </p:transition>
     </mc:Choice>
-    <mc:Fallback xmlns="">
-      <p:transition/>
+    <mc:Fallback>
+      <p:transition spd="slow">
+        <p:fade/>
+      </p:transition>
     </mc:Fallback>
   </mc:AlternateContent>
   <p:timing>
@@ -24021,7 +24989,7 @@
                                           </p:stCondLst>
                                         </p:cTn>
                                         <p:tgtEl>
-                                          <p:spTgt spid="7"/>
+                                          <p:spTgt spid="13"/>
                                         </p:tgtEl>
                                         <p:attrNameLst>
                                           <p:attrName>style.visibility</p:attrName>
@@ -24035,7 +25003,7 @@
                                       <p:cBhvr>
                                         <p:cTn id="7" dur="500"/>
                                         <p:tgtEl>
-                                          <p:spTgt spid="7"/>
+                                          <p:spTgt spid="13"/>
                                         </p:tgtEl>
                                       </p:cBhvr>
                                     </p:animEffect>
@@ -24043,7 +25011,7 @@
                                 </p:cTn>
                               </p:par>
                               <p:par>
-                                <p:cTn id="8" presetID="10" presetClass="entr" presetSubtype="0" fill="hold" nodeType="withEffect">
+                                <p:cTn id="8" presetID="10" presetClass="entr" presetSubtype="0" fill="hold" grpId="0" nodeType="withEffect">
                                   <p:stCondLst>
                                     <p:cond delay="0"/>
                                   </p:stCondLst>
@@ -24056,7 +25024,7 @@
                                           </p:stCondLst>
                                         </p:cTn>
                                         <p:tgtEl>
-                                          <p:spTgt spid="2137"/>
+                                          <p:spTgt spid="17"/>
                                         </p:tgtEl>
                                         <p:attrNameLst>
                                           <p:attrName>style.visibility</p:attrName>
@@ -24070,7 +25038,7 @@
                                       <p:cBhvr>
                                         <p:cTn id="10" dur="500"/>
                                         <p:tgtEl>
-                                          <p:spTgt spid="2137"/>
+                                          <p:spTgt spid="17"/>
                                         </p:tgtEl>
                                       </p:cBhvr>
                                     </p:animEffect>
@@ -24091,7 +25059,7 @@
                                           </p:stCondLst>
                                         </p:cTn>
                                         <p:tgtEl>
-                                          <p:spTgt spid="2149"/>
+                                          <p:spTgt spid="12"/>
                                         </p:tgtEl>
                                         <p:attrNameLst>
                                           <p:attrName>style.visibility</p:attrName>
@@ -24105,7 +25073,7 @@
                                       <p:cBhvr>
                                         <p:cTn id="13" dur="500"/>
                                         <p:tgtEl>
-                                          <p:spTgt spid="2149"/>
+                                          <p:spTgt spid="12"/>
                                         </p:tgtEl>
                                       </p:cBhvr>
                                     </p:animEffect>
@@ -24113,7 +25081,7 @@
                                 </p:cTn>
                               </p:par>
                               <p:par>
-                                <p:cTn id="14" presetID="10" presetClass="entr" presetSubtype="0" fill="hold" nodeType="withEffect">
+                                <p:cTn id="14" presetID="10" presetClass="entr" presetSubtype="0" fill="hold" grpId="0" nodeType="withEffect">
                                   <p:stCondLst>
                                     <p:cond delay="0"/>
                                   </p:stCondLst>
@@ -24126,7 +25094,7 @@
                                           </p:stCondLst>
                                         </p:cTn>
                                         <p:tgtEl>
-                                          <p:spTgt spid="2216"/>
+                                          <p:spTgt spid="24"/>
                                         </p:tgtEl>
                                         <p:attrNameLst>
                                           <p:attrName>style.visibility</p:attrName>
@@ -24140,7 +25108,7 @@
                                       <p:cBhvr>
                                         <p:cTn id="16" dur="500"/>
                                         <p:tgtEl>
-                                          <p:spTgt spid="2216"/>
+                                          <p:spTgt spid="24"/>
                                         </p:tgtEl>
                                       </p:cBhvr>
                                     </p:animEffect>
@@ -24161,7 +25129,7 @@
                                           </p:stCondLst>
                                         </p:cTn>
                                         <p:tgtEl>
-                                          <p:spTgt spid="2223"/>
+                                          <p:spTgt spid="7"/>
                                         </p:tgtEl>
                                         <p:attrNameLst>
                                           <p:attrName>style.visibility</p:attrName>
@@ -24175,7 +25143,7 @@
                                       <p:cBhvr>
                                         <p:cTn id="19" dur="500"/>
                                         <p:tgtEl>
-                                          <p:spTgt spid="2223"/>
+                                          <p:spTgt spid="7"/>
                                         </p:tgtEl>
                                       </p:cBhvr>
                                     </p:animEffect>
@@ -24196,7 +25164,7 @@
                                           </p:stCondLst>
                                         </p:cTn>
                                         <p:tgtEl>
-                                          <p:spTgt spid="301"/>
+                                          <p:spTgt spid="2137"/>
                                         </p:tgtEl>
                                         <p:attrNameLst>
                                           <p:attrName>style.visibility</p:attrName>
@@ -24210,7 +25178,7 @@
                                       <p:cBhvr>
                                         <p:cTn id="22" dur="500"/>
                                         <p:tgtEl>
-                                          <p:spTgt spid="301"/>
+                                          <p:spTgt spid="2137"/>
                                         </p:tgtEl>
                                       </p:cBhvr>
                                     </p:animEffect>
@@ -24231,6 +25199,146 @@
                                           </p:stCondLst>
                                         </p:cTn>
                                         <p:tgtEl>
+                                          <p:spTgt spid="2149"/>
+                                        </p:tgtEl>
+                                        <p:attrNameLst>
+                                          <p:attrName>style.visibility</p:attrName>
+                                        </p:attrNameLst>
+                                      </p:cBhvr>
+                                      <p:to>
+                                        <p:strVal val="visible"/>
+                                      </p:to>
+                                    </p:set>
+                                    <p:animEffect transition="in" filter="fade">
+                                      <p:cBhvr>
+                                        <p:cTn id="25" dur="500"/>
+                                        <p:tgtEl>
+                                          <p:spTgt spid="2149"/>
+                                        </p:tgtEl>
+                                      </p:cBhvr>
+                                    </p:animEffect>
+                                  </p:childTnLst>
+                                </p:cTn>
+                              </p:par>
+                              <p:par>
+                                <p:cTn id="26" presetID="10" presetClass="entr" presetSubtype="0" fill="hold" nodeType="withEffect">
+                                  <p:stCondLst>
+                                    <p:cond delay="0"/>
+                                  </p:stCondLst>
+                                  <p:childTnLst>
+                                    <p:set>
+                                      <p:cBhvr>
+                                        <p:cTn id="27" dur="1" fill="hold">
+                                          <p:stCondLst>
+                                            <p:cond delay="0"/>
+                                          </p:stCondLst>
+                                        </p:cTn>
+                                        <p:tgtEl>
+                                          <p:spTgt spid="2216"/>
+                                        </p:tgtEl>
+                                        <p:attrNameLst>
+                                          <p:attrName>style.visibility</p:attrName>
+                                        </p:attrNameLst>
+                                      </p:cBhvr>
+                                      <p:to>
+                                        <p:strVal val="visible"/>
+                                      </p:to>
+                                    </p:set>
+                                    <p:animEffect transition="in" filter="fade">
+                                      <p:cBhvr>
+                                        <p:cTn id="28" dur="500"/>
+                                        <p:tgtEl>
+                                          <p:spTgt spid="2216"/>
+                                        </p:tgtEl>
+                                      </p:cBhvr>
+                                    </p:animEffect>
+                                  </p:childTnLst>
+                                </p:cTn>
+                              </p:par>
+                              <p:par>
+                                <p:cTn id="29" presetID="10" presetClass="entr" presetSubtype="0" fill="hold" nodeType="withEffect">
+                                  <p:stCondLst>
+                                    <p:cond delay="0"/>
+                                  </p:stCondLst>
+                                  <p:childTnLst>
+                                    <p:set>
+                                      <p:cBhvr>
+                                        <p:cTn id="30" dur="1" fill="hold">
+                                          <p:stCondLst>
+                                            <p:cond delay="0"/>
+                                          </p:stCondLst>
+                                        </p:cTn>
+                                        <p:tgtEl>
+                                          <p:spTgt spid="2223"/>
+                                        </p:tgtEl>
+                                        <p:attrNameLst>
+                                          <p:attrName>style.visibility</p:attrName>
+                                        </p:attrNameLst>
+                                      </p:cBhvr>
+                                      <p:to>
+                                        <p:strVal val="visible"/>
+                                      </p:to>
+                                    </p:set>
+                                    <p:animEffect transition="in" filter="fade">
+                                      <p:cBhvr>
+                                        <p:cTn id="31" dur="500"/>
+                                        <p:tgtEl>
+                                          <p:spTgt spid="2223"/>
+                                        </p:tgtEl>
+                                      </p:cBhvr>
+                                    </p:animEffect>
+                                  </p:childTnLst>
+                                </p:cTn>
+                              </p:par>
+                              <p:par>
+                                <p:cTn id="32" presetID="10" presetClass="entr" presetSubtype="0" fill="hold" nodeType="withEffect">
+                                  <p:stCondLst>
+                                    <p:cond delay="0"/>
+                                  </p:stCondLst>
+                                  <p:childTnLst>
+                                    <p:set>
+                                      <p:cBhvr>
+                                        <p:cTn id="33" dur="1" fill="hold">
+                                          <p:stCondLst>
+                                            <p:cond delay="0"/>
+                                          </p:stCondLst>
+                                        </p:cTn>
+                                        <p:tgtEl>
+                                          <p:spTgt spid="301"/>
+                                        </p:tgtEl>
+                                        <p:attrNameLst>
+                                          <p:attrName>style.visibility</p:attrName>
+                                        </p:attrNameLst>
+                                      </p:cBhvr>
+                                      <p:to>
+                                        <p:strVal val="visible"/>
+                                      </p:to>
+                                    </p:set>
+                                    <p:animEffect transition="in" filter="fade">
+                                      <p:cBhvr>
+                                        <p:cTn id="34" dur="500"/>
+                                        <p:tgtEl>
+                                          <p:spTgt spid="301"/>
+                                        </p:tgtEl>
+                                      </p:cBhvr>
+                                    </p:animEffect>
+                                  </p:childTnLst>
+                                </p:cTn>
+                              </p:par>
+                              <p:par>
+                                <p:cTn id="35" presetID="10" presetClass="entr" presetSubtype="0" fill="hold" nodeType="withEffect">
+                                  <p:stCondLst>
+                                    <p:cond delay="0"/>
+                                  </p:stCondLst>
+                                  <p:childTnLst>
+                                    <p:set>
+                                      <p:cBhvr>
+                                        <p:cTn id="36" dur="1" fill="hold">
+                                          <p:stCondLst>
+                                            <p:cond delay="0"/>
+                                          </p:stCondLst>
+                                        </p:cTn>
+                                        <p:tgtEl>
                                           <p:spTgt spid="2296"/>
                                         </p:tgtEl>
                                         <p:attrNameLst>
@@ -24243,7 +25351,7 @@
                                     </p:set>
                                     <p:animEffect transition="in" filter="fade">
                                       <p:cBhvr>
-                                        <p:cTn id="25" dur="500"/>
+                                        <p:cTn id="37" dur="500"/>
                                         <p:tgtEl>
                                           <p:spTgt spid="2296"/>
                                         </p:tgtEl>
@@ -24279,6 +25387,10 @@
         </p:cTn>
       </p:par>
     </p:tnLst>
+    <p:bldLst>
+      <p:bldP spid="17" grpId="0"/>
+      <p:bldP spid="24" grpId="0"/>
+    </p:bldLst>
   </p:timing>
 </p:sld>
 </file>
@@ -24702,8 +25814,8 @@
           </a:p>
         </p:txBody>
       </p:sp>
-      <mc:AlternateContent xmlns:mc="http://schemas.openxmlformats.org/markup-compatibility/2006">
-        <mc:Choice xmlns:p14="http://schemas.microsoft.com/office/powerpoint/2010/main" Requires="p14">
+      <mc:AlternateContent xmlns:mc="http://schemas.openxmlformats.org/markup-compatibility/2006" xmlns:p14="http://schemas.microsoft.com/office/powerpoint/2010/main">
+        <mc:Choice Requires="p14">
           <p:contentPart p14:bwMode="auto" r:id="rId3">
             <p14:nvContentPartPr>
               <p14:cNvPr id="96" name="Entrada de lápiz 95">
@@ -24722,7 +25834,7 @@
             </p14:xfrm>
           </p:contentPart>
         </mc:Choice>
-        <mc:Fallback>
+        <mc:Fallback xmlns="">
           <p:pic>
             <p:nvPicPr>
               <p:cNvPr id="96" name="Entrada de lápiz 95">
@@ -24753,8 +25865,8 @@
           </p:pic>
         </mc:Fallback>
       </mc:AlternateContent>
-      <mc:AlternateContent xmlns:mc="http://schemas.openxmlformats.org/markup-compatibility/2006">
-        <mc:Choice xmlns:p14="http://schemas.microsoft.com/office/powerpoint/2010/main" Requires="p14">
+      <mc:AlternateContent xmlns:mc="http://schemas.openxmlformats.org/markup-compatibility/2006" xmlns:p14="http://schemas.microsoft.com/office/powerpoint/2010/main">
+        <mc:Choice Requires="p14">
           <p:contentPart p14:bwMode="auto" r:id="rId5">
             <p14:nvContentPartPr>
               <p14:cNvPr id="99" name="Entrada de lápiz 98">
@@ -24773,7 +25885,7 @@
             </p14:xfrm>
           </p:contentPart>
         </mc:Choice>
-        <mc:Fallback>
+        <mc:Fallback xmlns="">
           <p:pic>
             <p:nvPicPr>
               <p:cNvPr id="99" name="Entrada de lápiz 98">
@@ -24814,6 +25926,18 @@
   <p:clrMapOvr>
     <a:masterClrMapping/>
   </p:clrMapOvr>
+  <mc:AlternateContent xmlns:mc="http://schemas.openxmlformats.org/markup-compatibility/2006">
+    <mc:Choice xmlns:p159="http://schemas.microsoft.com/office/powerpoint/2015/09/main" Requires="p159">
+      <p:transition xmlns:p14="http://schemas.microsoft.com/office/powerpoint/2010/main" spd="slow" p14:dur="2000">
+        <p159:morph option="byObject"/>
+      </p:transition>
+    </mc:Choice>
+    <mc:Fallback>
+      <p:transition spd="slow">
+        <p:fade/>
+      </p:transition>
+    </mc:Fallback>
+  </mc:AlternateContent>
   <p:timing>
     <p:tnLst>
       <p:par>
@@ -24951,6 +26075,76 @@
                                         <p:cTn id="15" dur="500"/>
                                         <p:tgtEl>
                                           <p:spTgt spid="67"/>
+                                        </p:tgtEl>
+                                      </p:cBhvr>
+                                    </p:animEffect>
+                                  </p:childTnLst>
+                                </p:cTn>
+                              </p:par>
+                              <p:par>
+                                <p:cTn id="16" presetID="10" presetClass="entr" presetSubtype="0" fill="hold" nodeType="withEffect">
+                                  <p:stCondLst>
+                                    <p:cond delay="0"/>
+                                  </p:stCondLst>
+                                  <p:childTnLst>
+                                    <p:set>
+                                      <p:cBhvr>
+                                        <p:cTn id="17" dur="1" fill="hold">
+                                          <p:stCondLst>
+                                            <p:cond delay="0"/>
+                                          </p:stCondLst>
+                                        </p:cTn>
+                                        <p:tgtEl>
+                                          <p:spTgt spid="96"/>
+                                        </p:tgtEl>
+                                        <p:attrNameLst>
+                                          <p:attrName>style.visibility</p:attrName>
+                                        </p:attrNameLst>
+                                      </p:cBhvr>
+                                      <p:to>
+                                        <p:strVal val="visible"/>
+                                      </p:to>
+                                    </p:set>
+                                    <p:animEffect transition="in" filter="fade">
+                                      <p:cBhvr>
+                                        <p:cTn id="18" dur="500"/>
+                                        <p:tgtEl>
+                                          <p:spTgt spid="96"/>
+                                        </p:tgtEl>
+                                      </p:cBhvr>
+                                    </p:animEffect>
+                                  </p:childTnLst>
+                                </p:cTn>
+                              </p:par>
+                              <p:par>
+                                <p:cTn id="19" presetID="10" presetClass="entr" presetSubtype="0" fill="hold" nodeType="withEffect">
+                                  <p:stCondLst>
+                                    <p:cond delay="0"/>
+                                  </p:stCondLst>
+                                  <p:childTnLst>
+                                    <p:set>
+                                      <p:cBhvr>
+                                        <p:cTn id="20" dur="1" fill="hold">
+                                          <p:stCondLst>
+                                            <p:cond delay="0"/>
+                                          </p:stCondLst>
+                                        </p:cTn>
+                                        <p:tgtEl>
+                                          <p:spTgt spid="99"/>
+                                        </p:tgtEl>
+                                        <p:attrNameLst>
+                                          <p:attrName>style.visibility</p:attrName>
+                                        </p:attrNameLst>
+                                      </p:cBhvr>
+                                      <p:to>
+                                        <p:strVal val="visible"/>
+                                      </p:to>
+                                    </p:set>
+                                    <p:animEffect transition="in" filter="fade">
+                                      <p:cBhvr>
+                                        <p:cTn id="21" dur="500"/>
+                                        <p:tgtEl>
+                                          <p:spTgt spid="99"/>
                                         </p:tgtEl>
                                       </p:cBhvr>
                                     </p:animEffect>
@@ -25288,9 +26482,12 @@
 </file>
 
 <file path=customXml/item1.xml><?xml version="1.0" encoding="utf-8"?>
-<p:properties xmlns:p="http://schemas.microsoft.com/office/2006/metadata/properties" xmlns:xsi="http://www.w3.org/2001/XMLSchema-instance" xmlns:pc="http://schemas.microsoft.com/office/infopath/2007/PartnerControls">
-  <documentManagement/>
-</p:properties>
+<?mso-contentType ?>
+<FormTemplates xmlns="http://schemas.microsoft.com/sharepoint/v3/contenttype/forms">
+  <Display>DocumentLibraryForm</Display>
+  <Edit>DocumentLibraryForm</Edit>
+  <New>DocumentLibraryForm</New>
+</FormTemplates>
 </file>
 
 <file path=customXml/item2.xml><?xml version="1.0" encoding="utf-8"?>
@@ -25484,26 +26681,15 @@
 </file>
 
 <file path=customXml/item3.xml><?xml version="1.0" encoding="utf-8"?>
-<?mso-contentType ?>
-<FormTemplates xmlns="http://schemas.microsoft.com/sharepoint/v3/contenttype/forms">
-  <Display>DocumentLibraryForm</Display>
-  <Edit>DocumentLibraryForm</Edit>
-  <New>DocumentLibraryForm</New>
-</FormTemplates>
+<p:properties xmlns:p="http://schemas.microsoft.com/office/2006/metadata/properties" xmlns:xsi="http://www.w3.org/2001/XMLSchema-instance" xmlns:pc="http://schemas.microsoft.com/office/infopath/2007/PartnerControls">
+  <documentManagement/>
+</p:properties>
 </file>
 
 <file path=customXml/itemProps1.xml><?xml version="1.0" encoding="utf-8"?>
-<ds:datastoreItem xmlns:ds="http://schemas.openxmlformats.org/officeDocument/2006/customXml" ds:itemID="{5E5EC646-CBAB-403A-8992-3DC0D8367B4E}">
+<ds:datastoreItem xmlns:ds="http://schemas.openxmlformats.org/officeDocument/2006/customXml" ds:itemID="{680402AA-40CB-48F3-BE3A-6FF8AC233196}">
   <ds:schemaRefs>
-    <ds:schemaRef ds:uri="http://purl.org/dc/dcmitype/"/>
-    <ds:schemaRef ds:uri="http://schemas.openxmlformats.org/package/2006/metadata/core-properties"/>
-    <ds:schemaRef ds:uri="http://purl.org/dc/elements/1.1/"/>
-    <ds:schemaRef ds:uri="http://www.w3.org/XML/1998/namespace"/>
-    <ds:schemaRef ds:uri="http://schemas.microsoft.com/office/2006/metadata/properties"/>
-    <ds:schemaRef ds:uri="http://schemas.microsoft.com/office/2006/documentManagement/types"/>
-    <ds:schemaRef ds:uri="2794344a-0a37-4131-91b4-2babde47bdf0"/>
-    <ds:schemaRef ds:uri="http://schemas.microsoft.com/office/infopath/2007/PartnerControls"/>
-    <ds:schemaRef ds:uri="http://purl.org/dc/terms/"/>
+    <ds:schemaRef ds:uri="http://schemas.microsoft.com/sharepoint/v3/contenttype/forms"/>
   </ds:schemaRefs>
 </ds:datastoreItem>
 </file>
@@ -25527,9 +26713,17 @@
 </file>
 
 <file path=customXml/itemProps3.xml><?xml version="1.0" encoding="utf-8"?>
-<ds:datastoreItem xmlns:ds="http://schemas.openxmlformats.org/officeDocument/2006/customXml" ds:itemID="{680402AA-40CB-48F3-BE3A-6FF8AC233196}">
+<ds:datastoreItem xmlns:ds="http://schemas.openxmlformats.org/officeDocument/2006/customXml" ds:itemID="{5E5EC646-CBAB-403A-8992-3DC0D8367B4E}">
   <ds:schemaRefs>
-    <ds:schemaRef ds:uri="http://schemas.microsoft.com/sharepoint/v3/contenttype/forms"/>
+    <ds:schemaRef ds:uri="http://purl.org/dc/dcmitype/"/>
+    <ds:schemaRef ds:uri="http://schemas.openxmlformats.org/package/2006/metadata/core-properties"/>
+    <ds:schemaRef ds:uri="http://purl.org/dc/elements/1.1/"/>
+    <ds:schemaRef ds:uri="http://www.w3.org/XML/1998/namespace"/>
+    <ds:schemaRef ds:uri="http://schemas.microsoft.com/office/2006/metadata/properties"/>
+    <ds:schemaRef ds:uri="http://schemas.microsoft.com/office/2006/documentManagement/types"/>
+    <ds:schemaRef ds:uri="2794344a-0a37-4131-91b4-2babde47bdf0"/>
+    <ds:schemaRef ds:uri="http://schemas.microsoft.com/office/infopath/2007/PartnerControls"/>
+    <ds:schemaRef ds:uri="http://purl.org/dc/terms/"/>
   </ds:schemaRefs>
 </ds:datastoreItem>
 </file>
</xml_diff>